<commit_message>
Agendar trabalho as main flow
</commit_message>
<xml_diff>
--- a/relatorio/Fase 3/LI4.pptx
+++ b/relatorio/Fase 3/LI4.pptx
@@ -5,7 +5,7 @@
     <p:sldMasterId id="2147483648" r:id="rId1"/>
   </p:sldMasterIdLst>
   <p:notesMasterIdLst>
-    <p:notesMasterId r:id="rId49"/>
+    <p:notesMasterId r:id="rId28"/>
   </p:notesMasterIdLst>
   <p:sldIdLst>
     <p:sldId id="256" r:id="rId2"/>
@@ -20,41 +20,20 @@
     <p:sldId id="302" r:id="rId11"/>
     <p:sldId id="308" r:id="rId12"/>
     <p:sldId id="314" r:id="rId13"/>
-    <p:sldId id="315" r:id="rId14"/>
-    <p:sldId id="319" r:id="rId15"/>
-    <p:sldId id="320" r:id="rId16"/>
-    <p:sldId id="321" r:id="rId17"/>
-    <p:sldId id="322" r:id="rId18"/>
-    <p:sldId id="324" r:id="rId19"/>
-    <p:sldId id="325" r:id="rId20"/>
-    <p:sldId id="326" r:id="rId21"/>
-    <p:sldId id="328" r:id="rId22"/>
-    <p:sldId id="331" r:id="rId23"/>
-    <p:sldId id="332" r:id="rId24"/>
-    <p:sldId id="330" r:id="rId25"/>
-    <p:sldId id="335" r:id="rId26"/>
-    <p:sldId id="333" r:id="rId27"/>
-    <p:sldId id="336" r:id="rId28"/>
-    <p:sldId id="334" r:id="rId29"/>
-    <p:sldId id="337" r:id="rId30"/>
-    <p:sldId id="338" r:id="rId31"/>
-    <p:sldId id="339" r:id="rId32"/>
-    <p:sldId id="340" r:id="rId33"/>
-    <p:sldId id="342" r:id="rId34"/>
-    <p:sldId id="341" r:id="rId35"/>
-    <p:sldId id="343" r:id="rId36"/>
-    <p:sldId id="344" r:id="rId37"/>
-    <p:sldId id="345" r:id="rId38"/>
-    <p:sldId id="346" r:id="rId39"/>
-    <p:sldId id="347" r:id="rId40"/>
-    <p:sldId id="348" r:id="rId41"/>
-    <p:sldId id="349" r:id="rId42"/>
-    <p:sldId id="351" r:id="rId43"/>
-    <p:sldId id="350" r:id="rId44"/>
-    <p:sldId id="352" r:id="rId45"/>
-    <p:sldId id="353" r:id="rId46"/>
-    <p:sldId id="354" r:id="rId47"/>
-    <p:sldId id="303" r:id="rId48"/>
+    <p:sldId id="328" r:id="rId14"/>
+    <p:sldId id="331" r:id="rId15"/>
+    <p:sldId id="332" r:id="rId16"/>
+    <p:sldId id="330" r:id="rId17"/>
+    <p:sldId id="335" r:id="rId18"/>
+    <p:sldId id="334" r:id="rId19"/>
+    <p:sldId id="339" r:id="rId20"/>
+    <p:sldId id="340" r:id="rId21"/>
+    <p:sldId id="343" r:id="rId22"/>
+    <p:sldId id="345" r:id="rId23"/>
+    <p:sldId id="351" r:id="rId24"/>
+    <p:sldId id="350" r:id="rId25"/>
+    <p:sldId id="352" r:id="rId26"/>
+    <p:sldId id="303" r:id="rId27"/>
   </p:sldIdLst>
   <p:sldSz cx="12192000" cy="6858000"/>
   <p:notesSz cx="6858000" cy="9144000"/>
@@ -7258,39 +7237,76 @@
           <a:p>
             <a:r>
               <a:rPr lang="pt-PT" dirty="0"/>
-              <a:t>Requisitos do utilizador e de sistema funcionais - Cliente</a:t>
-            </a:r>
-          </a:p>
-        </p:txBody>
-      </p:sp>
-      <p:pic>
-        <p:nvPicPr>
-          <p:cNvPr id="3" name="Picture 2"/>
-          <p:cNvPicPr>
-            <a:picLocks noChangeAspect="1"/>
-          </p:cNvPicPr>
-          <p:nvPr/>
-        </p:nvPicPr>
-        <p:blipFill>
-          <a:blip r:embed="rId2"/>
-          <a:stretch>
-            <a:fillRect/>
-          </a:stretch>
-        </p:blipFill>
-        <p:spPr>
-          <a:xfrm>
-            <a:off x="677334" y="2450744"/>
-            <a:ext cx="8429049" cy="3203608"/>
-          </a:xfrm>
-          <a:prstGeom prst="rect">
-            <a:avLst/>
-          </a:prstGeom>
-        </p:spPr>
-      </p:pic>
+              <a:t>Requisitos de </a:t>
+            </a:r>
+            <a:r>
+              <a:rPr lang="pt-PT" dirty="0" smtClean="0"/>
+              <a:t>sistema </a:t>
+            </a:r>
+            <a:r>
+              <a:rPr lang="pt-PT" dirty="0"/>
+              <a:t>não-funcionais</a:t>
+            </a:r>
+          </a:p>
+        </p:txBody>
+      </p:sp>
+      <p:sp>
+        <p:nvSpPr>
+          <p:cNvPr id="2" name="Content Placeholder 1"/>
+          <p:cNvSpPr>
+            <a:spLocks noGrp="1"/>
+          </p:cNvSpPr>
+          <p:nvPr>
+            <p:ph idx="1"/>
+          </p:nvPr>
+        </p:nvSpPr>
+        <p:spPr/>
+        <p:txBody>
+          <a:bodyPr>
+            <a:normAutofit/>
+          </a:bodyPr>
+          <a:lstStyle/>
+          <a:p>
+            <a:pPr algn="just"/>
+            <a:r>
+              <a:rPr lang="pt-PT" sz="2800" dirty="0"/>
+              <a:t>Organizacionais</a:t>
+            </a:r>
+          </a:p>
+          <a:p>
+            <a:pPr lvl="1" algn="just"/>
+            <a:r>
+              <a:rPr lang="pt-PT" sz="2400" dirty="0"/>
+              <a:t>O utilizador deve autenticar-se com o seu username e a password respetiva;</a:t>
+            </a:r>
+          </a:p>
+          <a:p>
+            <a:pPr lvl="1" algn="just"/>
+            <a:r>
+              <a:rPr lang="pt-PT" sz="2400" dirty="0"/>
+              <a:t>A linguagem de programação a utilizar será C# em cooperação com a framework ASP.NET;</a:t>
+            </a:r>
+          </a:p>
+          <a:p>
+            <a:pPr lvl="1" algn="just"/>
+            <a:r>
+              <a:rPr lang="pt-PT" sz="2400" dirty="0"/>
+              <a:t>O SGBD a usar deve ser o SQL Server;</a:t>
+            </a:r>
+          </a:p>
+          <a:p>
+            <a:pPr lvl="1" algn="just"/>
+            <a:r>
+              <a:rPr lang="pt-PT" sz="2400" dirty="0"/>
+              <a:t>A aplicação será desenvolvida para web;</a:t>
+            </a:r>
+          </a:p>
+        </p:txBody>
+      </p:sp>
     </p:spTree>
     <p:extLst>
       <p:ext uri="{BB962C8B-B14F-4D97-AF65-F5344CB8AC3E}">
-        <p14:creationId xmlns:p14="http://schemas.microsoft.com/office/powerpoint/2010/main" val="1937767265"/>
+        <p14:creationId xmlns:p14="http://schemas.microsoft.com/office/powerpoint/2010/main" val="1620922798"/>
       </p:ext>
     </p:extLst>
   </p:cSld>
@@ -7353,38 +7369,62 @@
           <a:p>
             <a:r>
               <a:rPr lang="pt-PT" dirty="0"/>
-              <a:t>Requisitos do utilizador e de sistema funcionais - Profissional</a:t>
-            </a:r>
-          </a:p>
-        </p:txBody>
-      </p:sp>
-      <p:pic>
-        <p:nvPicPr>
-          <p:cNvPr id="2" name="Picture 1"/>
-          <p:cNvPicPr>
-            <a:picLocks noChangeAspect="1"/>
-          </p:cNvPicPr>
-          <p:nvPr/>
-        </p:nvPicPr>
-        <p:blipFill rotWithShape="1">
-          <a:blip r:embed="rId2"/>
-          <a:srcRect t="16209"/>
-          <a:stretch/>
-        </p:blipFill>
-        <p:spPr>
-          <a:xfrm>
-            <a:off x="677334" y="2369976"/>
-            <a:ext cx="8256124" cy="3303035"/>
-          </a:xfrm>
-          <a:prstGeom prst="rect">
-            <a:avLst/>
-          </a:prstGeom>
-        </p:spPr>
-      </p:pic>
+              <a:t>Requisitos de </a:t>
+            </a:r>
+            <a:r>
+              <a:rPr lang="pt-PT" dirty="0" smtClean="0"/>
+              <a:t>sistema </a:t>
+            </a:r>
+            <a:r>
+              <a:rPr lang="pt-PT" dirty="0"/>
+              <a:t>não-funcionais</a:t>
+            </a:r>
+          </a:p>
+        </p:txBody>
+      </p:sp>
+      <p:sp>
+        <p:nvSpPr>
+          <p:cNvPr id="2" name="Content Placeholder 1"/>
+          <p:cNvSpPr>
+            <a:spLocks noGrp="1"/>
+          </p:cNvSpPr>
+          <p:nvPr>
+            <p:ph idx="1"/>
+          </p:nvPr>
+        </p:nvSpPr>
+        <p:spPr/>
+        <p:txBody>
+          <a:bodyPr>
+            <a:normAutofit/>
+          </a:bodyPr>
+          <a:lstStyle/>
+          <a:p>
+            <a:pPr algn="just"/>
+            <a:r>
+              <a:rPr lang="pt-PT" sz="2800" dirty="0"/>
+              <a:t>Externos</a:t>
+            </a:r>
+          </a:p>
+          <a:p>
+            <a:pPr lvl="1" algn="just"/>
+            <a:r>
+              <a:rPr lang="pt-PT" sz="2400" dirty="0"/>
+              <a:t>O sistema deve recorrer a uma API de mapas para representar a localização do trabalho ou até mesmo para representar a sua própria localização;</a:t>
+            </a:r>
+          </a:p>
+          <a:p>
+            <a:pPr lvl="1" algn="just"/>
+            <a:r>
+              <a:rPr lang="pt-PT" sz="2400" dirty="0"/>
+              <a:t>O sistema não deve apresentar aos utilizadores dados privados acerca dos restantes utilizadores, sendo que, cada utilizador só pode ver os seus dados e aqueles que são públicos; </a:t>
+            </a:r>
+          </a:p>
+        </p:txBody>
+      </p:sp>
     </p:spTree>
     <p:extLst>
       <p:ext uri="{BB962C8B-B14F-4D97-AF65-F5344CB8AC3E}">
-        <p14:creationId xmlns:p14="http://schemas.microsoft.com/office/powerpoint/2010/main" val="4281878344"/>
+        <p14:creationId xmlns:p14="http://schemas.microsoft.com/office/powerpoint/2010/main" val="374380089"/>
       </p:ext>
     </p:extLst>
   </p:cSld>
@@ -7447,38 +7487,88 @@
           <a:p>
             <a:r>
               <a:rPr lang="pt-PT" dirty="0"/>
-              <a:t>Requisitos do utilizador e de sistema funcionais – Cliente e Profissional</a:t>
-            </a:r>
-          </a:p>
-        </p:txBody>
-      </p:sp>
-      <p:pic>
-        <p:nvPicPr>
-          <p:cNvPr id="2" name="Picture 1"/>
-          <p:cNvPicPr>
-            <a:picLocks noChangeAspect="1"/>
-          </p:cNvPicPr>
-          <p:nvPr/>
-        </p:nvPicPr>
-        <p:blipFill rotWithShape="1">
-          <a:blip r:embed="rId2"/>
-          <a:srcRect t="15670"/>
-          <a:stretch/>
-        </p:blipFill>
+              <a:t>Requisitos de </a:t>
+            </a:r>
+            <a:r>
+              <a:rPr lang="pt-PT" dirty="0" smtClean="0"/>
+              <a:t>sistema </a:t>
+            </a:r>
+            <a:r>
+              <a:rPr lang="pt-PT" dirty="0"/>
+              <a:t>não-funcionais</a:t>
+            </a:r>
+          </a:p>
+        </p:txBody>
+      </p:sp>
+      <p:sp>
+        <p:nvSpPr>
+          <p:cNvPr id="2" name="Content Placeholder 1"/>
+          <p:cNvSpPr>
+            <a:spLocks noGrp="1"/>
+          </p:cNvSpPr>
+          <p:nvPr>
+            <p:ph idx="1"/>
+          </p:nvPr>
+        </p:nvSpPr>
         <p:spPr>
           <a:xfrm>
-            <a:off x="677334" y="2239346"/>
-            <a:ext cx="8275273" cy="2836506"/>
+            <a:off x="677334" y="2160589"/>
+            <a:ext cx="8596668" cy="4352178"/>
           </a:xfrm>
-          <a:prstGeom prst="rect">
-            <a:avLst/>
-          </a:prstGeom>
         </p:spPr>
-      </p:pic>
+        <p:txBody>
+          <a:bodyPr>
+            <a:normAutofit fontScale="92500"/>
+          </a:bodyPr>
+          <a:lstStyle/>
+          <a:p>
+            <a:pPr algn="just"/>
+            <a:r>
+              <a:rPr lang="pt-PT" sz="2800" dirty="0"/>
+              <a:t>Produto</a:t>
+            </a:r>
+          </a:p>
+          <a:p>
+            <a:pPr lvl="1" algn="just"/>
+            <a:r>
+              <a:rPr lang="pt-PT" sz="2400" dirty="0"/>
+              <a:t>O sistema deve estar disponível 24h por dia. No pior dos casos, espera-se uma disponibilidade média superior a 99%;</a:t>
+            </a:r>
+          </a:p>
+          <a:p>
+            <a:pPr lvl="1" algn="just"/>
+            <a:r>
+              <a:rPr lang="pt-PT" sz="2400" dirty="0"/>
+              <a:t>O sistema deve ser de fácil uso;</a:t>
+            </a:r>
+          </a:p>
+          <a:p>
+            <a:pPr lvl="1" algn="just"/>
+            <a:r>
+              <a:rPr lang="pt-PT" sz="2400" dirty="0"/>
+              <a:t>O sistema deve ser produzido de modo a ser executado em todos os browsers;</a:t>
+            </a:r>
+          </a:p>
+          <a:p>
+            <a:pPr lvl="1" algn="just"/>
+            <a:r>
+              <a:rPr lang="pt-PT" sz="2400" dirty="0"/>
+              <a:t>O sistema deve suportar o registo de 1000 utilizadores, no espaço de 1 ano;</a:t>
+            </a:r>
+          </a:p>
+          <a:p>
+            <a:pPr lvl="1" algn="just"/>
+            <a:r>
+              <a:rPr lang="pt-PT" sz="2400" dirty="0"/>
+              <a:t>O nível de satisfação dos utilizadores com a aplicação deverá ser elevado.</a:t>
+            </a:r>
+          </a:p>
+        </p:txBody>
+      </p:sp>
     </p:spTree>
     <p:extLst>
       <p:ext uri="{BB962C8B-B14F-4D97-AF65-F5344CB8AC3E}">
-        <p14:creationId xmlns:p14="http://schemas.microsoft.com/office/powerpoint/2010/main" val="3442306051"/>
+        <p14:creationId xmlns:p14="http://schemas.microsoft.com/office/powerpoint/2010/main" val="206296111"/>
       </p:ext>
     </p:extLst>
   </p:cSld>
@@ -7534,967 +7624,6 @@
             <p:ph type="title"/>
           </p:nvPr>
         </p:nvSpPr>
-        <p:spPr/>
-        <p:txBody>
-          <a:bodyPr/>
-          <a:lstStyle/>
-          <a:p>
-            <a:r>
-              <a:rPr lang="pt-PT" dirty="0"/>
-              <a:t>Requisitos do utilizador e de sistema funcionais – Cliente e Profissional</a:t>
-            </a:r>
-          </a:p>
-        </p:txBody>
-      </p:sp>
-      <p:pic>
-        <p:nvPicPr>
-          <p:cNvPr id="2" name="Picture 1"/>
-          <p:cNvPicPr>
-            <a:picLocks noChangeAspect="1"/>
-          </p:cNvPicPr>
-          <p:nvPr/>
-        </p:nvPicPr>
-        <p:blipFill>
-          <a:blip r:embed="rId2"/>
-          <a:stretch>
-            <a:fillRect/>
-          </a:stretch>
-        </p:blipFill>
-        <p:spPr>
-          <a:xfrm>
-            <a:off x="677334" y="2537245"/>
-            <a:ext cx="8440275" cy="2837187"/>
-          </a:xfrm>
-          <a:prstGeom prst="rect">
-            <a:avLst/>
-          </a:prstGeom>
-        </p:spPr>
-      </p:pic>
-    </p:spTree>
-    <p:extLst>
-      <p:ext uri="{BB962C8B-B14F-4D97-AF65-F5344CB8AC3E}">
-        <p14:creationId xmlns:p14="http://schemas.microsoft.com/office/powerpoint/2010/main" val="799952749"/>
-      </p:ext>
-    </p:extLst>
-  </p:cSld>
-  <p:clrMapOvr>
-    <a:masterClrMapping/>
-  </p:clrMapOvr>
-  <mc:AlternateContent xmlns:mc="http://schemas.openxmlformats.org/markup-compatibility/2006" xmlns:p14="http://schemas.microsoft.com/office/powerpoint/2010/main">
-    <mc:Choice Requires="p14">
-      <p:transition spd="med" p14:dur="700">
-        <p:fade/>
-      </p:transition>
-    </mc:Choice>
-    <mc:Fallback xmlns="">
-      <p:transition spd="med">
-        <p:fade/>
-      </p:transition>
-    </mc:Fallback>
-  </mc:AlternateContent>
-  <p:timing>
-    <p:tnLst>
-      <p:par>
-        <p:cTn id="1" dur="indefinite" restart="never" nodeType="tmRoot"/>
-      </p:par>
-    </p:tnLst>
-  </p:timing>
-</p:sld>
-</file>
-
-<file path=ppt/slides/slide17.xml><?xml version="1.0" encoding="utf-8"?>
-<p:sld xmlns:a="http://schemas.openxmlformats.org/drawingml/2006/main" xmlns:r="http://schemas.openxmlformats.org/officeDocument/2006/relationships" xmlns:p="http://schemas.openxmlformats.org/presentationml/2006/main">
-  <p:cSld>
-    <p:spTree>
-      <p:nvGrpSpPr>
-        <p:cNvPr id="1" name=""/>
-        <p:cNvGrpSpPr/>
-        <p:nvPr/>
-      </p:nvGrpSpPr>
-      <p:grpSpPr>
-        <a:xfrm>
-          <a:off x="0" y="0"/>
-          <a:ext cx="0" cy="0"/>
-          <a:chOff x="0" y="0"/>
-          <a:chExt cx="0" cy="0"/>
-        </a:xfrm>
-      </p:grpSpPr>
-      <p:sp>
-        <p:nvSpPr>
-          <p:cNvPr id="4" name="Title 3"/>
-          <p:cNvSpPr>
-            <a:spLocks noGrp="1"/>
-          </p:cNvSpPr>
-          <p:nvPr>
-            <p:ph type="title"/>
-          </p:nvPr>
-        </p:nvSpPr>
-        <p:spPr/>
-        <p:txBody>
-          <a:bodyPr/>
-          <a:lstStyle/>
-          <a:p>
-            <a:r>
-              <a:rPr lang="pt-PT" dirty="0"/>
-              <a:t>Requisitos do utilizador e de sistema funcionais – Cliente e Profissional</a:t>
-            </a:r>
-          </a:p>
-        </p:txBody>
-      </p:sp>
-      <p:pic>
-        <p:nvPicPr>
-          <p:cNvPr id="2" name="Picture 1"/>
-          <p:cNvPicPr>
-            <a:picLocks noChangeAspect="1"/>
-          </p:cNvPicPr>
-          <p:nvPr/>
-        </p:nvPicPr>
-        <p:blipFill>
-          <a:blip r:embed="rId2"/>
-          <a:stretch>
-            <a:fillRect/>
-          </a:stretch>
-        </p:blipFill>
-        <p:spPr>
-          <a:xfrm>
-            <a:off x="677334" y="1930400"/>
-            <a:ext cx="8843886" cy="3447370"/>
-          </a:xfrm>
-          <a:prstGeom prst="rect">
-            <a:avLst/>
-          </a:prstGeom>
-        </p:spPr>
-      </p:pic>
-    </p:spTree>
-    <p:extLst>
-      <p:ext uri="{BB962C8B-B14F-4D97-AF65-F5344CB8AC3E}">
-        <p14:creationId xmlns:p14="http://schemas.microsoft.com/office/powerpoint/2010/main" val="3707657907"/>
-      </p:ext>
-    </p:extLst>
-  </p:cSld>
-  <p:clrMapOvr>
-    <a:masterClrMapping/>
-  </p:clrMapOvr>
-  <mc:AlternateContent xmlns:mc="http://schemas.openxmlformats.org/markup-compatibility/2006" xmlns:p14="http://schemas.microsoft.com/office/powerpoint/2010/main">
-    <mc:Choice Requires="p14">
-      <p:transition spd="med" p14:dur="700">
-        <p:fade/>
-      </p:transition>
-    </mc:Choice>
-    <mc:Fallback xmlns="">
-      <p:transition spd="med">
-        <p:fade/>
-      </p:transition>
-    </mc:Fallback>
-  </mc:AlternateContent>
-  <p:timing>
-    <p:tnLst>
-      <p:par>
-        <p:cTn id="1" dur="indefinite" restart="never" nodeType="tmRoot"/>
-      </p:par>
-    </p:tnLst>
-  </p:timing>
-</p:sld>
-</file>
-
-<file path=ppt/slides/slide18.xml><?xml version="1.0" encoding="utf-8"?>
-<p:sld xmlns:a="http://schemas.openxmlformats.org/drawingml/2006/main" xmlns:r="http://schemas.openxmlformats.org/officeDocument/2006/relationships" xmlns:p="http://schemas.openxmlformats.org/presentationml/2006/main">
-  <p:cSld>
-    <p:spTree>
-      <p:nvGrpSpPr>
-        <p:cNvPr id="1" name=""/>
-        <p:cNvGrpSpPr/>
-        <p:nvPr/>
-      </p:nvGrpSpPr>
-      <p:grpSpPr>
-        <a:xfrm>
-          <a:off x="0" y="0"/>
-          <a:ext cx="0" cy="0"/>
-          <a:chOff x="0" y="0"/>
-          <a:chExt cx="0" cy="0"/>
-        </a:xfrm>
-      </p:grpSpPr>
-      <p:sp>
-        <p:nvSpPr>
-          <p:cNvPr id="4" name="Title 3"/>
-          <p:cNvSpPr>
-            <a:spLocks noGrp="1"/>
-          </p:cNvSpPr>
-          <p:nvPr>
-            <p:ph type="title"/>
-          </p:nvPr>
-        </p:nvSpPr>
-        <p:spPr/>
-        <p:txBody>
-          <a:bodyPr/>
-          <a:lstStyle/>
-          <a:p>
-            <a:r>
-              <a:rPr lang="pt-PT" dirty="0"/>
-              <a:t>Requisitos do utilizador e de sistema funcionais - Administrador</a:t>
-            </a:r>
-          </a:p>
-        </p:txBody>
-      </p:sp>
-      <p:pic>
-        <p:nvPicPr>
-          <p:cNvPr id="2" name="Picture 1"/>
-          <p:cNvPicPr>
-            <a:picLocks noChangeAspect="1"/>
-          </p:cNvPicPr>
-          <p:nvPr/>
-        </p:nvPicPr>
-        <p:blipFill rotWithShape="1">
-          <a:blip r:embed="rId2"/>
-          <a:srcRect t="19861"/>
-          <a:stretch/>
-        </p:blipFill>
-        <p:spPr>
-          <a:xfrm>
-            <a:off x="677334" y="2481942"/>
-            <a:ext cx="8153160" cy="3004457"/>
-          </a:xfrm>
-          <a:prstGeom prst="rect">
-            <a:avLst/>
-          </a:prstGeom>
-        </p:spPr>
-      </p:pic>
-    </p:spTree>
-    <p:extLst>
-      <p:ext uri="{BB962C8B-B14F-4D97-AF65-F5344CB8AC3E}">
-        <p14:creationId xmlns:p14="http://schemas.microsoft.com/office/powerpoint/2010/main" val="2694045920"/>
-      </p:ext>
-    </p:extLst>
-  </p:cSld>
-  <p:clrMapOvr>
-    <a:masterClrMapping/>
-  </p:clrMapOvr>
-  <mc:AlternateContent xmlns:mc="http://schemas.openxmlformats.org/markup-compatibility/2006" xmlns:p14="http://schemas.microsoft.com/office/powerpoint/2010/main">
-    <mc:Choice Requires="p14">
-      <p:transition spd="med" p14:dur="700">
-        <p:fade/>
-      </p:transition>
-    </mc:Choice>
-    <mc:Fallback xmlns="">
-      <p:transition spd="med">
-        <p:fade/>
-      </p:transition>
-    </mc:Fallback>
-  </mc:AlternateContent>
-  <p:timing>
-    <p:tnLst>
-      <p:par>
-        <p:cTn id="1" dur="indefinite" restart="never" nodeType="tmRoot"/>
-      </p:par>
-    </p:tnLst>
-  </p:timing>
-</p:sld>
-</file>
-
-<file path=ppt/slides/slide19.xml><?xml version="1.0" encoding="utf-8"?>
-<p:sld xmlns:a="http://schemas.openxmlformats.org/drawingml/2006/main" xmlns:r="http://schemas.openxmlformats.org/officeDocument/2006/relationships" xmlns:p="http://schemas.openxmlformats.org/presentationml/2006/main">
-  <p:cSld>
-    <p:spTree>
-      <p:nvGrpSpPr>
-        <p:cNvPr id="1" name=""/>
-        <p:cNvGrpSpPr/>
-        <p:nvPr/>
-      </p:nvGrpSpPr>
-      <p:grpSpPr>
-        <a:xfrm>
-          <a:off x="0" y="0"/>
-          <a:ext cx="0" cy="0"/>
-          <a:chOff x="0" y="0"/>
-          <a:chExt cx="0" cy="0"/>
-        </a:xfrm>
-      </p:grpSpPr>
-      <p:sp>
-        <p:nvSpPr>
-          <p:cNvPr id="4" name="Title 3"/>
-          <p:cNvSpPr>
-            <a:spLocks noGrp="1"/>
-          </p:cNvSpPr>
-          <p:nvPr>
-            <p:ph type="title"/>
-          </p:nvPr>
-        </p:nvSpPr>
-        <p:spPr/>
-        <p:txBody>
-          <a:bodyPr/>
-          <a:lstStyle/>
-          <a:p>
-            <a:r>
-              <a:rPr lang="pt-PT" dirty="0"/>
-              <a:t>Requisitos do utilizador e de sistema funcionais – Administrador</a:t>
-            </a:r>
-          </a:p>
-        </p:txBody>
-      </p:sp>
-      <p:pic>
-        <p:nvPicPr>
-          <p:cNvPr id="2" name="Picture 1"/>
-          <p:cNvPicPr>
-            <a:picLocks noChangeAspect="1"/>
-          </p:cNvPicPr>
-          <p:nvPr/>
-        </p:nvPicPr>
-        <p:blipFill>
-          <a:blip r:embed="rId2"/>
-          <a:stretch>
-            <a:fillRect/>
-          </a:stretch>
-        </p:blipFill>
-        <p:spPr>
-          <a:xfrm>
-            <a:off x="677334" y="1930400"/>
-            <a:ext cx="6402417" cy="4707975"/>
-          </a:xfrm>
-          <a:prstGeom prst="rect">
-            <a:avLst/>
-          </a:prstGeom>
-        </p:spPr>
-      </p:pic>
-    </p:spTree>
-    <p:extLst>
-      <p:ext uri="{BB962C8B-B14F-4D97-AF65-F5344CB8AC3E}">
-        <p14:creationId xmlns:p14="http://schemas.microsoft.com/office/powerpoint/2010/main" val="4265666168"/>
-      </p:ext>
-    </p:extLst>
-  </p:cSld>
-  <p:clrMapOvr>
-    <a:masterClrMapping/>
-  </p:clrMapOvr>
-  <mc:AlternateContent xmlns:mc="http://schemas.openxmlformats.org/markup-compatibility/2006" xmlns:p14="http://schemas.microsoft.com/office/powerpoint/2010/main">
-    <mc:Choice Requires="p14">
-      <p:transition spd="med" p14:dur="700">
-        <p:fade/>
-      </p:transition>
-    </mc:Choice>
-    <mc:Fallback xmlns="">
-      <p:transition spd="med">
-        <p:fade/>
-      </p:transition>
-    </mc:Fallback>
-  </mc:AlternateContent>
-  <p:timing>
-    <p:tnLst>
-      <p:par>
-        <p:cTn id="1" dur="indefinite" restart="never" nodeType="tmRoot"/>
-      </p:par>
-    </p:tnLst>
-  </p:timing>
-</p:sld>
-</file>
-
-<file path=ppt/slides/slide2.xml><?xml version="1.0" encoding="utf-8"?>
-<p:sld xmlns:a="http://schemas.openxmlformats.org/drawingml/2006/main" xmlns:r="http://schemas.openxmlformats.org/officeDocument/2006/relationships" xmlns:p="http://schemas.openxmlformats.org/presentationml/2006/main">
-  <p:cSld>
-    <p:spTree>
-      <p:nvGrpSpPr>
-        <p:cNvPr id="1" name=""/>
-        <p:cNvGrpSpPr/>
-        <p:nvPr/>
-      </p:nvGrpSpPr>
-      <p:grpSpPr>
-        <a:xfrm>
-          <a:off x="0" y="0"/>
-          <a:ext cx="0" cy="0"/>
-          <a:chOff x="0" y="0"/>
-          <a:chExt cx="0" cy="0"/>
-        </a:xfrm>
-      </p:grpSpPr>
-      <p:sp>
-        <p:nvSpPr>
-          <p:cNvPr id="2" name="Title 1"/>
-          <p:cNvSpPr>
-            <a:spLocks noGrp="1"/>
-          </p:cNvSpPr>
-          <p:nvPr>
-            <p:ph type="title"/>
-          </p:nvPr>
-        </p:nvSpPr>
-        <p:spPr/>
-        <p:txBody>
-          <a:bodyPr/>
-          <a:lstStyle/>
-          <a:p>
-            <a:r>
-              <a:rPr lang="pt-PT" dirty="0"/>
-              <a:t>Parte I</a:t>
-            </a:r>
-          </a:p>
-        </p:txBody>
-      </p:sp>
-      <p:sp>
-        <p:nvSpPr>
-          <p:cNvPr id="3" name="Text Placeholder 2"/>
-          <p:cNvSpPr>
-            <a:spLocks noGrp="1"/>
-          </p:cNvSpPr>
-          <p:nvPr>
-            <p:ph type="body" idx="1"/>
-          </p:nvPr>
-        </p:nvSpPr>
-        <p:spPr/>
-        <p:txBody>
-          <a:bodyPr/>
-          <a:lstStyle/>
-          <a:p>
-            <a:r>
-              <a:rPr lang="pt-PT" dirty="0"/>
-              <a:t>Fundamentação</a:t>
-            </a:r>
-          </a:p>
-        </p:txBody>
-      </p:sp>
-    </p:spTree>
-    <p:extLst>
-      <p:ext uri="{BB962C8B-B14F-4D97-AF65-F5344CB8AC3E}">
-        <p14:creationId xmlns:p14="http://schemas.microsoft.com/office/powerpoint/2010/main" val="2134899933"/>
-      </p:ext>
-    </p:extLst>
-  </p:cSld>
-  <p:clrMapOvr>
-    <a:masterClrMapping/>
-  </p:clrMapOvr>
-  <mc:AlternateContent xmlns:mc="http://schemas.openxmlformats.org/markup-compatibility/2006" xmlns:p14="http://schemas.microsoft.com/office/powerpoint/2010/main">
-    <mc:Choice Requires="p14">
-      <p:transition spd="med" p14:dur="700">
-        <p:fade/>
-      </p:transition>
-    </mc:Choice>
-    <mc:Fallback xmlns="">
-      <p:transition spd="med">
-        <p:fade/>
-      </p:transition>
-    </mc:Fallback>
-  </mc:AlternateContent>
-  <p:timing>
-    <p:tnLst>
-      <p:par>
-        <p:cTn id="1" dur="indefinite" restart="never" nodeType="tmRoot"/>
-      </p:par>
-    </p:tnLst>
-  </p:timing>
-</p:sld>
-</file>
-
-<file path=ppt/slides/slide20.xml><?xml version="1.0" encoding="utf-8"?>
-<p:sld xmlns:a="http://schemas.openxmlformats.org/drawingml/2006/main" xmlns:r="http://schemas.openxmlformats.org/officeDocument/2006/relationships" xmlns:p="http://schemas.openxmlformats.org/presentationml/2006/main">
-  <p:cSld>
-    <p:spTree>
-      <p:nvGrpSpPr>
-        <p:cNvPr id="1" name=""/>
-        <p:cNvGrpSpPr/>
-        <p:nvPr/>
-      </p:nvGrpSpPr>
-      <p:grpSpPr>
-        <a:xfrm>
-          <a:off x="0" y="0"/>
-          <a:ext cx="0" cy="0"/>
-          <a:chOff x="0" y="0"/>
-          <a:chExt cx="0" cy="0"/>
-        </a:xfrm>
-      </p:grpSpPr>
-      <p:sp>
-        <p:nvSpPr>
-          <p:cNvPr id="4" name="Title 3"/>
-          <p:cNvSpPr>
-            <a:spLocks noGrp="1"/>
-          </p:cNvSpPr>
-          <p:nvPr>
-            <p:ph type="title"/>
-          </p:nvPr>
-        </p:nvSpPr>
-        <p:spPr/>
-        <p:txBody>
-          <a:bodyPr/>
-          <a:lstStyle/>
-          <a:p>
-            <a:r>
-              <a:rPr lang="pt-PT" dirty="0"/>
-              <a:t>Requisitos do utilizador e de sistema funcionais - Administrador</a:t>
-            </a:r>
-          </a:p>
-        </p:txBody>
-      </p:sp>
-      <p:pic>
-        <p:nvPicPr>
-          <p:cNvPr id="2" name="Picture 1"/>
-          <p:cNvPicPr>
-            <a:picLocks noChangeAspect="1"/>
-          </p:cNvPicPr>
-          <p:nvPr/>
-        </p:nvPicPr>
-        <p:blipFill>
-          <a:blip r:embed="rId2"/>
-          <a:stretch>
-            <a:fillRect/>
-          </a:stretch>
-        </p:blipFill>
-        <p:spPr>
-          <a:xfrm>
-            <a:off x="677334" y="2400300"/>
-            <a:ext cx="8271403" cy="2982676"/>
-          </a:xfrm>
-          <a:prstGeom prst="rect">
-            <a:avLst/>
-          </a:prstGeom>
-        </p:spPr>
-      </p:pic>
-    </p:spTree>
-    <p:extLst>
-      <p:ext uri="{BB962C8B-B14F-4D97-AF65-F5344CB8AC3E}">
-        <p14:creationId xmlns:p14="http://schemas.microsoft.com/office/powerpoint/2010/main" val="3924373962"/>
-      </p:ext>
-    </p:extLst>
-  </p:cSld>
-  <p:clrMapOvr>
-    <a:masterClrMapping/>
-  </p:clrMapOvr>
-  <mc:AlternateContent xmlns:mc="http://schemas.openxmlformats.org/markup-compatibility/2006" xmlns:p14="http://schemas.microsoft.com/office/powerpoint/2010/main">
-    <mc:Choice Requires="p14">
-      <p:transition spd="med" p14:dur="700">
-        <p:fade/>
-      </p:transition>
-    </mc:Choice>
-    <mc:Fallback xmlns="">
-      <p:transition spd="med">
-        <p:fade/>
-      </p:transition>
-    </mc:Fallback>
-  </mc:AlternateContent>
-  <p:timing>
-    <p:tnLst>
-      <p:par>
-        <p:cTn id="1" dur="indefinite" restart="never" nodeType="tmRoot"/>
-      </p:par>
-    </p:tnLst>
-  </p:timing>
-</p:sld>
-</file>
-
-<file path=ppt/slides/slide21.xml><?xml version="1.0" encoding="utf-8"?>
-<p:sld xmlns:a="http://schemas.openxmlformats.org/drawingml/2006/main" xmlns:r="http://schemas.openxmlformats.org/officeDocument/2006/relationships" xmlns:p="http://schemas.openxmlformats.org/presentationml/2006/main">
-  <p:cSld>
-    <p:spTree>
-      <p:nvGrpSpPr>
-        <p:cNvPr id="1" name=""/>
-        <p:cNvGrpSpPr/>
-        <p:nvPr/>
-      </p:nvGrpSpPr>
-      <p:grpSpPr>
-        <a:xfrm>
-          <a:off x="0" y="0"/>
-          <a:ext cx="0" cy="0"/>
-          <a:chOff x="0" y="0"/>
-          <a:chExt cx="0" cy="0"/>
-        </a:xfrm>
-      </p:grpSpPr>
-      <p:sp>
-        <p:nvSpPr>
-          <p:cNvPr id="4" name="Title 3"/>
-          <p:cNvSpPr>
-            <a:spLocks noGrp="1"/>
-          </p:cNvSpPr>
-          <p:nvPr>
-            <p:ph type="title"/>
-          </p:nvPr>
-        </p:nvSpPr>
-        <p:spPr/>
-        <p:txBody>
-          <a:bodyPr/>
-          <a:lstStyle/>
-          <a:p>
-            <a:r>
-              <a:rPr lang="pt-PT" dirty="0"/>
-              <a:t>Requisitos de </a:t>
-            </a:r>
-            <a:r>
-              <a:rPr lang="pt-PT" dirty="0" smtClean="0"/>
-              <a:t>sistema </a:t>
-            </a:r>
-            <a:r>
-              <a:rPr lang="pt-PT" dirty="0"/>
-              <a:t>não-funcionais</a:t>
-            </a:r>
-          </a:p>
-        </p:txBody>
-      </p:sp>
-      <p:sp>
-        <p:nvSpPr>
-          <p:cNvPr id="2" name="Content Placeholder 1"/>
-          <p:cNvSpPr>
-            <a:spLocks noGrp="1"/>
-          </p:cNvSpPr>
-          <p:nvPr>
-            <p:ph idx="1"/>
-          </p:nvPr>
-        </p:nvSpPr>
-        <p:spPr/>
-        <p:txBody>
-          <a:bodyPr>
-            <a:normAutofit/>
-          </a:bodyPr>
-          <a:lstStyle/>
-          <a:p>
-            <a:pPr algn="just"/>
-            <a:r>
-              <a:rPr lang="pt-PT" sz="2800" dirty="0"/>
-              <a:t>Organizacionais</a:t>
-            </a:r>
-          </a:p>
-          <a:p>
-            <a:pPr lvl="1" algn="just"/>
-            <a:r>
-              <a:rPr lang="pt-PT" sz="2400" dirty="0"/>
-              <a:t>O utilizador deve autenticar-se com o seu username e a password respetiva;</a:t>
-            </a:r>
-          </a:p>
-          <a:p>
-            <a:pPr lvl="1" algn="just"/>
-            <a:r>
-              <a:rPr lang="pt-PT" sz="2400" dirty="0"/>
-              <a:t>A linguagem de programação a utilizar será C# em cooperação com a framework ASP.NET;</a:t>
-            </a:r>
-          </a:p>
-          <a:p>
-            <a:pPr lvl="1" algn="just"/>
-            <a:r>
-              <a:rPr lang="pt-PT" sz="2400" dirty="0"/>
-              <a:t>O SGBD a usar deve ser o SQL Server;</a:t>
-            </a:r>
-          </a:p>
-          <a:p>
-            <a:pPr lvl="1" algn="just"/>
-            <a:r>
-              <a:rPr lang="pt-PT" sz="2400" dirty="0"/>
-              <a:t>A aplicação será desenvolvida para web;</a:t>
-            </a:r>
-          </a:p>
-        </p:txBody>
-      </p:sp>
-    </p:spTree>
-    <p:extLst>
-      <p:ext uri="{BB962C8B-B14F-4D97-AF65-F5344CB8AC3E}">
-        <p14:creationId xmlns:p14="http://schemas.microsoft.com/office/powerpoint/2010/main" val="1620922798"/>
-      </p:ext>
-    </p:extLst>
-  </p:cSld>
-  <p:clrMapOvr>
-    <a:masterClrMapping/>
-  </p:clrMapOvr>
-  <mc:AlternateContent xmlns:mc="http://schemas.openxmlformats.org/markup-compatibility/2006" xmlns:p14="http://schemas.microsoft.com/office/powerpoint/2010/main">
-    <mc:Choice Requires="p14">
-      <p:transition spd="med" p14:dur="700">
-        <p:fade/>
-      </p:transition>
-    </mc:Choice>
-    <mc:Fallback xmlns="">
-      <p:transition spd="med">
-        <p:fade/>
-      </p:transition>
-    </mc:Fallback>
-  </mc:AlternateContent>
-  <p:timing>
-    <p:tnLst>
-      <p:par>
-        <p:cTn id="1" dur="indefinite" restart="never" nodeType="tmRoot"/>
-      </p:par>
-    </p:tnLst>
-  </p:timing>
-</p:sld>
-</file>
-
-<file path=ppt/slides/slide22.xml><?xml version="1.0" encoding="utf-8"?>
-<p:sld xmlns:a="http://schemas.openxmlformats.org/drawingml/2006/main" xmlns:r="http://schemas.openxmlformats.org/officeDocument/2006/relationships" xmlns:p="http://schemas.openxmlformats.org/presentationml/2006/main">
-  <p:cSld>
-    <p:spTree>
-      <p:nvGrpSpPr>
-        <p:cNvPr id="1" name=""/>
-        <p:cNvGrpSpPr/>
-        <p:nvPr/>
-      </p:nvGrpSpPr>
-      <p:grpSpPr>
-        <a:xfrm>
-          <a:off x="0" y="0"/>
-          <a:ext cx="0" cy="0"/>
-          <a:chOff x="0" y="0"/>
-          <a:chExt cx="0" cy="0"/>
-        </a:xfrm>
-      </p:grpSpPr>
-      <p:sp>
-        <p:nvSpPr>
-          <p:cNvPr id="4" name="Title 3"/>
-          <p:cNvSpPr>
-            <a:spLocks noGrp="1"/>
-          </p:cNvSpPr>
-          <p:nvPr>
-            <p:ph type="title"/>
-          </p:nvPr>
-        </p:nvSpPr>
-        <p:spPr/>
-        <p:txBody>
-          <a:bodyPr/>
-          <a:lstStyle/>
-          <a:p>
-            <a:r>
-              <a:rPr lang="pt-PT" dirty="0"/>
-              <a:t>Requisitos de </a:t>
-            </a:r>
-            <a:r>
-              <a:rPr lang="pt-PT" dirty="0" smtClean="0"/>
-              <a:t>sistema </a:t>
-            </a:r>
-            <a:r>
-              <a:rPr lang="pt-PT" dirty="0"/>
-              <a:t>não-funcionais</a:t>
-            </a:r>
-          </a:p>
-        </p:txBody>
-      </p:sp>
-      <p:sp>
-        <p:nvSpPr>
-          <p:cNvPr id="2" name="Content Placeholder 1"/>
-          <p:cNvSpPr>
-            <a:spLocks noGrp="1"/>
-          </p:cNvSpPr>
-          <p:nvPr>
-            <p:ph idx="1"/>
-          </p:nvPr>
-        </p:nvSpPr>
-        <p:spPr/>
-        <p:txBody>
-          <a:bodyPr>
-            <a:normAutofit/>
-          </a:bodyPr>
-          <a:lstStyle/>
-          <a:p>
-            <a:pPr algn="just"/>
-            <a:r>
-              <a:rPr lang="pt-PT" sz="2800" dirty="0"/>
-              <a:t>Externos</a:t>
-            </a:r>
-          </a:p>
-          <a:p>
-            <a:pPr lvl="1" algn="just"/>
-            <a:r>
-              <a:rPr lang="pt-PT" sz="2400" dirty="0"/>
-              <a:t>O sistema deve recorrer a uma API de mapas para representar a localização do trabalho ou até mesmo para representar a sua própria localização;</a:t>
-            </a:r>
-          </a:p>
-          <a:p>
-            <a:pPr lvl="1" algn="just"/>
-            <a:r>
-              <a:rPr lang="pt-PT" sz="2400" dirty="0"/>
-              <a:t>O sistema não deve apresentar aos utilizadores dados privados acerca dos restantes utilizadores, sendo que, cada utilizador só pode ver os seus dados e aqueles que são públicos; </a:t>
-            </a:r>
-          </a:p>
-        </p:txBody>
-      </p:sp>
-    </p:spTree>
-    <p:extLst>
-      <p:ext uri="{BB962C8B-B14F-4D97-AF65-F5344CB8AC3E}">
-        <p14:creationId xmlns:p14="http://schemas.microsoft.com/office/powerpoint/2010/main" val="374380089"/>
-      </p:ext>
-    </p:extLst>
-  </p:cSld>
-  <p:clrMapOvr>
-    <a:masterClrMapping/>
-  </p:clrMapOvr>
-  <mc:AlternateContent xmlns:mc="http://schemas.openxmlformats.org/markup-compatibility/2006" xmlns:p14="http://schemas.microsoft.com/office/powerpoint/2010/main">
-    <mc:Choice Requires="p14">
-      <p:transition spd="med" p14:dur="700">
-        <p:fade/>
-      </p:transition>
-    </mc:Choice>
-    <mc:Fallback xmlns="">
-      <p:transition spd="med">
-        <p:fade/>
-      </p:transition>
-    </mc:Fallback>
-  </mc:AlternateContent>
-  <p:timing>
-    <p:tnLst>
-      <p:par>
-        <p:cTn id="1" dur="indefinite" restart="never" nodeType="tmRoot"/>
-      </p:par>
-    </p:tnLst>
-  </p:timing>
-</p:sld>
-</file>
-
-<file path=ppt/slides/slide23.xml><?xml version="1.0" encoding="utf-8"?>
-<p:sld xmlns:a="http://schemas.openxmlformats.org/drawingml/2006/main" xmlns:r="http://schemas.openxmlformats.org/officeDocument/2006/relationships" xmlns:p="http://schemas.openxmlformats.org/presentationml/2006/main">
-  <p:cSld>
-    <p:spTree>
-      <p:nvGrpSpPr>
-        <p:cNvPr id="1" name=""/>
-        <p:cNvGrpSpPr/>
-        <p:nvPr/>
-      </p:nvGrpSpPr>
-      <p:grpSpPr>
-        <a:xfrm>
-          <a:off x="0" y="0"/>
-          <a:ext cx="0" cy="0"/>
-          <a:chOff x="0" y="0"/>
-          <a:chExt cx="0" cy="0"/>
-        </a:xfrm>
-      </p:grpSpPr>
-      <p:sp>
-        <p:nvSpPr>
-          <p:cNvPr id="4" name="Title 3"/>
-          <p:cNvSpPr>
-            <a:spLocks noGrp="1"/>
-          </p:cNvSpPr>
-          <p:nvPr>
-            <p:ph type="title"/>
-          </p:nvPr>
-        </p:nvSpPr>
-        <p:spPr/>
-        <p:txBody>
-          <a:bodyPr/>
-          <a:lstStyle/>
-          <a:p>
-            <a:r>
-              <a:rPr lang="pt-PT" dirty="0"/>
-              <a:t>Requisitos de </a:t>
-            </a:r>
-            <a:r>
-              <a:rPr lang="pt-PT" dirty="0" smtClean="0"/>
-              <a:t>sistema </a:t>
-            </a:r>
-            <a:r>
-              <a:rPr lang="pt-PT" dirty="0"/>
-              <a:t>não-funcionais</a:t>
-            </a:r>
-          </a:p>
-        </p:txBody>
-      </p:sp>
-      <p:sp>
-        <p:nvSpPr>
-          <p:cNvPr id="2" name="Content Placeholder 1"/>
-          <p:cNvSpPr>
-            <a:spLocks noGrp="1"/>
-          </p:cNvSpPr>
-          <p:nvPr>
-            <p:ph idx="1"/>
-          </p:nvPr>
-        </p:nvSpPr>
-        <p:spPr>
-          <a:xfrm>
-            <a:off x="677334" y="2160589"/>
-            <a:ext cx="8596668" cy="4352178"/>
-          </a:xfrm>
-        </p:spPr>
-        <p:txBody>
-          <a:bodyPr>
-            <a:normAutofit fontScale="92500"/>
-          </a:bodyPr>
-          <a:lstStyle/>
-          <a:p>
-            <a:pPr algn="just"/>
-            <a:r>
-              <a:rPr lang="pt-PT" sz="2800" dirty="0"/>
-              <a:t>Produto</a:t>
-            </a:r>
-          </a:p>
-          <a:p>
-            <a:pPr lvl="1" algn="just"/>
-            <a:r>
-              <a:rPr lang="pt-PT" sz="2400" dirty="0"/>
-              <a:t>O sistema deve estar disponível 24h por dia. No pior dos casos, espera-se uma disponibilidade média superior a 99%;</a:t>
-            </a:r>
-          </a:p>
-          <a:p>
-            <a:pPr lvl="1" algn="just"/>
-            <a:r>
-              <a:rPr lang="pt-PT" sz="2400" dirty="0"/>
-              <a:t>O sistema deve ser de fácil uso;</a:t>
-            </a:r>
-          </a:p>
-          <a:p>
-            <a:pPr lvl="1" algn="just"/>
-            <a:r>
-              <a:rPr lang="pt-PT" sz="2400" dirty="0"/>
-              <a:t>O sistema deve ser produzido de modo a ser executado em todos os browsers;</a:t>
-            </a:r>
-          </a:p>
-          <a:p>
-            <a:pPr lvl="1" algn="just"/>
-            <a:r>
-              <a:rPr lang="pt-PT" sz="2400" dirty="0"/>
-              <a:t>O sistema deve suportar o registo de 1000 utilizadores, no espaço de 1 ano;</a:t>
-            </a:r>
-          </a:p>
-          <a:p>
-            <a:pPr lvl="1" algn="just"/>
-            <a:r>
-              <a:rPr lang="pt-PT" sz="2400" dirty="0"/>
-              <a:t>O nível de satisfação dos utilizadores com a aplicação deverá ser elevado.</a:t>
-            </a:r>
-          </a:p>
-        </p:txBody>
-      </p:sp>
-    </p:spTree>
-    <p:extLst>
-      <p:ext uri="{BB962C8B-B14F-4D97-AF65-F5344CB8AC3E}">
-        <p14:creationId xmlns:p14="http://schemas.microsoft.com/office/powerpoint/2010/main" val="206296111"/>
-      </p:ext>
-    </p:extLst>
-  </p:cSld>
-  <p:clrMapOvr>
-    <a:masterClrMapping/>
-  </p:clrMapOvr>
-  <mc:AlternateContent xmlns:mc="http://schemas.openxmlformats.org/markup-compatibility/2006" xmlns:p14="http://schemas.microsoft.com/office/powerpoint/2010/main">
-    <mc:Choice Requires="p14">
-      <p:transition spd="med" p14:dur="700">
-        <p:fade/>
-      </p:transition>
-    </mc:Choice>
-    <mc:Fallback xmlns="">
-      <p:transition spd="med">
-        <p:fade/>
-      </p:transition>
-    </mc:Fallback>
-  </mc:AlternateContent>
-  <p:timing>
-    <p:tnLst>
-      <p:par>
-        <p:cTn id="1" dur="indefinite" restart="never" nodeType="tmRoot"/>
-      </p:par>
-    </p:tnLst>
-  </p:timing>
-</p:sld>
-</file>
-
-<file path=ppt/slides/slide24.xml><?xml version="1.0" encoding="utf-8"?>
-<p:sld xmlns:a="http://schemas.openxmlformats.org/drawingml/2006/main" xmlns:r="http://schemas.openxmlformats.org/officeDocument/2006/relationships" xmlns:p="http://schemas.openxmlformats.org/presentationml/2006/main">
-  <p:cSld>
-    <p:spTree>
-      <p:nvGrpSpPr>
-        <p:cNvPr id="1" name=""/>
-        <p:cNvGrpSpPr/>
-        <p:nvPr/>
-      </p:nvGrpSpPr>
-      <p:grpSpPr>
-        <a:xfrm>
-          <a:off x="0" y="0"/>
-          <a:ext cx="0" cy="0"/>
-          <a:chOff x="0" y="0"/>
-          <a:chExt cx="0" cy="0"/>
-        </a:xfrm>
-      </p:grpSpPr>
-      <p:sp>
-        <p:nvSpPr>
-          <p:cNvPr id="4" name="Title 3"/>
-          <p:cNvSpPr>
-            <a:spLocks noGrp="1"/>
-          </p:cNvSpPr>
-          <p:nvPr>
-            <p:ph type="title"/>
-          </p:nvPr>
-        </p:nvSpPr>
         <p:spPr>
           <a:xfrm>
             <a:off x="0" y="0"/>
@@ -8528,42 +7657,13 @@
               </a:ext>
             </a:extLst>
           </a:blip>
-          <a:srcRect l="-337" b="29091"/>
+          <a:srcRect l="-337" b="58384"/>
           <a:stretch/>
         </p:blipFill>
         <p:spPr>
           <a:xfrm>
-            <a:off x="0" y="695866"/>
-            <a:ext cx="5956503" cy="6162134"/>
-          </a:xfrm>
-          <a:prstGeom prst="rect">
-            <a:avLst/>
-          </a:prstGeom>
-        </p:spPr>
-      </p:pic>
-      <p:pic>
-        <p:nvPicPr>
-          <p:cNvPr id="3" name="Picture 2"/>
-          <p:cNvPicPr>
-            <a:picLocks noChangeAspect="1"/>
-          </p:cNvPicPr>
-          <p:nvPr/>
-        </p:nvPicPr>
-        <p:blipFill rotWithShape="1">
-          <a:blip r:embed="rId2">
-            <a:extLst>
-              <a:ext uri="{28A0092B-C50C-407E-A947-70E740481C1C}">
-                <a14:useLocalDpi xmlns:a14="http://schemas.microsoft.com/office/drawing/2010/main" val="0"/>
-              </a:ext>
-            </a:extLst>
-          </a:blip>
-          <a:srcRect t="46083" r="15453"/>
-          <a:stretch/>
-        </p:blipFill>
-        <p:spPr>
-          <a:xfrm>
-            <a:off x="6032192" y="1107644"/>
-            <a:ext cx="6159808" cy="5750356"/>
+            <a:off x="564445" y="978088"/>
+            <a:ext cx="8429403" cy="5117911"/>
           </a:xfrm>
           <a:prstGeom prst="rect">
             <a:avLst/>
@@ -8602,7 +7702,7 @@
 </p:sld>
 </file>
 
-<file path=ppt/slides/slide25.xml><?xml version="1.0" encoding="utf-8"?>
+<file path=ppt/slides/slide17.xml><?xml version="1.0" encoding="utf-8"?>
 <p:sld xmlns:a="http://schemas.openxmlformats.org/drawingml/2006/main" xmlns:r="http://schemas.openxmlformats.org/officeDocument/2006/relationships" xmlns:p="http://schemas.openxmlformats.org/presentationml/2006/main">
   <p:cSld>
     <p:spTree>
@@ -8770,231 +7870,7 @@
 </p:sld>
 </file>
 
-<file path=ppt/slides/slide26.xml><?xml version="1.0" encoding="utf-8"?>
-<p:sld xmlns:a="http://schemas.openxmlformats.org/drawingml/2006/main" xmlns:r="http://schemas.openxmlformats.org/officeDocument/2006/relationships" xmlns:p="http://schemas.openxmlformats.org/presentationml/2006/main">
-  <p:cSld>
-    <p:spTree>
-      <p:nvGrpSpPr>
-        <p:cNvPr id="1" name=""/>
-        <p:cNvGrpSpPr/>
-        <p:nvPr/>
-      </p:nvGrpSpPr>
-      <p:grpSpPr>
-        <a:xfrm>
-          <a:off x="0" y="0"/>
-          <a:ext cx="0" cy="0"/>
-          <a:chOff x="0" y="0"/>
-          <a:chExt cx="0" cy="0"/>
-        </a:xfrm>
-      </p:grpSpPr>
-      <p:sp>
-        <p:nvSpPr>
-          <p:cNvPr id="2" name="Title 1"/>
-          <p:cNvSpPr>
-            <a:spLocks noGrp="1"/>
-          </p:cNvSpPr>
-          <p:nvPr>
-            <p:ph type="title"/>
-          </p:nvPr>
-        </p:nvSpPr>
-        <p:spPr>
-          <a:xfrm>
-            <a:off x="677334" y="273698"/>
-            <a:ext cx="8596668" cy="1320800"/>
-          </a:xfrm>
-        </p:spPr>
-        <p:txBody>
-          <a:bodyPr/>
-          <a:lstStyle/>
-          <a:p>
-            <a:r>
-              <a:rPr lang="pt-PT" dirty="0"/>
-              <a:t>Especificação do Use Case</a:t>
-            </a:r>
-            <a:br>
-              <a:rPr lang="pt-PT" dirty="0"/>
-            </a:br>
-            <a:r>
-              <a:rPr lang="pt-PT" dirty="0"/>
-              <a:t>“Aceitar proposta de trabalho”</a:t>
-            </a:r>
-          </a:p>
-        </p:txBody>
-      </p:sp>
-      <p:pic>
-        <p:nvPicPr>
-          <p:cNvPr id="6" name="Content Placeholder 5"/>
-          <p:cNvPicPr>
-            <a:picLocks noGrp="1" noChangeAspect="1"/>
-          </p:cNvPicPr>
-          <p:nvPr>
-            <p:ph sz="half" idx="1"/>
-          </p:nvPr>
-        </p:nvPicPr>
-        <p:blipFill>
-          <a:blip r:embed="rId2">
-            <a:extLst>
-              <a:ext uri="{28A0092B-C50C-407E-A947-70E740481C1C}">
-                <a14:useLocalDpi xmlns:a14="http://schemas.microsoft.com/office/drawing/2010/main" val="0"/>
-              </a:ext>
-            </a:extLst>
-          </a:blip>
-          <a:stretch>
-            <a:fillRect/>
-          </a:stretch>
-        </p:blipFill>
-        <p:spPr>
-          <a:xfrm>
-            <a:off x="677334" y="1594498"/>
-            <a:ext cx="7020919" cy="4936931"/>
-          </a:xfrm>
-        </p:spPr>
-      </p:pic>
-    </p:spTree>
-    <p:extLst>
-      <p:ext uri="{BB962C8B-B14F-4D97-AF65-F5344CB8AC3E}">
-        <p14:creationId xmlns:p14="http://schemas.microsoft.com/office/powerpoint/2010/main" val="173754408"/>
-      </p:ext>
-    </p:extLst>
-  </p:cSld>
-  <p:clrMapOvr>
-    <a:masterClrMapping/>
-  </p:clrMapOvr>
-  <mc:AlternateContent xmlns:mc="http://schemas.openxmlformats.org/markup-compatibility/2006" xmlns:p14="http://schemas.microsoft.com/office/powerpoint/2010/main">
-    <mc:Choice Requires="p14">
-      <p:transition spd="med" p14:dur="700">
-        <p:fade/>
-      </p:transition>
-    </mc:Choice>
-    <mc:Fallback xmlns="">
-      <p:transition spd="med">
-        <p:fade/>
-      </p:transition>
-    </mc:Fallback>
-  </mc:AlternateContent>
-  <p:timing>
-    <p:tnLst>
-      <p:par>
-        <p:cTn id="1" dur="indefinite" restart="never" nodeType="tmRoot"/>
-      </p:par>
-    </p:tnLst>
-  </p:timing>
-</p:sld>
-</file>
-
-<file path=ppt/slides/slide27.xml><?xml version="1.0" encoding="utf-8"?>
-<p:sld xmlns:a="http://schemas.openxmlformats.org/drawingml/2006/main" xmlns:r="http://schemas.openxmlformats.org/officeDocument/2006/relationships" xmlns:p="http://schemas.openxmlformats.org/presentationml/2006/main">
-  <p:cSld>
-    <p:spTree>
-      <p:nvGrpSpPr>
-        <p:cNvPr id="1" name=""/>
-        <p:cNvGrpSpPr/>
-        <p:nvPr/>
-      </p:nvGrpSpPr>
-      <p:grpSpPr>
-        <a:xfrm>
-          <a:off x="0" y="0"/>
-          <a:ext cx="0" cy="0"/>
-          <a:chOff x="0" y="0"/>
-          <a:chExt cx="0" cy="0"/>
-        </a:xfrm>
-      </p:grpSpPr>
-      <p:sp>
-        <p:nvSpPr>
-          <p:cNvPr id="2" name="Title 1"/>
-          <p:cNvSpPr>
-            <a:spLocks noGrp="1"/>
-          </p:cNvSpPr>
-          <p:nvPr>
-            <p:ph type="title"/>
-          </p:nvPr>
-        </p:nvSpPr>
-        <p:spPr>
-          <a:xfrm>
-            <a:off x="677334" y="273698"/>
-            <a:ext cx="8596668" cy="1320800"/>
-          </a:xfrm>
-        </p:spPr>
-        <p:txBody>
-          <a:bodyPr/>
-          <a:lstStyle/>
-          <a:p>
-            <a:r>
-              <a:rPr lang="pt-PT" dirty="0"/>
-              <a:t>Especificação do Use Case</a:t>
-            </a:r>
-            <a:br>
-              <a:rPr lang="pt-PT" dirty="0"/>
-            </a:br>
-            <a:r>
-              <a:rPr lang="pt-PT" dirty="0"/>
-              <a:t>“Avaliar trabalho”</a:t>
-            </a:r>
-          </a:p>
-        </p:txBody>
-      </p:sp>
-      <p:pic>
-        <p:nvPicPr>
-          <p:cNvPr id="3" name="Content Placeholder 2"/>
-          <p:cNvPicPr>
-            <a:picLocks noGrp="1" noChangeAspect="1"/>
-          </p:cNvPicPr>
-          <p:nvPr>
-            <p:ph sz="half" idx="1"/>
-          </p:nvPr>
-        </p:nvPicPr>
-        <p:blipFill>
-          <a:blip r:embed="rId2">
-            <a:extLst>
-              <a:ext uri="{28A0092B-C50C-407E-A947-70E740481C1C}">
-                <a14:useLocalDpi xmlns:a14="http://schemas.microsoft.com/office/drawing/2010/main" val="0"/>
-              </a:ext>
-            </a:extLst>
-          </a:blip>
-          <a:stretch>
-            <a:fillRect/>
-          </a:stretch>
-        </p:blipFill>
-        <p:spPr>
-          <a:xfrm>
-            <a:off x="677334" y="1594498"/>
-            <a:ext cx="8564288" cy="4843624"/>
-          </a:xfrm>
-        </p:spPr>
-      </p:pic>
-    </p:spTree>
-    <p:extLst>
-      <p:ext uri="{BB962C8B-B14F-4D97-AF65-F5344CB8AC3E}">
-        <p14:creationId xmlns:p14="http://schemas.microsoft.com/office/powerpoint/2010/main" val="3346765317"/>
-      </p:ext>
-    </p:extLst>
-  </p:cSld>
-  <p:clrMapOvr>
-    <a:masterClrMapping/>
-  </p:clrMapOvr>
-  <mc:AlternateContent xmlns:mc="http://schemas.openxmlformats.org/markup-compatibility/2006" xmlns:p14="http://schemas.microsoft.com/office/powerpoint/2010/main">
-    <mc:Choice Requires="p14">
-      <p:transition spd="med" p14:dur="700">
-        <p:fade/>
-      </p:transition>
-    </mc:Choice>
-    <mc:Fallback xmlns="">
-      <p:transition spd="med">
-        <p:fade/>
-      </p:transition>
-    </mc:Fallback>
-  </mc:AlternateContent>
-  <p:timing>
-    <p:tnLst>
-      <p:par>
-        <p:cTn id="1" dur="indefinite" restart="never" nodeType="tmRoot"/>
-      </p:par>
-    </p:tnLst>
-  </p:timing>
-</p:sld>
-</file>
-
-<file path=ppt/slides/slide28.xml><?xml version="1.0" encoding="utf-8"?>
+<file path=ppt/slides/slide18.xml><?xml version="1.0" encoding="utf-8"?>
 <p:sld xmlns:a="http://schemas.openxmlformats.org/drawingml/2006/main" xmlns:r="http://schemas.openxmlformats.org/officeDocument/2006/relationships" xmlns:p="http://schemas.openxmlformats.org/presentationml/2006/main">
   <p:cSld>
     <p:spTree>
@@ -9162,495 +8038,7 @@
 </p:sld>
 </file>
 
-<file path=ppt/slides/slide29.xml><?xml version="1.0" encoding="utf-8"?>
-<p:sld xmlns:a="http://schemas.openxmlformats.org/drawingml/2006/main" xmlns:r="http://schemas.openxmlformats.org/officeDocument/2006/relationships" xmlns:p="http://schemas.openxmlformats.org/presentationml/2006/main">
-  <p:cSld>
-    <p:spTree>
-      <p:nvGrpSpPr>
-        <p:cNvPr id="1" name=""/>
-        <p:cNvGrpSpPr/>
-        <p:nvPr/>
-      </p:nvGrpSpPr>
-      <p:grpSpPr>
-        <a:xfrm>
-          <a:off x="0" y="0"/>
-          <a:ext cx="0" cy="0"/>
-          <a:chOff x="0" y="0"/>
-          <a:chExt cx="0" cy="0"/>
-        </a:xfrm>
-      </p:grpSpPr>
-      <p:sp>
-        <p:nvSpPr>
-          <p:cNvPr id="2" name="Title 1"/>
-          <p:cNvSpPr>
-            <a:spLocks noGrp="1"/>
-          </p:cNvSpPr>
-          <p:nvPr>
-            <p:ph type="title"/>
-          </p:nvPr>
-        </p:nvSpPr>
-        <p:spPr>
-          <a:xfrm>
-            <a:off x="677334" y="273698"/>
-            <a:ext cx="8596668" cy="1320800"/>
-          </a:xfrm>
-        </p:spPr>
-        <p:txBody>
-          <a:bodyPr/>
-          <a:lstStyle/>
-          <a:p>
-            <a:r>
-              <a:rPr lang="pt-PT" dirty="0"/>
-              <a:t>Diagrama de Sequência de Sistema</a:t>
-            </a:r>
-            <a:br>
-              <a:rPr lang="pt-PT" dirty="0"/>
-            </a:br>
-            <a:r>
-              <a:rPr lang="pt-PT" dirty="0"/>
-              <a:t>“Aceitar proposta de trabalho”</a:t>
-            </a:r>
-          </a:p>
-        </p:txBody>
-      </p:sp>
-      <p:sp>
-        <p:nvSpPr>
-          <p:cNvPr id="4" name="Content Placeholder 3"/>
-          <p:cNvSpPr>
-            <a:spLocks noGrp="1"/>
-          </p:cNvSpPr>
-          <p:nvPr>
-            <p:ph sz="half" idx="1"/>
-          </p:nvPr>
-        </p:nvSpPr>
-        <p:spPr/>
-        <p:txBody>
-          <a:bodyPr/>
-          <a:lstStyle/>
-          <a:p>
-            <a:endParaRPr lang="pt-PT" dirty="0"/>
-          </a:p>
-        </p:txBody>
-      </p:sp>
-      <p:sp>
-        <p:nvSpPr>
-          <p:cNvPr id="5" name="Content Placeholder 4"/>
-          <p:cNvSpPr>
-            <a:spLocks noGrp="1"/>
-          </p:cNvSpPr>
-          <p:nvPr>
-            <p:ph sz="half" idx="2"/>
-          </p:nvPr>
-        </p:nvSpPr>
-        <p:spPr/>
-        <p:txBody>
-          <a:bodyPr/>
-          <a:lstStyle/>
-          <a:p>
-            <a:endParaRPr lang="pt-PT" dirty="0"/>
-          </a:p>
-        </p:txBody>
-      </p:sp>
-      <p:pic>
-        <p:nvPicPr>
-          <p:cNvPr id="7" name="Picture 6"/>
-          <p:cNvPicPr>
-            <a:picLocks noChangeAspect="1"/>
-          </p:cNvPicPr>
-          <p:nvPr/>
-        </p:nvPicPr>
-        <p:blipFill>
-          <a:blip r:embed="rId2"/>
-          <a:stretch>
-            <a:fillRect/>
-          </a:stretch>
-        </p:blipFill>
-        <p:spPr>
-          <a:xfrm>
-            <a:off x="1797240" y="1608283"/>
-            <a:ext cx="6356855" cy="5149857"/>
-          </a:xfrm>
-          <a:prstGeom prst="rect">
-            <a:avLst/>
-          </a:prstGeom>
-        </p:spPr>
-      </p:pic>
-    </p:spTree>
-    <p:extLst>
-      <p:ext uri="{BB962C8B-B14F-4D97-AF65-F5344CB8AC3E}">
-        <p14:creationId xmlns:p14="http://schemas.microsoft.com/office/powerpoint/2010/main" val="2756160048"/>
-      </p:ext>
-    </p:extLst>
-  </p:cSld>
-  <p:clrMapOvr>
-    <a:masterClrMapping/>
-  </p:clrMapOvr>
-  <mc:AlternateContent xmlns:mc="http://schemas.openxmlformats.org/markup-compatibility/2006" xmlns:p14="http://schemas.microsoft.com/office/powerpoint/2010/main">
-    <mc:Choice Requires="p14">
-      <p:transition spd="med" p14:dur="700">
-        <p:fade/>
-      </p:transition>
-    </mc:Choice>
-    <mc:Fallback xmlns="">
-      <p:transition spd="med">
-        <p:fade/>
-      </p:transition>
-    </mc:Fallback>
-  </mc:AlternateContent>
-  <p:timing>
-    <p:tnLst>
-      <p:par>
-        <p:cTn id="1" dur="indefinite" restart="never" nodeType="tmRoot"/>
-      </p:par>
-    </p:tnLst>
-  </p:timing>
-</p:sld>
-</file>
-
-<file path=ppt/slides/slide3.xml><?xml version="1.0" encoding="utf-8"?>
-<p:sld xmlns:a="http://schemas.openxmlformats.org/drawingml/2006/main" xmlns:r="http://schemas.openxmlformats.org/officeDocument/2006/relationships" xmlns:p="http://schemas.openxmlformats.org/presentationml/2006/main">
-  <p:cSld>
-    <p:spTree>
-      <p:nvGrpSpPr>
-        <p:cNvPr id="1" name=""/>
-        <p:cNvGrpSpPr/>
-        <p:nvPr/>
-      </p:nvGrpSpPr>
-      <p:grpSpPr>
-        <a:xfrm>
-          <a:off x="0" y="0"/>
-          <a:ext cx="0" cy="0"/>
-          <a:chOff x="0" y="0"/>
-          <a:chExt cx="0" cy="0"/>
-        </a:xfrm>
-      </p:grpSpPr>
-      <p:sp>
-        <p:nvSpPr>
-          <p:cNvPr id="3" name="Marcador de Posição de Conteúdo 2">
-            <a:extLst>
-              <a:ext uri="{FF2B5EF4-FFF2-40B4-BE49-F238E27FC236}">
-                <a16:creationId xmlns:a16="http://schemas.microsoft.com/office/drawing/2014/main" id="{78155F68-0F43-4FE9-A743-20F9DAFEFA50}"/>
-              </a:ext>
-            </a:extLst>
-          </p:cNvPr>
-          <p:cNvSpPr>
-            <a:spLocks noGrp="1"/>
-          </p:cNvSpPr>
-          <p:nvPr>
-            <p:ph idx="1"/>
-          </p:nvPr>
-        </p:nvSpPr>
-        <p:spPr>
-          <a:xfrm>
-            <a:off x="677334" y="706583"/>
-            <a:ext cx="8596668" cy="5334780"/>
-          </a:xfrm>
-        </p:spPr>
-        <p:txBody>
-          <a:bodyPr>
-            <a:normAutofit/>
-          </a:bodyPr>
-          <a:lstStyle/>
-          <a:p>
-            <a:pPr>
-              <a:lnSpc>
-                <a:spcPct val="150000"/>
-              </a:lnSpc>
-            </a:pPr>
-            <a:r>
-              <a:rPr lang="pt-PT" sz="2000" dirty="0">
-                <a:solidFill>
-                  <a:schemeClr val="tx1"/>
-                </a:solidFill>
-              </a:rPr>
-              <a:t>Contextualização </a:t>
-            </a:r>
-          </a:p>
-          <a:p>
-            <a:pPr>
-              <a:lnSpc>
-                <a:spcPct val="150000"/>
-              </a:lnSpc>
-            </a:pPr>
-            <a:r>
-              <a:rPr lang="pt-PT" sz="2000" dirty="0">
-                <a:solidFill>
-                  <a:schemeClr val="tx1"/>
-                </a:solidFill>
-              </a:rPr>
-              <a:t>Motivação e Objetivos</a:t>
-            </a:r>
-          </a:p>
-          <a:p>
-            <a:pPr>
-              <a:lnSpc>
-                <a:spcPct val="150000"/>
-              </a:lnSpc>
-            </a:pPr>
-            <a:r>
-              <a:rPr lang="pt-PT" sz="2000" dirty="0">
-                <a:solidFill>
-                  <a:schemeClr val="tx1"/>
-                </a:solidFill>
-              </a:rPr>
-              <a:t>Definição da Identidade do Sistema a Desenvolver </a:t>
-            </a:r>
-          </a:p>
-          <a:p>
-            <a:pPr>
-              <a:lnSpc>
-                <a:spcPct val="150000"/>
-              </a:lnSpc>
-            </a:pPr>
-            <a:r>
-              <a:rPr lang="pt-PT" sz="2000" dirty="0">
-                <a:solidFill>
-                  <a:schemeClr val="tx1"/>
-                </a:solidFill>
-              </a:rPr>
-              <a:t>Análise de Viabilidade </a:t>
-            </a:r>
-          </a:p>
-          <a:p>
-            <a:pPr>
-              <a:lnSpc>
-                <a:spcPct val="150000"/>
-              </a:lnSpc>
-            </a:pPr>
-            <a:r>
-              <a:rPr lang="pt-PT" sz="2000" dirty="0">
-                <a:solidFill>
-                  <a:schemeClr val="tx1"/>
-                </a:solidFill>
-              </a:rPr>
-              <a:t>Identificação dos Recursos Necessários </a:t>
-            </a:r>
-          </a:p>
-          <a:p>
-            <a:pPr>
-              <a:lnSpc>
-                <a:spcPct val="150000"/>
-              </a:lnSpc>
-            </a:pPr>
-            <a:r>
-              <a:rPr lang="pt-PT" sz="2000" dirty="0">
-                <a:solidFill>
-                  <a:schemeClr val="tx1"/>
-                </a:solidFill>
-              </a:rPr>
-              <a:t>Modelo de Sistema </a:t>
-            </a:r>
-          </a:p>
-          <a:p>
-            <a:pPr>
-              <a:lnSpc>
-                <a:spcPct val="150000"/>
-              </a:lnSpc>
-            </a:pPr>
-            <a:r>
-              <a:rPr lang="pt-PT" sz="2000" dirty="0">
-                <a:solidFill>
-                  <a:schemeClr val="tx1"/>
-                </a:solidFill>
-              </a:rPr>
-              <a:t>Definição de Medidas de Sucesso </a:t>
-            </a:r>
-          </a:p>
-          <a:p>
-            <a:pPr>
-              <a:lnSpc>
-                <a:spcPct val="150000"/>
-              </a:lnSpc>
-            </a:pPr>
-            <a:r>
-              <a:rPr lang="pt-PT" sz="2000" dirty="0">
-                <a:solidFill>
-                  <a:schemeClr val="tx1"/>
-                </a:solidFill>
-              </a:rPr>
-              <a:t>Plano de Desenvolvimento </a:t>
-            </a:r>
-          </a:p>
-        </p:txBody>
-      </p:sp>
-    </p:spTree>
-    <p:extLst>
-      <p:ext uri="{BB962C8B-B14F-4D97-AF65-F5344CB8AC3E}">
-        <p14:creationId xmlns:p14="http://schemas.microsoft.com/office/powerpoint/2010/main" val="482868652"/>
-      </p:ext>
-    </p:extLst>
-  </p:cSld>
-  <p:clrMapOvr>
-    <a:masterClrMapping/>
-  </p:clrMapOvr>
-  <mc:AlternateContent xmlns:mc="http://schemas.openxmlformats.org/markup-compatibility/2006" xmlns:p14="http://schemas.microsoft.com/office/powerpoint/2010/main">
-    <mc:Choice Requires="p14">
-      <p:transition spd="med" p14:dur="700">
-        <p:fade/>
-      </p:transition>
-    </mc:Choice>
-    <mc:Fallback xmlns="">
-      <p:transition spd="med">
-        <p:fade/>
-      </p:transition>
-    </mc:Fallback>
-  </mc:AlternateContent>
-  <p:timing>
-    <p:tnLst>
-      <p:par>
-        <p:cTn id="1" dur="indefinite" restart="never" nodeType="tmRoot"/>
-      </p:par>
-    </p:tnLst>
-  </p:timing>
-</p:sld>
-</file>
-
-<file path=ppt/slides/slide30.xml><?xml version="1.0" encoding="utf-8"?>
-<p:sld xmlns:a="http://schemas.openxmlformats.org/drawingml/2006/main" xmlns:r="http://schemas.openxmlformats.org/officeDocument/2006/relationships" xmlns:p="http://schemas.openxmlformats.org/presentationml/2006/main">
-  <p:cSld>
-    <p:spTree>
-      <p:nvGrpSpPr>
-        <p:cNvPr id="1" name=""/>
-        <p:cNvGrpSpPr/>
-        <p:nvPr/>
-      </p:nvGrpSpPr>
-      <p:grpSpPr>
-        <a:xfrm>
-          <a:off x="0" y="0"/>
-          <a:ext cx="0" cy="0"/>
-          <a:chOff x="0" y="0"/>
-          <a:chExt cx="0" cy="0"/>
-        </a:xfrm>
-      </p:grpSpPr>
-      <p:sp>
-        <p:nvSpPr>
-          <p:cNvPr id="2" name="Title 1"/>
-          <p:cNvSpPr>
-            <a:spLocks noGrp="1"/>
-          </p:cNvSpPr>
-          <p:nvPr>
-            <p:ph type="title"/>
-          </p:nvPr>
-        </p:nvSpPr>
-        <p:spPr>
-          <a:xfrm>
-            <a:off x="677334" y="273698"/>
-            <a:ext cx="8596668" cy="1320800"/>
-          </a:xfrm>
-        </p:spPr>
-        <p:txBody>
-          <a:bodyPr/>
-          <a:lstStyle/>
-          <a:p>
-            <a:r>
-              <a:rPr lang="pt-PT" dirty="0"/>
-              <a:t>Diagrama de Sequência de Sistema</a:t>
-            </a:r>
-            <a:br>
-              <a:rPr lang="pt-PT" dirty="0"/>
-            </a:br>
-            <a:r>
-              <a:rPr lang="pt-PT" dirty="0"/>
-              <a:t>“Avaliar trabalho”</a:t>
-            </a:r>
-          </a:p>
-        </p:txBody>
-      </p:sp>
-      <p:sp>
-        <p:nvSpPr>
-          <p:cNvPr id="4" name="Content Placeholder 3"/>
-          <p:cNvSpPr>
-            <a:spLocks noGrp="1"/>
-          </p:cNvSpPr>
-          <p:nvPr>
-            <p:ph sz="half" idx="1"/>
-          </p:nvPr>
-        </p:nvSpPr>
-        <p:spPr/>
-        <p:txBody>
-          <a:bodyPr/>
-          <a:lstStyle/>
-          <a:p>
-            <a:endParaRPr lang="pt-PT" dirty="0"/>
-          </a:p>
-        </p:txBody>
-      </p:sp>
-      <p:sp>
-        <p:nvSpPr>
-          <p:cNvPr id="5" name="Content Placeholder 4"/>
-          <p:cNvSpPr>
-            <a:spLocks noGrp="1"/>
-          </p:cNvSpPr>
-          <p:nvPr>
-            <p:ph sz="half" idx="2"/>
-          </p:nvPr>
-        </p:nvSpPr>
-        <p:spPr/>
-        <p:txBody>
-          <a:bodyPr/>
-          <a:lstStyle/>
-          <a:p>
-            <a:endParaRPr lang="pt-PT" dirty="0"/>
-          </a:p>
-        </p:txBody>
-      </p:sp>
-      <p:pic>
-        <p:nvPicPr>
-          <p:cNvPr id="7" name="Picture 6"/>
-          <p:cNvPicPr>
-            <a:picLocks noChangeAspect="1"/>
-          </p:cNvPicPr>
-          <p:nvPr/>
-        </p:nvPicPr>
-        <p:blipFill>
-          <a:blip r:embed="rId2"/>
-          <a:stretch>
-            <a:fillRect/>
-          </a:stretch>
-        </p:blipFill>
-        <p:spPr>
-          <a:xfrm>
-            <a:off x="2461323" y="1594498"/>
-            <a:ext cx="5028689" cy="5277316"/>
-          </a:xfrm>
-          <a:prstGeom prst="rect">
-            <a:avLst/>
-          </a:prstGeom>
-        </p:spPr>
-      </p:pic>
-    </p:spTree>
-    <p:extLst>
-      <p:ext uri="{BB962C8B-B14F-4D97-AF65-F5344CB8AC3E}">
-        <p14:creationId xmlns:p14="http://schemas.microsoft.com/office/powerpoint/2010/main" val="198381671"/>
-      </p:ext>
-    </p:extLst>
-  </p:cSld>
-  <p:clrMapOvr>
-    <a:masterClrMapping/>
-  </p:clrMapOvr>
-  <mc:AlternateContent xmlns:mc="http://schemas.openxmlformats.org/markup-compatibility/2006" xmlns:p14="http://schemas.microsoft.com/office/powerpoint/2010/main">
-    <mc:Choice Requires="p14">
-      <p:transition spd="med" p14:dur="700">
-        <p:fade/>
-      </p:transition>
-    </mc:Choice>
-    <mc:Fallback xmlns="">
-      <p:transition spd="med">
-        <p:fade/>
-      </p:transition>
-    </mc:Fallback>
-  </mc:AlternateContent>
-  <p:timing>
-    <p:tnLst>
-      <p:par>
-        <p:cTn id="1" dur="indefinite" restart="never" nodeType="tmRoot"/>
-      </p:par>
-    </p:tnLst>
-  </p:timing>
-</p:sld>
-</file>
-
-<file path=ppt/slides/slide31.xml><?xml version="1.0" encoding="utf-8"?>
+<file path=ppt/slides/slide19.xml><?xml version="1.0" encoding="utf-8"?>
 <p:sld xmlns:a="http://schemas.openxmlformats.org/drawingml/2006/main" xmlns:r="http://schemas.openxmlformats.org/officeDocument/2006/relationships" xmlns:p="http://schemas.openxmlformats.org/presentationml/2006/main">
   <p:cSld>
     <p:spTree>
@@ -9755,7 +8143,100 @@
 </p:sld>
 </file>
 
-<file path=ppt/slides/slide32.xml><?xml version="1.0" encoding="utf-8"?>
+<file path=ppt/slides/slide2.xml><?xml version="1.0" encoding="utf-8"?>
+<p:sld xmlns:a="http://schemas.openxmlformats.org/drawingml/2006/main" xmlns:r="http://schemas.openxmlformats.org/officeDocument/2006/relationships" xmlns:p="http://schemas.openxmlformats.org/presentationml/2006/main">
+  <p:cSld>
+    <p:spTree>
+      <p:nvGrpSpPr>
+        <p:cNvPr id="1" name=""/>
+        <p:cNvGrpSpPr/>
+        <p:nvPr/>
+      </p:nvGrpSpPr>
+      <p:grpSpPr>
+        <a:xfrm>
+          <a:off x="0" y="0"/>
+          <a:ext cx="0" cy="0"/>
+          <a:chOff x="0" y="0"/>
+          <a:chExt cx="0" cy="0"/>
+        </a:xfrm>
+      </p:grpSpPr>
+      <p:sp>
+        <p:nvSpPr>
+          <p:cNvPr id="2" name="Title 1"/>
+          <p:cNvSpPr>
+            <a:spLocks noGrp="1"/>
+          </p:cNvSpPr>
+          <p:nvPr>
+            <p:ph type="title"/>
+          </p:nvPr>
+        </p:nvSpPr>
+        <p:spPr/>
+        <p:txBody>
+          <a:bodyPr/>
+          <a:lstStyle/>
+          <a:p>
+            <a:r>
+              <a:rPr lang="pt-PT" dirty="0"/>
+              <a:t>Parte I</a:t>
+            </a:r>
+          </a:p>
+        </p:txBody>
+      </p:sp>
+      <p:sp>
+        <p:nvSpPr>
+          <p:cNvPr id="3" name="Text Placeholder 2"/>
+          <p:cNvSpPr>
+            <a:spLocks noGrp="1"/>
+          </p:cNvSpPr>
+          <p:nvPr>
+            <p:ph type="body" idx="1"/>
+          </p:nvPr>
+        </p:nvSpPr>
+        <p:spPr/>
+        <p:txBody>
+          <a:bodyPr/>
+          <a:lstStyle/>
+          <a:p>
+            <a:r>
+              <a:rPr lang="pt-PT" dirty="0"/>
+              <a:t>Fundamentação</a:t>
+            </a:r>
+          </a:p>
+        </p:txBody>
+      </p:sp>
+    </p:spTree>
+    <p:extLst>
+      <p:ext uri="{BB962C8B-B14F-4D97-AF65-F5344CB8AC3E}">
+        <p14:creationId xmlns:p14="http://schemas.microsoft.com/office/powerpoint/2010/main" val="2134899933"/>
+      </p:ext>
+    </p:extLst>
+  </p:cSld>
+  <p:clrMapOvr>
+    <a:masterClrMapping/>
+  </p:clrMapOvr>
+  <mc:AlternateContent xmlns:mc="http://schemas.openxmlformats.org/markup-compatibility/2006" xmlns:p14="http://schemas.microsoft.com/office/powerpoint/2010/main">
+    <mc:Choice Requires="p14">
+      <p:transition spd="med" p14:dur="700">
+        <p:fade/>
+      </p:transition>
+    </mc:Choice>
+    <mc:Fallback xmlns="">
+      <p:transition spd="med">
+        <p:fade/>
+      </p:transition>
+    </mc:Fallback>
+  </mc:AlternateContent>
+  <p:timing>
+    <p:tnLst>
+      <p:par>
+        <p:cTn id="1" dur="indefinite" restart="never" nodeType="tmRoot"/>
+      </p:par>
+    </p:tnLst>
+  </p:timing>
+</p:sld>
+</file>
+
+<file path=ppt/slides/slide20.xml><?xml version="1.0" encoding="utf-8"?>
 <p:sld xmlns:a="http://schemas.openxmlformats.org/drawingml/2006/main" xmlns:r="http://schemas.openxmlformats.org/officeDocument/2006/relationships" xmlns:p="http://schemas.openxmlformats.org/presentationml/2006/main">
   <p:cSld>
     <p:spTree>
@@ -9867,231 +8348,7 @@
 </p:sld>
 </file>
 
-<file path=ppt/slides/slide33.xml><?xml version="1.0" encoding="utf-8"?>
-<p:sld xmlns:a="http://schemas.openxmlformats.org/drawingml/2006/main" xmlns:r="http://schemas.openxmlformats.org/officeDocument/2006/relationships" xmlns:p="http://schemas.openxmlformats.org/presentationml/2006/main">
-  <p:cSld>
-    <p:spTree>
-      <p:nvGrpSpPr>
-        <p:cNvPr id="1" name=""/>
-        <p:cNvGrpSpPr/>
-        <p:nvPr/>
-      </p:nvGrpSpPr>
-      <p:grpSpPr>
-        <a:xfrm>
-          <a:off x="0" y="0"/>
-          <a:ext cx="0" cy="0"/>
-          <a:chOff x="0" y="0"/>
-          <a:chExt cx="0" cy="0"/>
-        </a:xfrm>
-      </p:grpSpPr>
-      <p:sp>
-        <p:nvSpPr>
-          <p:cNvPr id="2" name="Title 1"/>
-          <p:cNvSpPr>
-            <a:spLocks noGrp="1"/>
-          </p:cNvSpPr>
-          <p:nvPr>
-            <p:ph type="title"/>
-          </p:nvPr>
-        </p:nvSpPr>
-        <p:spPr>
-          <a:xfrm>
-            <a:off x="677334" y="273698"/>
-            <a:ext cx="8596668" cy="1320800"/>
-          </a:xfrm>
-        </p:spPr>
-        <p:txBody>
-          <a:bodyPr/>
-          <a:lstStyle/>
-          <a:p>
-            <a:r>
-              <a:rPr lang="pt-PT" dirty="0"/>
-              <a:t>Diagrama de Máquinas de Estado</a:t>
-            </a:r>
-            <a:br>
-              <a:rPr lang="pt-PT" dirty="0"/>
-            </a:br>
-            <a:r>
-              <a:rPr lang="pt-PT" dirty="0"/>
-              <a:t>“Verificar propostas de trabalho”</a:t>
-            </a:r>
-          </a:p>
-        </p:txBody>
-      </p:sp>
-      <p:pic>
-        <p:nvPicPr>
-          <p:cNvPr id="4" name="Content Placeholder 3"/>
-          <p:cNvPicPr>
-            <a:picLocks noGrp="1" noChangeAspect="1"/>
-          </p:cNvPicPr>
-          <p:nvPr>
-            <p:ph sz="half" idx="1"/>
-          </p:nvPr>
-        </p:nvPicPr>
-        <p:blipFill>
-          <a:blip r:embed="rId2">
-            <a:extLst>
-              <a:ext uri="{28A0092B-C50C-407E-A947-70E740481C1C}">
-                <a14:useLocalDpi xmlns:a14="http://schemas.microsoft.com/office/drawing/2010/main" val="0"/>
-              </a:ext>
-            </a:extLst>
-          </a:blip>
-          <a:stretch>
-            <a:fillRect/>
-          </a:stretch>
-        </p:blipFill>
-        <p:spPr>
-          <a:xfrm>
-            <a:off x="677334" y="1594498"/>
-            <a:ext cx="10929419" cy="4966432"/>
-          </a:xfrm>
-        </p:spPr>
-      </p:pic>
-    </p:spTree>
-    <p:extLst>
-      <p:ext uri="{BB962C8B-B14F-4D97-AF65-F5344CB8AC3E}">
-        <p14:creationId xmlns:p14="http://schemas.microsoft.com/office/powerpoint/2010/main" val="3326109473"/>
-      </p:ext>
-    </p:extLst>
-  </p:cSld>
-  <p:clrMapOvr>
-    <a:masterClrMapping/>
-  </p:clrMapOvr>
-  <mc:AlternateContent xmlns:mc="http://schemas.openxmlformats.org/markup-compatibility/2006" xmlns:p14="http://schemas.microsoft.com/office/powerpoint/2010/main">
-    <mc:Choice Requires="p14">
-      <p:transition spd="med" p14:dur="700">
-        <p:fade/>
-      </p:transition>
-    </mc:Choice>
-    <mc:Fallback xmlns="">
-      <p:transition spd="med">
-        <p:fade/>
-      </p:transition>
-    </mc:Fallback>
-  </mc:AlternateContent>
-  <p:timing>
-    <p:tnLst>
-      <p:par>
-        <p:cTn id="1" dur="indefinite" restart="never" nodeType="tmRoot"/>
-      </p:par>
-    </p:tnLst>
-  </p:timing>
-</p:sld>
-</file>
-
-<file path=ppt/slides/slide34.xml><?xml version="1.0" encoding="utf-8"?>
-<p:sld xmlns:a="http://schemas.openxmlformats.org/drawingml/2006/main" xmlns:r="http://schemas.openxmlformats.org/officeDocument/2006/relationships" xmlns:p="http://schemas.openxmlformats.org/presentationml/2006/main">
-  <p:cSld>
-    <p:spTree>
-      <p:nvGrpSpPr>
-        <p:cNvPr id="1" name=""/>
-        <p:cNvGrpSpPr/>
-        <p:nvPr/>
-      </p:nvGrpSpPr>
-      <p:grpSpPr>
-        <a:xfrm>
-          <a:off x="0" y="0"/>
-          <a:ext cx="0" cy="0"/>
-          <a:chOff x="0" y="0"/>
-          <a:chExt cx="0" cy="0"/>
-        </a:xfrm>
-      </p:grpSpPr>
-      <p:sp>
-        <p:nvSpPr>
-          <p:cNvPr id="2" name="Title 1"/>
-          <p:cNvSpPr>
-            <a:spLocks noGrp="1"/>
-          </p:cNvSpPr>
-          <p:nvPr>
-            <p:ph type="title"/>
-          </p:nvPr>
-        </p:nvSpPr>
-        <p:spPr>
-          <a:xfrm>
-            <a:off x="677334" y="273698"/>
-            <a:ext cx="8596668" cy="1320800"/>
-          </a:xfrm>
-        </p:spPr>
-        <p:txBody>
-          <a:bodyPr/>
-          <a:lstStyle/>
-          <a:p>
-            <a:r>
-              <a:rPr lang="pt-PT" dirty="0"/>
-              <a:t>Diagrama de Máquinas de Estado</a:t>
-            </a:r>
-            <a:br>
-              <a:rPr lang="pt-PT" dirty="0"/>
-            </a:br>
-            <a:r>
-              <a:rPr lang="pt-PT" dirty="0"/>
-              <a:t>“Avaliar Trabalho”</a:t>
-            </a:r>
-          </a:p>
-        </p:txBody>
-      </p:sp>
-      <p:pic>
-        <p:nvPicPr>
-          <p:cNvPr id="5" name="Content Placeholder 4"/>
-          <p:cNvPicPr>
-            <a:picLocks noGrp="1" noChangeAspect="1"/>
-          </p:cNvPicPr>
-          <p:nvPr>
-            <p:ph sz="half" idx="1"/>
-          </p:nvPr>
-        </p:nvPicPr>
-        <p:blipFill>
-          <a:blip r:embed="rId2">
-            <a:extLst>
-              <a:ext uri="{28A0092B-C50C-407E-A947-70E740481C1C}">
-                <a14:useLocalDpi xmlns:a14="http://schemas.microsoft.com/office/drawing/2010/main" val="0"/>
-              </a:ext>
-            </a:extLst>
-          </a:blip>
-          <a:stretch>
-            <a:fillRect/>
-          </a:stretch>
-        </p:blipFill>
-        <p:spPr>
-          <a:xfrm>
-            <a:off x="677334" y="2108718"/>
-            <a:ext cx="10875761" cy="3437415"/>
-          </a:xfrm>
-        </p:spPr>
-      </p:pic>
-    </p:spTree>
-    <p:extLst>
-      <p:ext uri="{BB962C8B-B14F-4D97-AF65-F5344CB8AC3E}">
-        <p14:creationId xmlns:p14="http://schemas.microsoft.com/office/powerpoint/2010/main" val="1126668763"/>
-      </p:ext>
-    </p:extLst>
-  </p:cSld>
-  <p:clrMapOvr>
-    <a:masterClrMapping/>
-  </p:clrMapOvr>
-  <mc:AlternateContent xmlns:mc="http://schemas.openxmlformats.org/markup-compatibility/2006" xmlns:p14="http://schemas.microsoft.com/office/powerpoint/2010/main">
-    <mc:Choice Requires="p14">
-      <p:transition spd="med" p14:dur="700">
-        <p:fade/>
-      </p:transition>
-    </mc:Choice>
-    <mc:Fallback xmlns="">
-      <p:transition spd="med">
-        <p:fade/>
-      </p:transition>
-    </mc:Fallback>
-  </mc:AlternateContent>
-  <p:timing>
-    <p:tnLst>
-      <p:par>
-        <p:cTn id="1" dur="indefinite" restart="never" nodeType="tmRoot"/>
-      </p:par>
-    </p:tnLst>
-  </p:timing>
-</p:sld>
-</file>
-
-<file path=ppt/slides/slide35.xml><?xml version="1.0" encoding="utf-8"?>
+<file path=ppt/slides/slide21.xml><?xml version="1.0" encoding="utf-8"?>
 <p:sld xmlns:a="http://schemas.openxmlformats.org/drawingml/2006/main" xmlns:r="http://schemas.openxmlformats.org/officeDocument/2006/relationships" xmlns:p="http://schemas.openxmlformats.org/presentationml/2006/main">
   <p:cSld>
     <p:spTree>
@@ -10195,112 +8452,7 @@
 </p:sld>
 </file>
 
-<file path=ppt/slides/slide36.xml><?xml version="1.0" encoding="utf-8"?>
-<p:sld xmlns:a="http://schemas.openxmlformats.org/drawingml/2006/main" xmlns:r="http://schemas.openxmlformats.org/officeDocument/2006/relationships" xmlns:p="http://schemas.openxmlformats.org/presentationml/2006/main">
-  <p:cSld>
-    <p:spTree>
-      <p:nvGrpSpPr>
-        <p:cNvPr id="1" name=""/>
-        <p:cNvGrpSpPr/>
-        <p:nvPr/>
-      </p:nvGrpSpPr>
-      <p:grpSpPr>
-        <a:xfrm>
-          <a:off x="0" y="0"/>
-          <a:ext cx="0" cy="0"/>
-          <a:chOff x="0" y="0"/>
-          <a:chExt cx="0" cy="0"/>
-        </a:xfrm>
-      </p:grpSpPr>
-      <p:sp>
-        <p:nvSpPr>
-          <p:cNvPr id="2" name="Title 1"/>
-          <p:cNvSpPr>
-            <a:spLocks noGrp="1"/>
-          </p:cNvSpPr>
-          <p:nvPr>
-            <p:ph type="title"/>
-          </p:nvPr>
-        </p:nvSpPr>
-        <p:spPr>
-          <a:xfrm>
-            <a:off x="677334" y="273698"/>
-            <a:ext cx="8596668" cy="1320800"/>
-          </a:xfrm>
-        </p:spPr>
-        <p:txBody>
-          <a:bodyPr/>
-          <a:lstStyle/>
-          <a:p>
-            <a:r>
-              <a:rPr lang="pt-PT" dirty="0"/>
-              <a:t>Diagrama de Classes</a:t>
-            </a:r>
-          </a:p>
-        </p:txBody>
-      </p:sp>
-      <p:pic>
-        <p:nvPicPr>
-          <p:cNvPr id="5" name="Content Placeholder 4"/>
-          <p:cNvPicPr>
-            <a:picLocks noGrp="1" noChangeAspect="1"/>
-          </p:cNvPicPr>
-          <p:nvPr>
-            <p:ph sz="half" idx="1"/>
-          </p:nvPr>
-        </p:nvPicPr>
-        <p:blipFill>
-          <a:blip r:embed="rId2">
-            <a:extLst>
-              <a:ext uri="{28A0092B-C50C-407E-A947-70E740481C1C}">
-                <a14:useLocalDpi xmlns:a14="http://schemas.microsoft.com/office/drawing/2010/main" val="0"/>
-              </a:ext>
-            </a:extLst>
-          </a:blip>
-          <a:stretch>
-            <a:fillRect/>
-          </a:stretch>
-        </p:blipFill>
-        <p:spPr>
-          <a:xfrm>
-            <a:off x="1192393" y="882788"/>
-            <a:ext cx="7566549" cy="5975212"/>
-          </a:xfrm>
-        </p:spPr>
-      </p:pic>
-    </p:spTree>
-    <p:extLst>
-      <p:ext uri="{BB962C8B-B14F-4D97-AF65-F5344CB8AC3E}">
-        <p14:creationId xmlns:p14="http://schemas.microsoft.com/office/powerpoint/2010/main" val="2834995219"/>
-      </p:ext>
-    </p:extLst>
-  </p:cSld>
-  <p:clrMapOvr>
-    <a:masterClrMapping/>
-  </p:clrMapOvr>
-  <mc:AlternateContent xmlns:mc="http://schemas.openxmlformats.org/markup-compatibility/2006" xmlns:p14="http://schemas.microsoft.com/office/powerpoint/2010/main">
-    <mc:Choice Requires="p14">
-      <p:transition spd="med" p14:dur="700">
-        <p:fade/>
-      </p:transition>
-    </mc:Choice>
-    <mc:Fallback xmlns="">
-      <p:transition spd="med">
-        <p:fade/>
-      </p:transition>
-    </mc:Fallback>
-  </mc:AlternateContent>
-  <p:timing>
-    <p:tnLst>
-      <p:par>
-        <p:cTn id="1" dur="indefinite" restart="never" nodeType="tmRoot"/>
-      </p:par>
-    </p:tnLst>
-  </p:timing>
-</p:sld>
-</file>
-
-<file path=ppt/slides/slide37.xml><?xml version="1.0" encoding="utf-8"?>
+<file path=ppt/slides/slide22.xml><?xml version="1.0" encoding="utf-8"?>
 <p:sld xmlns:a="http://schemas.openxmlformats.org/drawingml/2006/main" xmlns:r="http://schemas.openxmlformats.org/officeDocument/2006/relationships" xmlns:p="http://schemas.openxmlformats.org/presentationml/2006/main">
   <p:cSld>
     <p:spTree>
@@ -10405,801 +8557,7 @@
 </p:sld>
 </file>
 
-<file path=ppt/slides/slide38.xml><?xml version="1.0" encoding="utf-8"?>
-<p:sld xmlns:a="http://schemas.openxmlformats.org/drawingml/2006/main" xmlns:r="http://schemas.openxmlformats.org/officeDocument/2006/relationships" xmlns:p="http://schemas.openxmlformats.org/presentationml/2006/main">
-  <p:cSld>
-    <p:spTree>
-      <p:nvGrpSpPr>
-        <p:cNvPr id="1" name=""/>
-        <p:cNvGrpSpPr/>
-        <p:nvPr/>
-      </p:nvGrpSpPr>
-      <p:grpSpPr>
-        <a:xfrm>
-          <a:off x="0" y="0"/>
-          <a:ext cx="0" cy="0"/>
-          <a:chOff x="0" y="0"/>
-          <a:chExt cx="0" cy="0"/>
-        </a:xfrm>
-      </p:grpSpPr>
-      <p:sp>
-        <p:nvSpPr>
-          <p:cNvPr id="2" name="Title 1"/>
-          <p:cNvSpPr>
-            <a:spLocks noGrp="1"/>
-          </p:cNvSpPr>
-          <p:nvPr>
-            <p:ph type="title"/>
-          </p:nvPr>
-        </p:nvSpPr>
-        <p:spPr>
-          <a:xfrm>
-            <a:off x="677334" y="273698"/>
-            <a:ext cx="8596668" cy="1320800"/>
-          </a:xfrm>
-        </p:spPr>
-        <p:txBody>
-          <a:bodyPr/>
-          <a:lstStyle/>
-          <a:p>
-            <a:r>
-              <a:rPr lang="pt-PT" dirty="0"/>
-              <a:t>Entidades</a:t>
-            </a:r>
-          </a:p>
-        </p:txBody>
-      </p:sp>
-      <p:sp>
-        <p:nvSpPr>
-          <p:cNvPr id="3" name="Content Placeholder 2"/>
-          <p:cNvSpPr>
-            <a:spLocks noGrp="1"/>
-          </p:cNvSpPr>
-          <p:nvPr>
-            <p:ph sz="half" idx="1"/>
-          </p:nvPr>
-        </p:nvSpPr>
-        <p:spPr/>
-        <p:txBody>
-          <a:bodyPr/>
-          <a:lstStyle/>
-          <a:p>
-            <a:endParaRPr lang="pt-PT"/>
-          </a:p>
-        </p:txBody>
-      </p:sp>
-      <p:pic>
-        <p:nvPicPr>
-          <p:cNvPr id="5" name="Picture 4"/>
-          <p:cNvPicPr>
-            <a:picLocks noChangeAspect="1"/>
-          </p:cNvPicPr>
-          <p:nvPr/>
-        </p:nvPicPr>
-        <p:blipFill>
-          <a:blip r:embed="rId2"/>
-          <a:stretch>
-            <a:fillRect/>
-          </a:stretch>
-        </p:blipFill>
-        <p:spPr>
-          <a:xfrm>
-            <a:off x="677334" y="1198886"/>
-            <a:ext cx="7811957" cy="5500126"/>
-          </a:xfrm>
-          <a:prstGeom prst="rect">
-            <a:avLst/>
-          </a:prstGeom>
-        </p:spPr>
-      </p:pic>
-    </p:spTree>
-    <p:extLst>
-      <p:ext uri="{BB962C8B-B14F-4D97-AF65-F5344CB8AC3E}">
-        <p14:creationId xmlns:p14="http://schemas.microsoft.com/office/powerpoint/2010/main" val="1708088456"/>
-      </p:ext>
-    </p:extLst>
-  </p:cSld>
-  <p:clrMapOvr>
-    <a:masterClrMapping/>
-  </p:clrMapOvr>
-  <mc:AlternateContent xmlns:mc="http://schemas.openxmlformats.org/markup-compatibility/2006" xmlns:p14="http://schemas.microsoft.com/office/powerpoint/2010/main">
-    <mc:Choice Requires="p14">
-      <p:transition spd="med" p14:dur="700">
-        <p:fade/>
-      </p:transition>
-    </mc:Choice>
-    <mc:Fallback xmlns="">
-      <p:transition spd="med">
-        <p:fade/>
-      </p:transition>
-    </mc:Fallback>
-  </mc:AlternateContent>
-  <p:timing>
-    <p:tnLst>
-      <p:par>
-        <p:cTn id="1" dur="indefinite" restart="never" nodeType="tmRoot"/>
-      </p:par>
-    </p:tnLst>
-  </p:timing>
-</p:sld>
-</file>
-
-<file path=ppt/slides/slide39.xml><?xml version="1.0" encoding="utf-8"?>
-<p:sld xmlns:a="http://schemas.openxmlformats.org/drawingml/2006/main" xmlns:r="http://schemas.openxmlformats.org/officeDocument/2006/relationships" xmlns:p="http://schemas.openxmlformats.org/presentationml/2006/main">
-  <p:cSld>
-    <p:spTree>
-      <p:nvGrpSpPr>
-        <p:cNvPr id="1" name=""/>
-        <p:cNvGrpSpPr/>
-        <p:nvPr/>
-      </p:nvGrpSpPr>
-      <p:grpSpPr>
-        <a:xfrm>
-          <a:off x="0" y="0"/>
-          <a:ext cx="0" cy="0"/>
-          <a:chOff x="0" y="0"/>
-          <a:chExt cx="0" cy="0"/>
-        </a:xfrm>
-      </p:grpSpPr>
-      <p:sp>
-        <p:nvSpPr>
-          <p:cNvPr id="2" name="Title 1"/>
-          <p:cNvSpPr>
-            <a:spLocks noGrp="1"/>
-          </p:cNvSpPr>
-          <p:nvPr>
-            <p:ph type="title"/>
-          </p:nvPr>
-        </p:nvSpPr>
-        <p:spPr>
-          <a:xfrm>
-            <a:off x="677334" y="273698"/>
-            <a:ext cx="8596668" cy="1320800"/>
-          </a:xfrm>
-        </p:spPr>
-        <p:txBody>
-          <a:bodyPr/>
-          <a:lstStyle/>
-          <a:p>
-            <a:r>
-              <a:rPr lang="pt-PT" dirty="0"/>
-              <a:t>Tipos de relacionamento</a:t>
-            </a:r>
-          </a:p>
-        </p:txBody>
-      </p:sp>
-      <p:sp>
-        <p:nvSpPr>
-          <p:cNvPr id="3" name="Content Placeholder 2"/>
-          <p:cNvSpPr>
-            <a:spLocks noGrp="1"/>
-          </p:cNvSpPr>
-          <p:nvPr>
-            <p:ph sz="half" idx="1"/>
-          </p:nvPr>
-        </p:nvSpPr>
-        <p:spPr/>
-        <p:txBody>
-          <a:bodyPr/>
-          <a:lstStyle/>
-          <a:p>
-            <a:endParaRPr lang="pt-PT"/>
-          </a:p>
-        </p:txBody>
-      </p:sp>
-      <p:pic>
-        <p:nvPicPr>
-          <p:cNvPr id="5" name="Picture 4"/>
-          <p:cNvPicPr>
-            <a:picLocks noChangeAspect="1"/>
-          </p:cNvPicPr>
-          <p:nvPr/>
-        </p:nvPicPr>
-        <p:blipFill>
-          <a:blip r:embed="rId2"/>
-          <a:stretch>
-            <a:fillRect/>
-          </a:stretch>
-        </p:blipFill>
-        <p:spPr>
-          <a:xfrm>
-            <a:off x="677334" y="2835243"/>
-            <a:ext cx="9413994" cy="1641801"/>
-          </a:xfrm>
-          <a:prstGeom prst="rect">
-            <a:avLst/>
-          </a:prstGeom>
-        </p:spPr>
-      </p:pic>
-    </p:spTree>
-    <p:extLst>
-      <p:ext uri="{BB962C8B-B14F-4D97-AF65-F5344CB8AC3E}">
-        <p14:creationId xmlns:p14="http://schemas.microsoft.com/office/powerpoint/2010/main" val="2001413485"/>
-      </p:ext>
-    </p:extLst>
-  </p:cSld>
-  <p:clrMapOvr>
-    <a:masterClrMapping/>
-  </p:clrMapOvr>
-  <mc:AlternateContent xmlns:mc="http://schemas.openxmlformats.org/markup-compatibility/2006" xmlns:p14="http://schemas.microsoft.com/office/powerpoint/2010/main">
-    <mc:Choice Requires="p14">
-      <p:transition spd="med" p14:dur="700">
-        <p:fade/>
-      </p:transition>
-    </mc:Choice>
-    <mc:Fallback xmlns="">
-      <p:transition spd="med">
-        <p:fade/>
-      </p:transition>
-    </mc:Fallback>
-  </mc:AlternateContent>
-  <p:timing>
-    <p:tnLst>
-      <p:par>
-        <p:cTn id="1" dur="indefinite" restart="never" nodeType="tmRoot"/>
-      </p:par>
-    </p:tnLst>
-  </p:timing>
-</p:sld>
-</file>
-
-<file path=ppt/slides/slide4.xml><?xml version="1.0" encoding="utf-8"?>
-<p:sld xmlns:a="http://schemas.openxmlformats.org/drawingml/2006/main" xmlns:r="http://schemas.openxmlformats.org/officeDocument/2006/relationships" xmlns:p="http://schemas.openxmlformats.org/presentationml/2006/main">
-  <p:cSld>
-    <p:spTree>
-      <p:nvGrpSpPr>
-        <p:cNvPr id="1" name=""/>
-        <p:cNvGrpSpPr/>
-        <p:nvPr/>
-      </p:nvGrpSpPr>
-      <p:grpSpPr>
-        <a:xfrm>
-          <a:off x="0" y="0"/>
-          <a:ext cx="0" cy="0"/>
-          <a:chOff x="0" y="0"/>
-          <a:chExt cx="0" cy="0"/>
-        </a:xfrm>
-      </p:grpSpPr>
-      <p:sp>
-        <p:nvSpPr>
-          <p:cNvPr id="6" name="Título 1">
-            <a:extLst>
-              <a:ext uri="{FF2B5EF4-FFF2-40B4-BE49-F238E27FC236}">
-                <a16:creationId xmlns:a16="http://schemas.microsoft.com/office/drawing/2014/main" id="{76E33AE5-F7BC-4721-8718-71AB3D730002}"/>
-              </a:ext>
-            </a:extLst>
-          </p:cNvPr>
-          <p:cNvSpPr txBox="1">
-            <a:spLocks/>
-          </p:cNvSpPr>
-          <p:nvPr/>
-        </p:nvSpPr>
-        <p:spPr>
-          <a:xfrm>
-            <a:off x="283968" y="234908"/>
-            <a:ext cx="8596668" cy="1320800"/>
-          </a:xfrm>
-          <a:prstGeom prst="rect">
-            <a:avLst/>
-          </a:prstGeom>
-        </p:spPr>
-        <p:txBody>
-          <a:bodyPr/>
-          <a:lstStyle>
-            <a:lvl1pPr algn="l" defTabSz="457200" rtl="0" eaLnBrk="1" latinLnBrk="0" hangingPunct="1">
-              <a:spcBef>
-                <a:spcPct val="0"/>
-              </a:spcBef>
-              <a:buNone/>
-              <a:defRPr sz="3600" kern="1200">
-                <a:solidFill>
-                  <a:schemeClr val="accent1"/>
-                </a:solidFill>
-                <a:latin typeface="+mj-lt"/>
-                <a:ea typeface="+mj-ea"/>
-                <a:cs typeface="+mj-cs"/>
-              </a:defRPr>
-            </a:lvl1pPr>
-            <a:lvl2pPr eaLnBrk="1" hangingPunct="1">
-              <a:defRPr>
-                <a:solidFill>
-                  <a:schemeClr val="tx2"/>
-                </a:solidFill>
-              </a:defRPr>
-            </a:lvl2pPr>
-            <a:lvl3pPr eaLnBrk="1" hangingPunct="1">
-              <a:defRPr>
-                <a:solidFill>
-                  <a:schemeClr val="tx2"/>
-                </a:solidFill>
-              </a:defRPr>
-            </a:lvl3pPr>
-            <a:lvl4pPr eaLnBrk="1" hangingPunct="1">
-              <a:defRPr>
-                <a:solidFill>
-                  <a:schemeClr val="tx2"/>
-                </a:solidFill>
-              </a:defRPr>
-            </a:lvl4pPr>
-            <a:lvl5pPr eaLnBrk="1" hangingPunct="1">
-              <a:defRPr>
-                <a:solidFill>
-                  <a:schemeClr val="tx2"/>
-                </a:solidFill>
-              </a:defRPr>
-            </a:lvl5pPr>
-            <a:lvl6pPr eaLnBrk="1" hangingPunct="1">
-              <a:defRPr>
-                <a:solidFill>
-                  <a:schemeClr val="tx2"/>
-                </a:solidFill>
-              </a:defRPr>
-            </a:lvl6pPr>
-            <a:lvl7pPr eaLnBrk="1" hangingPunct="1">
-              <a:defRPr>
-                <a:solidFill>
-                  <a:schemeClr val="tx2"/>
-                </a:solidFill>
-              </a:defRPr>
-            </a:lvl7pPr>
-            <a:lvl8pPr eaLnBrk="1" hangingPunct="1">
-              <a:defRPr>
-                <a:solidFill>
-                  <a:schemeClr val="tx2"/>
-                </a:solidFill>
-              </a:defRPr>
-            </a:lvl8pPr>
-            <a:lvl9pPr eaLnBrk="1" hangingPunct="1">
-              <a:defRPr>
-                <a:solidFill>
-                  <a:schemeClr val="tx2"/>
-                </a:solidFill>
-              </a:defRPr>
-            </a:lvl9pPr>
-          </a:lstStyle>
-          <a:p>
-            <a:r>
-              <a:rPr lang="pt-PT" dirty="0" smtClean="0"/>
-              <a:t>Contextualização e Motivação</a:t>
-            </a:r>
-            <a:endParaRPr lang="pt-PT" dirty="0"/>
-          </a:p>
-        </p:txBody>
-      </p:sp>
-      <p:sp>
-        <p:nvSpPr>
-          <p:cNvPr id="4" name="CaixaDeTexto 3">
-            <a:extLst>
-              <a:ext uri="{FF2B5EF4-FFF2-40B4-BE49-F238E27FC236}">
-                <a16:creationId xmlns:a16="http://schemas.microsoft.com/office/drawing/2014/main" id="{037B5F4B-DA41-45A6-98B2-0FFDF0BF4409}"/>
-              </a:ext>
-            </a:extLst>
-          </p:cNvPr>
-          <p:cNvSpPr txBox="1"/>
-          <p:nvPr/>
-        </p:nvSpPr>
-        <p:spPr>
-          <a:xfrm>
-            <a:off x="404948" y="1400499"/>
-            <a:ext cx="8987246" cy="4524315"/>
-          </a:xfrm>
-          <a:prstGeom prst="rect">
-            <a:avLst/>
-          </a:prstGeom>
-          <a:noFill/>
-        </p:spPr>
-        <p:txBody>
-          <a:bodyPr wrap="square" rtlCol="0">
-            <a:spAutoFit/>
-          </a:bodyPr>
-          <a:lstStyle/>
-          <a:p>
-            <a:endParaRPr lang="pt-PT" sz="1600" dirty="0"/>
-          </a:p>
-          <a:p>
-            <a:pPr marL="342900" indent="-342900">
-              <a:buFont typeface="Arial" panose="020B0604020202020204" pitchFamily="34" charset="0"/>
-              <a:buChar char="•"/>
-            </a:pPr>
-            <a:r>
-              <a:rPr lang="pt-PT" sz="2000" dirty="0"/>
-              <a:t>“Bebés &amp; Companhia” possui uma cadeia de infantários espalhados pela grande </a:t>
-            </a:r>
-            <a:r>
-              <a:rPr lang="pt-PT" sz="2000" dirty="0" smtClean="0"/>
-              <a:t>Lisboa;</a:t>
-            </a:r>
-          </a:p>
-          <a:p>
-            <a:pPr marL="342900" indent="-342900">
-              <a:buFont typeface="Arial" panose="020B0604020202020204" pitchFamily="34" charset="0"/>
-              <a:buChar char="•"/>
-            </a:pPr>
-            <a:endParaRPr lang="pt-PT" sz="2000" dirty="0" smtClean="0"/>
-          </a:p>
-          <a:p>
-            <a:pPr marL="342900" indent="-342900">
-              <a:buFont typeface="Arial" panose="020B0604020202020204" pitchFamily="34" charset="0"/>
-              <a:buChar char="•"/>
-            </a:pPr>
-            <a:r>
-              <a:rPr lang="pt-PT" sz="2000" b="1" dirty="0" smtClean="0">
-                <a:solidFill>
-                  <a:schemeClr val="accent2"/>
-                </a:solidFill>
-              </a:rPr>
-              <a:t>Surge</a:t>
-            </a:r>
-            <a:r>
-              <a:rPr lang="pt-PT" sz="2000" b="1" dirty="0">
-                <a:solidFill>
-                  <a:schemeClr val="accent2"/>
-                </a:solidFill>
-              </a:rPr>
-              <a:t>, assim, a ideia de fazer um serviço ao domicílio de babysitting; </a:t>
-            </a:r>
-          </a:p>
-          <a:p>
-            <a:endParaRPr lang="pt-PT" sz="2000" dirty="0"/>
-          </a:p>
-          <a:p>
-            <a:pPr marL="342900" indent="-342900">
-              <a:buFont typeface="Arial" panose="020B0604020202020204" pitchFamily="34" charset="0"/>
-              <a:buChar char="•"/>
-            </a:pPr>
-            <a:r>
-              <a:rPr lang="pt-PT" sz="2000" dirty="0"/>
-              <a:t>É criada a plataforma “GuguDadah</a:t>
-            </a:r>
-            <a:r>
-              <a:rPr lang="pt-PT" sz="2000" dirty="0" smtClean="0"/>
-              <a:t>”;</a:t>
-            </a:r>
-          </a:p>
-          <a:p>
-            <a:pPr marL="342900" indent="-342900">
-              <a:buFont typeface="Arial" panose="020B0604020202020204" pitchFamily="34" charset="0"/>
-              <a:buChar char="•"/>
-            </a:pPr>
-            <a:endParaRPr lang="pt-PT" sz="2000" dirty="0" smtClean="0"/>
-          </a:p>
-          <a:p>
-            <a:pPr marL="342900" indent="-342900">
-              <a:buFont typeface="Arial" panose="020B0604020202020204" pitchFamily="34" charset="0"/>
-              <a:buChar char="•"/>
-            </a:pPr>
-            <a:r>
-              <a:rPr lang="pt-PT" sz="2000" dirty="0"/>
-              <a:t>Dificuldade de encontrar alguém que seja </a:t>
-            </a:r>
-            <a:r>
-              <a:rPr lang="pt-PT" sz="2000" b="1" dirty="0">
-                <a:solidFill>
-                  <a:schemeClr val="accent2"/>
-                </a:solidFill>
-              </a:rPr>
-              <a:t>responsável</a:t>
-            </a:r>
-            <a:r>
-              <a:rPr lang="pt-PT" sz="2000" dirty="0"/>
-              <a:t> para </a:t>
-            </a:r>
-            <a:r>
-              <a:rPr lang="pt-PT" sz="2000" dirty="0" smtClean="0"/>
-              <a:t>cuidar dos filhos;</a:t>
-            </a:r>
-          </a:p>
-          <a:p>
-            <a:pPr marL="342900" indent="-342900">
-              <a:buFont typeface="Arial" panose="020B0604020202020204" pitchFamily="34" charset="0"/>
-              <a:buChar char="•"/>
-            </a:pPr>
-            <a:endParaRPr lang="pt-PT" sz="2000" dirty="0"/>
-          </a:p>
-          <a:p>
-            <a:pPr marL="342900" indent="-342900">
-              <a:buFont typeface="Arial" panose="020B0604020202020204" pitchFamily="34" charset="0"/>
-              <a:buChar char="•"/>
-            </a:pPr>
-            <a:r>
-              <a:rPr lang="pt-PT" sz="2000" dirty="0"/>
-              <a:t>A </a:t>
-            </a:r>
-            <a:r>
-              <a:rPr lang="pt-PT" sz="2000" b="1" dirty="0">
-                <a:solidFill>
-                  <a:schemeClr val="accent2"/>
-                </a:solidFill>
-              </a:rPr>
-              <a:t>inexistência</a:t>
-            </a:r>
-            <a:r>
-              <a:rPr lang="pt-PT" sz="2000" dirty="0"/>
-              <a:t> de um sistema que permita a requisição de serviços de babysitting online, em Portugal;</a:t>
-            </a:r>
-          </a:p>
-          <a:p>
-            <a:pPr marL="342900" indent="-342900">
-              <a:buFont typeface="Arial" panose="020B0604020202020204" pitchFamily="34" charset="0"/>
-              <a:buChar char="•"/>
-            </a:pPr>
-            <a:endParaRPr lang="pt-PT" sz="1600" dirty="0" smtClean="0"/>
-          </a:p>
-          <a:p>
-            <a:pPr marL="342900" indent="-342900">
-              <a:buFont typeface="Arial" panose="020B0604020202020204" pitchFamily="34" charset="0"/>
-              <a:buChar char="•"/>
-            </a:pPr>
-            <a:endParaRPr lang="pt-PT" sz="1600" dirty="0"/>
-          </a:p>
-        </p:txBody>
-      </p:sp>
-    </p:spTree>
-    <p:extLst>
-      <p:ext uri="{BB962C8B-B14F-4D97-AF65-F5344CB8AC3E}">
-        <p14:creationId xmlns:p14="http://schemas.microsoft.com/office/powerpoint/2010/main" val="1370001760"/>
-      </p:ext>
-    </p:extLst>
-  </p:cSld>
-  <p:clrMapOvr>
-    <a:masterClrMapping/>
-  </p:clrMapOvr>
-  <mc:AlternateContent xmlns:mc="http://schemas.openxmlformats.org/markup-compatibility/2006" xmlns:p14="http://schemas.microsoft.com/office/powerpoint/2010/main">
-    <mc:Choice Requires="p14">
-      <p:transition spd="med" p14:dur="700">
-        <p:fade/>
-      </p:transition>
-    </mc:Choice>
-    <mc:Fallback xmlns="">
-      <p:transition spd="med">
-        <p:fade/>
-      </p:transition>
-    </mc:Fallback>
-  </mc:AlternateContent>
-  <p:timing>
-    <p:tnLst>
-      <p:par>
-        <p:cTn id="1" dur="indefinite" restart="never" nodeType="tmRoot"/>
-      </p:par>
-    </p:tnLst>
-  </p:timing>
-</p:sld>
-</file>
-
-<file path=ppt/slides/slide40.xml><?xml version="1.0" encoding="utf-8"?>
-<p:sld xmlns:a="http://schemas.openxmlformats.org/drawingml/2006/main" xmlns:r="http://schemas.openxmlformats.org/officeDocument/2006/relationships" xmlns:p="http://schemas.openxmlformats.org/presentationml/2006/main">
-  <p:cSld>
-    <p:spTree>
-      <p:nvGrpSpPr>
-        <p:cNvPr id="1" name=""/>
-        <p:cNvGrpSpPr/>
-        <p:nvPr/>
-      </p:nvGrpSpPr>
-      <p:grpSpPr>
-        <a:xfrm>
-          <a:off x="0" y="0"/>
-          <a:ext cx="0" cy="0"/>
-          <a:chOff x="0" y="0"/>
-          <a:chExt cx="0" cy="0"/>
-        </a:xfrm>
-      </p:grpSpPr>
-      <p:sp>
-        <p:nvSpPr>
-          <p:cNvPr id="2" name="Title 1"/>
-          <p:cNvSpPr>
-            <a:spLocks noGrp="1"/>
-          </p:cNvSpPr>
-          <p:nvPr>
-            <p:ph type="title"/>
-          </p:nvPr>
-        </p:nvSpPr>
-        <p:spPr>
-          <a:xfrm>
-            <a:off x="677334" y="273698"/>
-            <a:ext cx="8596668" cy="1320800"/>
-          </a:xfrm>
-        </p:spPr>
-        <p:txBody>
-          <a:bodyPr/>
-          <a:lstStyle/>
-          <a:p>
-            <a:r>
-              <a:rPr lang="pt-PT" dirty="0"/>
-              <a:t>Atributos</a:t>
-            </a:r>
-          </a:p>
-        </p:txBody>
-      </p:sp>
-      <p:sp>
-        <p:nvSpPr>
-          <p:cNvPr id="3" name="Content Placeholder 2"/>
-          <p:cNvSpPr>
-            <a:spLocks noGrp="1"/>
-          </p:cNvSpPr>
-          <p:nvPr>
-            <p:ph sz="half" idx="1"/>
-          </p:nvPr>
-        </p:nvSpPr>
-        <p:spPr>
-          <a:xfrm>
-            <a:off x="677334" y="2160589"/>
-            <a:ext cx="6749833" cy="3880772"/>
-          </a:xfrm>
-        </p:spPr>
-        <p:txBody>
-          <a:bodyPr>
-            <a:normAutofit/>
-          </a:bodyPr>
-          <a:lstStyle/>
-          <a:p>
-            <a:pPr algn="just"/>
-            <a:r>
-              <a:rPr lang="pt-PT" sz="2400" dirty="0"/>
-              <a:t>Não existem quaisquer atributos compostos;</a:t>
-            </a:r>
-          </a:p>
-          <a:p>
-            <a:pPr algn="just"/>
-            <a:endParaRPr lang="pt-PT" sz="2400" dirty="0"/>
-          </a:p>
-          <a:p>
-            <a:pPr algn="just"/>
-            <a:r>
-              <a:rPr lang="pt-PT" sz="2400" dirty="0"/>
-              <a:t>O atributo Custo é derivado de Duração e Tipo (de Trabalho), com Turno (de Funcionário) e Estatuto (de Cliente);</a:t>
-            </a:r>
-          </a:p>
-          <a:p>
-            <a:pPr algn="just"/>
-            <a:endParaRPr lang="pt-PT" sz="2400" dirty="0"/>
-          </a:p>
-          <a:p>
-            <a:pPr algn="just"/>
-            <a:r>
-              <a:rPr lang="pt-PT" sz="2400" dirty="0"/>
-              <a:t>Não existem atributos multivalor; </a:t>
-            </a:r>
-          </a:p>
-        </p:txBody>
-      </p:sp>
-    </p:spTree>
-    <p:extLst>
-      <p:ext uri="{BB962C8B-B14F-4D97-AF65-F5344CB8AC3E}">
-        <p14:creationId xmlns:p14="http://schemas.microsoft.com/office/powerpoint/2010/main" val="694921459"/>
-      </p:ext>
-    </p:extLst>
-  </p:cSld>
-  <p:clrMapOvr>
-    <a:masterClrMapping/>
-  </p:clrMapOvr>
-  <mc:AlternateContent xmlns:mc="http://schemas.openxmlformats.org/markup-compatibility/2006" xmlns:p14="http://schemas.microsoft.com/office/powerpoint/2010/main">
-    <mc:Choice Requires="p14">
-      <p:transition spd="med" p14:dur="700">
-        <p:fade/>
-      </p:transition>
-    </mc:Choice>
-    <mc:Fallback xmlns="">
-      <p:transition spd="med">
-        <p:fade/>
-      </p:transition>
-    </mc:Fallback>
-  </mc:AlternateContent>
-  <p:timing>
-    <p:tnLst>
-      <p:par>
-        <p:cTn id="1" dur="indefinite" restart="never" nodeType="tmRoot"/>
-      </p:par>
-    </p:tnLst>
-  </p:timing>
-</p:sld>
-</file>
-
-<file path=ppt/slides/slide41.xml><?xml version="1.0" encoding="utf-8"?>
-<p:sld xmlns:a="http://schemas.openxmlformats.org/drawingml/2006/main" xmlns:r="http://schemas.openxmlformats.org/officeDocument/2006/relationships" xmlns:p="http://schemas.openxmlformats.org/presentationml/2006/main">
-  <p:cSld>
-    <p:spTree>
-      <p:nvGrpSpPr>
-        <p:cNvPr id="1" name=""/>
-        <p:cNvGrpSpPr/>
-        <p:nvPr/>
-      </p:nvGrpSpPr>
-      <p:grpSpPr>
-        <a:xfrm>
-          <a:off x="0" y="0"/>
-          <a:ext cx="0" cy="0"/>
-          <a:chOff x="0" y="0"/>
-          <a:chExt cx="0" cy="0"/>
-        </a:xfrm>
-      </p:grpSpPr>
-      <p:sp>
-        <p:nvSpPr>
-          <p:cNvPr id="2" name="Title 1"/>
-          <p:cNvSpPr>
-            <a:spLocks noGrp="1"/>
-          </p:cNvSpPr>
-          <p:nvPr>
-            <p:ph type="title"/>
-          </p:nvPr>
-        </p:nvSpPr>
-        <p:spPr>
-          <a:xfrm>
-            <a:off x="677334" y="273698"/>
-            <a:ext cx="8596668" cy="1320800"/>
-          </a:xfrm>
-        </p:spPr>
-        <p:txBody>
-          <a:bodyPr/>
-          <a:lstStyle/>
-          <a:p>
-            <a:r>
-              <a:rPr lang="pt-PT" dirty="0"/>
-              <a:t>Modelo Lógico</a:t>
-            </a:r>
-          </a:p>
-        </p:txBody>
-      </p:sp>
-      <p:pic>
-        <p:nvPicPr>
-          <p:cNvPr id="4" name="Content Placeholder 3"/>
-          <p:cNvPicPr>
-            <a:picLocks noGrp="1" noChangeAspect="1"/>
-          </p:cNvPicPr>
-          <p:nvPr>
-            <p:ph sz="half" idx="1"/>
-          </p:nvPr>
-        </p:nvPicPr>
-        <p:blipFill>
-          <a:blip r:embed="rId2">
-            <a:extLst>
-              <a:ext uri="{28A0092B-C50C-407E-A947-70E740481C1C}">
-                <a14:useLocalDpi xmlns:a14="http://schemas.microsoft.com/office/drawing/2010/main" val="0"/>
-              </a:ext>
-            </a:extLst>
-          </a:blip>
-          <a:stretch>
-            <a:fillRect/>
-          </a:stretch>
-        </p:blipFill>
-        <p:spPr>
-          <a:xfrm>
-            <a:off x="677334" y="1594498"/>
-            <a:ext cx="10335734" cy="3722279"/>
-          </a:xfrm>
-        </p:spPr>
-      </p:pic>
-    </p:spTree>
-    <p:extLst>
-      <p:ext uri="{BB962C8B-B14F-4D97-AF65-F5344CB8AC3E}">
-        <p14:creationId xmlns:p14="http://schemas.microsoft.com/office/powerpoint/2010/main" val="2922289073"/>
-      </p:ext>
-    </p:extLst>
-  </p:cSld>
-  <p:clrMapOvr>
-    <a:masterClrMapping/>
-  </p:clrMapOvr>
-  <mc:AlternateContent xmlns:mc="http://schemas.openxmlformats.org/markup-compatibility/2006" xmlns:p14="http://schemas.microsoft.com/office/powerpoint/2010/main">
-    <mc:Choice Requires="p14">
-      <p:transition spd="med" p14:dur="700">
-        <p:fade/>
-      </p:transition>
-    </mc:Choice>
-    <mc:Fallback xmlns="">
-      <p:transition spd="med">
-        <p:fade/>
-      </p:transition>
-    </mc:Fallback>
-  </mc:AlternateContent>
-  <p:timing>
-    <p:tnLst>
-      <p:par>
-        <p:cTn id="1" dur="indefinite" restart="never" nodeType="tmRoot"/>
-      </p:par>
-    </p:tnLst>
-  </p:timing>
-</p:sld>
-</file>
-
-<file path=ppt/slides/slide42.xml><?xml version="1.0" encoding="utf-8"?>
+<file path=ppt/slides/slide23.xml><?xml version="1.0" encoding="utf-8"?>
 <p:sld xmlns:a="http://schemas.openxmlformats.org/drawingml/2006/main" xmlns:r="http://schemas.openxmlformats.org/officeDocument/2006/relationships" xmlns:p="http://schemas.openxmlformats.org/presentationml/2006/main">
   <p:cSld>
     <p:spTree>
@@ -11334,7 +8692,7 @@
 </p:sld>
 </file>
 
-<file path=ppt/slides/slide43.xml><?xml version="1.0" encoding="utf-8"?>
+<file path=ppt/slides/slide24.xml><?xml version="1.0" encoding="utf-8"?>
 <p:sld xmlns:a="http://schemas.openxmlformats.org/drawingml/2006/main" xmlns:r="http://schemas.openxmlformats.org/officeDocument/2006/relationships" xmlns:p="http://schemas.openxmlformats.org/presentationml/2006/main">
   <p:cSld>
     <p:spTree>
@@ -11469,7 +8827,7 @@
 </p:sld>
 </file>
 
-<file path=ppt/slides/slide44.xml><?xml version="1.0" encoding="utf-8"?>
+<file path=ppt/slides/slide25.xml><?xml version="1.0" encoding="utf-8"?>
 <p:sld xmlns:a="http://schemas.openxmlformats.org/drawingml/2006/main" xmlns:r="http://schemas.openxmlformats.org/officeDocument/2006/relationships" xmlns:p="http://schemas.openxmlformats.org/presentationml/2006/main">
   <p:cSld>
     <p:spTree>
@@ -11574,274 +8932,7 @@
 </p:sld>
 </file>
 
-<file path=ppt/slides/slide45.xml><?xml version="1.0" encoding="utf-8"?>
-<p:sld xmlns:a="http://schemas.openxmlformats.org/drawingml/2006/main" xmlns:r="http://schemas.openxmlformats.org/officeDocument/2006/relationships" xmlns:p="http://schemas.openxmlformats.org/presentationml/2006/main">
-  <p:cSld>
-    <p:spTree>
-      <p:nvGrpSpPr>
-        <p:cNvPr id="1" name=""/>
-        <p:cNvGrpSpPr/>
-        <p:nvPr/>
-      </p:nvGrpSpPr>
-      <p:grpSpPr>
-        <a:xfrm>
-          <a:off x="0" y="0"/>
-          <a:ext cx="0" cy="0"/>
-          <a:chOff x="0" y="0"/>
-          <a:chExt cx="0" cy="0"/>
-        </a:xfrm>
-      </p:grpSpPr>
-      <p:sp>
-        <p:nvSpPr>
-          <p:cNvPr id="2" name="Title 1"/>
-          <p:cNvSpPr>
-            <a:spLocks noGrp="1"/>
-          </p:cNvSpPr>
-          <p:nvPr>
-            <p:ph type="title"/>
-          </p:nvPr>
-        </p:nvSpPr>
-        <p:spPr>
-          <a:xfrm>
-            <a:off x="677334" y="273698"/>
-            <a:ext cx="8596668" cy="1320800"/>
-          </a:xfrm>
-        </p:spPr>
-        <p:txBody>
-          <a:bodyPr/>
-          <a:lstStyle/>
-          <a:p>
-            <a:r>
-              <a:rPr lang="pt-PT" dirty="0"/>
-              <a:t>Mockups “Área de Profissional”</a:t>
-            </a:r>
-          </a:p>
-        </p:txBody>
-      </p:sp>
-      <p:pic>
-        <p:nvPicPr>
-          <p:cNvPr id="5" name="Content Placeholder 4"/>
-          <p:cNvPicPr>
-            <a:picLocks noGrp="1" noChangeAspect="1"/>
-          </p:cNvPicPr>
-          <p:nvPr>
-            <p:ph sz="half" idx="1"/>
-          </p:nvPr>
-        </p:nvPicPr>
-        <p:blipFill rotWithShape="1">
-          <a:blip r:embed="rId2">
-            <a:extLst>
-              <a:ext uri="{28A0092B-C50C-407E-A947-70E740481C1C}">
-                <a14:useLocalDpi xmlns:a14="http://schemas.microsoft.com/office/drawing/2010/main" val="0"/>
-              </a:ext>
-            </a:extLst>
-          </a:blip>
-          <a:srcRect b="41626"/>
-          <a:stretch/>
-        </p:blipFill>
-        <p:spPr>
-          <a:xfrm>
-            <a:off x="677334" y="1202420"/>
-            <a:ext cx="3700850" cy="5384992"/>
-          </a:xfrm>
-        </p:spPr>
-      </p:pic>
-      <p:pic>
-        <p:nvPicPr>
-          <p:cNvPr id="6" name="Picture 5"/>
-          <p:cNvPicPr>
-            <a:picLocks noChangeAspect="1"/>
-          </p:cNvPicPr>
-          <p:nvPr/>
-        </p:nvPicPr>
-        <p:blipFill>
-          <a:blip r:embed="rId3">
-            <a:extLst>
-              <a:ext uri="{28A0092B-C50C-407E-A947-70E740481C1C}">
-                <a14:useLocalDpi xmlns:a14="http://schemas.microsoft.com/office/drawing/2010/main" val="0"/>
-              </a:ext>
-            </a:extLst>
-          </a:blip>
-          <a:stretch>
-            <a:fillRect/>
-          </a:stretch>
-        </p:blipFill>
-        <p:spPr>
-          <a:xfrm>
-            <a:off x="4729880" y="1202420"/>
-            <a:ext cx="4192425" cy="5384992"/>
-          </a:xfrm>
-          <a:prstGeom prst="rect">
-            <a:avLst/>
-          </a:prstGeom>
-        </p:spPr>
-      </p:pic>
-    </p:spTree>
-    <p:extLst>
-      <p:ext uri="{BB962C8B-B14F-4D97-AF65-F5344CB8AC3E}">
-        <p14:creationId xmlns:p14="http://schemas.microsoft.com/office/powerpoint/2010/main" val="1918464663"/>
-      </p:ext>
-    </p:extLst>
-  </p:cSld>
-  <p:clrMapOvr>
-    <a:masterClrMapping/>
-  </p:clrMapOvr>
-  <mc:AlternateContent xmlns:mc="http://schemas.openxmlformats.org/markup-compatibility/2006" xmlns:p14="http://schemas.microsoft.com/office/powerpoint/2010/main">
-    <mc:Choice Requires="p14">
-      <p:transition spd="med" p14:dur="700">
-        <p:fade/>
-      </p:transition>
-    </mc:Choice>
-    <mc:Fallback xmlns="">
-      <p:transition spd="med">
-        <p:fade/>
-      </p:transition>
-    </mc:Fallback>
-  </mc:AlternateContent>
-  <p:timing>
-    <p:tnLst>
-      <p:par>
-        <p:cTn id="1" dur="indefinite" restart="never" nodeType="tmRoot"/>
-      </p:par>
-    </p:tnLst>
-  </p:timing>
-</p:sld>
-</file>
-
-<file path=ppt/slides/slide46.xml><?xml version="1.0" encoding="utf-8"?>
-<p:sld xmlns:a="http://schemas.openxmlformats.org/drawingml/2006/main" xmlns:r="http://schemas.openxmlformats.org/officeDocument/2006/relationships" xmlns:p="http://schemas.openxmlformats.org/presentationml/2006/main">
-  <p:cSld>
-    <p:spTree>
-      <p:nvGrpSpPr>
-        <p:cNvPr id="1" name=""/>
-        <p:cNvGrpSpPr/>
-        <p:nvPr/>
-      </p:nvGrpSpPr>
-      <p:grpSpPr>
-        <a:xfrm>
-          <a:off x="0" y="0"/>
-          <a:ext cx="0" cy="0"/>
-          <a:chOff x="0" y="0"/>
-          <a:chExt cx="0" cy="0"/>
-        </a:xfrm>
-      </p:grpSpPr>
-      <p:sp>
-        <p:nvSpPr>
-          <p:cNvPr id="2" name="Title 1"/>
-          <p:cNvSpPr>
-            <a:spLocks noGrp="1"/>
-          </p:cNvSpPr>
-          <p:nvPr>
-            <p:ph type="title"/>
-          </p:nvPr>
-        </p:nvSpPr>
-        <p:spPr>
-          <a:xfrm>
-            <a:off x="677334" y="273698"/>
-            <a:ext cx="8596668" cy="1320800"/>
-          </a:xfrm>
-        </p:spPr>
-        <p:txBody>
-          <a:bodyPr/>
-          <a:lstStyle/>
-          <a:p>
-            <a:r>
-              <a:rPr lang="pt-PT" dirty="0"/>
-              <a:t>Mockups “Área de Cliente”</a:t>
-            </a:r>
-          </a:p>
-        </p:txBody>
-      </p:sp>
-      <p:pic>
-        <p:nvPicPr>
-          <p:cNvPr id="4" name="Content Placeholder 3"/>
-          <p:cNvPicPr>
-            <a:picLocks noGrp="1" noChangeAspect="1"/>
-          </p:cNvPicPr>
-          <p:nvPr>
-            <p:ph sz="half" idx="1"/>
-          </p:nvPr>
-        </p:nvPicPr>
-        <p:blipFill rotWithShape="1">
-          <a:blip r:embed="rId2">
-            <a:extLst>
-              <a:ext uri="{28A0092B-C50C-407E-A947-70E740481C1C}">
-                <a14:useLocalDpi xmlns:a14="http://schemas.microsoft.com/office/drawing/2010/main" val="0"/>
-              </a:ext>
-            </a:extLst>
-          </a:blip>
-          <a:srcRect b="59645"/>
-          <a:stretch/>
-        </p:blipFill>
-        <p:spPr>
-          <a:xfrm>
-            <a:off x="1877277" y="1179180"/>
-            <a:ext cx="3857877" cy="5072330"/>
-          </a:xfrm>
-        </p:spPr>
-      </p:pic>
-      <p:pic>
-        <p:nvPicPr>
-          <p:cNvPr id="7" name="Picture 6"/>
-          <p:cNvPicPr>
-            <a:picLocks noChangeAspect="1"/>
-          </p:cNvPicPr>
-          <p:nvPr/>
-        </p:nvPicPr>
-        <p:blipFill rotWithShape="1">
-          <a:blip r:embed="rId2">
-            <a:extLst>
-              <a:ext uri="{28A0092B-C50C-407E-A947-70E740481C1C}">
-                <a14:useLocalDpi xmlns:a14="http://schemas.microsoft.com/office/drawing/2010/main" val="0"/>
-              </a:ext>
-            </a:extLst>
-          </a:blip>
-          <a:srcRect t="40705" b="3638"/>
-          <a:stretch/>
-        </p:blipFill>
-        <p:spPr>
-          <a:xfrm>
-            <a:off x="6935097" y="273698"/>
-            <a:ext cx="3552511" cy="6441929"/>
-          </a:xfrm>
-          <a:prstGeom prst="rect">
-            <a:avLst/>
-          </a:prstGeom>
-        </p:spPr>
-      </p:pic>
-    </p:spTree>
-    <p:extLst>
-      <p:ext uri="{BB962C8B-B14F-4D97-AF65-F5344CB8AC3E}">
-        <p14:creationId xmlns:p14="http://schemas.microsoft.com/office/powerpoint/2010/main" val="2431276090"/>
-      </p:ext>
-    </p:extLst>
-  </p:cSld>
-  <p:clrMapOvr>
-    <a:masterClrMapping/>
-  </p:clrMapOvr>
-  <mc:AlternateContent xmlns:mc="http://schemas.openxmlformats.org/markup-compatibility/2006" xmlns:p14="http://schemas.microsoft.com/office/powerpoint/2010/main">
-    <mc:Choice Requires="p14">
-      <p:transition spd="med" p14:dur="700">
-        <p:fade/>
-      </p:transition>
-    </mc:Choice>
-    <mc:Fallback xmlns="">
-      <p:transition spd="med">
-        <p:fade/>
-      </p:transition>
-    </mc:Fallback>
-  </mc:AlternateContent>
-  <p:timing>
-    <p:tnLst>
-      <p:par>
-        <p:cTn id="1" dur="indefinite" restart="never" nodeType="tmRoot"/>
-      </p:par>
-    </p:tnLst>
-  </p:timing>
-</p:sld>
-</file>
-
-<file path=ppt/slides/slide47.xml><?xml version="1.0" encoding="utf-8"?>
+<file path=ppt/slides/slide26.xml><?xml version="1.0" encoding="utf-8"?>
 <p:sld xmlns:a="http://schemas.openxmlformats.org/drawingml/2006/main" xmlns:r="http://schemas.openxmlformats.org/officeDocument/2006/relationships" xmlns:p="http://schemas.openxmlformats.org/presentationml/2006/main">
   <p:cSld>
     <p:spTree>
@@ -12307,6 +9398,527 @@
     <p:extLst>
       <p:ext uri="{BB962C8B-B14F-4D97-AF65-F5344CB8AC3E}">
         <p14:creationId xmlns:p14="http://schemas.microsoft.com/office/powerpoint/2010/main" val="3114277076"/>
+      </p:ext>
+    </p:extLst>
+  </p:cSld>
+  <p:clrMapOvr>
+    <a:masterClrMapping/>
+  </p:clrMapOvr>
+  <mc:AlternateContent xmlns:mc="http://schemas.openxmlformats.org/markup-compatibility/2006" xmlns:p14="http://schemas.microsoft.com/office/powerpoint/2010/main">
+    <mc:Choice Requires="p14">
+      <p:transition spd="med" p14:dur="700">
+        <p:fade/>
+      </p:transition>
+    </mc:Choice>
+    <mc:Fallback xmlns="">
+      <p:transition spd="med">
+        <p:fade/>
+      </p:transition>
+    </mc:Fallback>
+  </mc:AlternateContent>
+  <p:timing>
+    <p:tnLst>
+      <p:par>
+        <p:cTn id="1" dur="indefinite" restart="never" nodeType="tmRoot"/>
+      </p:par>
+    </p:tnLst>
+  </p:timing>
+</p:sld>
+</file>
+
+<file path=ppt/slides/slide3.xml><?xml version="1.0" encoding="utf-8"?>
+<p:sld xmlns:a="http://schemas.openxmlformats.org/drawingml/2006/main" xmlns:r="http://schemas.openxmlformats.org/officeDocument/2006/relationships" xmlns:p="http://schemas.openxmlformats.org/presentationml/2006/main">
+  <p:cSld>
+    <p:spTree>
+      <p:nvGrpSpPr>
+        <p:cNvPr id="1" name=""/>
+        <p:cNvGrpSpPr/>
+        <p:nvPr/>
+      </p:nvGrpSpPr>
+      <p:grpSpPr>
+        <a:xfrm>
+          <a:off x="0" y="0"/>
+          <a:ext cx="0" cy="0"/>
+          <a:chOff x="0" y="0"/>
+          <a:chExt cx="0" cy="0"/>
+        </a:xfrm>
+      </p:grpSpPr>
+      <p:sp>
+        <p:nvSpPr>
+          <p:cNvPr id="3" name="Marcador de Posição de Conteúdo 2">
+            <a:extLst>
+              <a:ext uri="{FF2B5EF4-FFF2-40B4-BE49-F238E27FC236}">
+                <a16:creationId xmlns:a16="http://schemas.microsoft.com/office/drawing/2014/main" id="{78155F68-0F43-4FE9-A743-20F9DAFEFA50}"/>
+              </a:ext>
+            </a:extLst>
+          </p:cNvPr>
+          <p:cNvSpPr>
+            <a:spLocks noGrp="1"/>
+          </p:cNvSpPr>
+          <p:nvPr>
+            <p:ph idx="1"/>
+          </p:nvPr>
+        </p:nvSpPr>
+        <p:spPr>
+          <a:xfrm>
+            <a:off x="677334" y="706583"/>
+            <a:ext cx="8596668" cy="5334780"/>
+          </a:xfrm>
+        </p:spPr>
+        <p:txBody>
+          <a:bodyPr>
+            <a:normAutofit/>
+          </a:bodyPr>
+          <a:lstStyle/>
+          <a:p>
+            <a:pPr>
+              <a:lnSpc>
+                <a:spcPct val="150000"/>
+              </a:lnSpc>
+            </a:pPr>
+            <a:r>
+              <a:rPr lang="pt-PT" sz="2000" dirty="0">
+                <a:solidFill>
+                  <a:schemeClr val="tx1"/>
+                </a:solidFill>
+              </a:rPr>
+              <a:t>Contextualização </a:t>
+            </a:r>
+          </a:p>
+          <a:p>
+            <a:pPr>
+              <a:lnSpc>
+                <a:spcPct val="150000"/>
+              </a:lnSpc>
+            </a:pPr>
+            <a:r>
+              <a:rPr lang="pt-PT" sz="2000" dirty="0">
+                <a:solidFill>
+                  <a:schemeClr val="tx1"/>
+                </a:solidFill>
+              </a:rPr>
+              <a:t>Motivação e Objetivos</a:t>
+            </a:r>
+          </a:p>
+          <a:p>
+            <a:pPr>
+              <a:lnSpc>
+                <a:spcPct val="150000"/>
+              </a:lnSpc>
+            </a:pPr>
+            <a:r>
+              <a:rPr lang="pt-PT" sz="2000" dirty="0">
+                <a:solidFill>
+                  <a:schemeClr val="tx1"/>
+                </a:solidFill>
+              </a:rPr>
+              <a:t>Definição da Identidade do Sistema a Desenvolver </a:t>
+            </a:r>
+          </a:p>
+          <a:p>
+            <a:pPr>
+              <a:lnSpc>
+                <a:spcPct val="150000"/>
+              </a:lnSpc>
+            </a:pPr>
+            <a:r>
+              <a:rPr lang="pt-PT" sz="2000" dirty="0">
+                <a:solidFill>
+                  <a:schemeClr val="tx1"/>
+                </a:solidFill>
+              </a:rPr>
+              <a:t>Análise de Viabilidade </a:t>
+            </a:r>
+          </a:p>
+          <a:p>
+            <a:pPr>
+              <a:lnSpc>
+                <a:spcPct val="150000"/>
+              </a:lnSpc>
+            </a:pPr>
+            <a:r>
+              <a:rPr lang="pt-PT" sz="2000" dirty="0">
+                <a:solidFill>
+                  <a:schemeClr val="tx1"/>
+                </a:solidFill>
+              </a:rPr>
+              <a:t>Identificação dos Recursos Necessários </a:t>
+            </a:r>
+          </a:p>
+          <a:p>
+            <a:pPr>
+              <a:lnSpc>
+                <a:spcPct val="150000"/>
+              </a:lnSpc>
+            </a:pPr>
+            <a:r>
+              <a:rPr lang="pt-PT" sz="2000" dirty="0">
+                <a:solidFill>
+                  <a:schemeClr val="tx1"/>
+                </a:solidFill>
+              </a:rPr>
+              <a:t>Modelo de Sistema </a:t>
+            </a:r>
+          </a:p>
+          <a:p>
+            <a:pPr>
+              <a:lnSpc>
+                <a:spcPct val="150000"/>
+              </a:lnSpc>
+            </a:pPr>
+            <a:r>
+              <a:rPr lang="pt-PT" sz="2000" dirty="0">
+                <a:solidFill>
+                  <a:schemeClr val="tx1"/>
+                </a:solidFill>
+              </a:rPr>
+              <a:t>Definição de Medidas de Sucesso </a:t>
+            </a:r>
+          </a:p>
+          <a:p>
+            <a:pPr>
+              <a:lnSpc>
+                <a:spcPct val="150000"/>
+              </a:lnSpc>
+            </a:pPr>
+            <a:r>
+              <a:rPr lang="pt-PT" sz="2000" dirty="0">
+                <a:solidFill>
+                  <a:schemeClr val="tx1"/>
+                </a:solidFill>
+              </a:rPr>
+              <a:t>Plano de Desenvolvimento </a:t>
+            </a:r>
+          </a:p>
+        </p:txBody>
+      </p:sp>
+    </p:spTree>
+    <p:extLst>
+      <p:ext uri="{BB962C8B-B14F-4D97-AF65-F5344CB8AC3E}">
+        <p14:creationId xmlns:p14="http://schemas.microsoft.com/office/powerpoint/2010/main" val="482868652"/>
+      </p:ext>
+    </p:extLst>
+  </p:cSld>
+  <p:clrMapOvr>
+    <a:masterClrMapping/>
+  </p:clrMapOvr>
+  <mc:AlternateContent xmlns:mc="http://schemas.openxmlformats.org/markup-compatibility/2006" xmlns:p14="http://schemas.microsoft.com/office/powerpoint/2010/main">
+    <mc:Choice Requires="p14">
+      <p:transition spd="med" p14:dur="700">
+        <p:fade/>
+      </p:transition>
+    </mc:Choice>
+    <mc:Fallback xmlns="">
+      <p:transition spd="med">
+        <p:fade/>
+      </p:transition>
+    </mc:Fallback>
+  </mc:AlternateContent>
+  <p:timing>
+    <p:tnLst>
+      <p:par>
+        <p:cTn id="1" dur="indefinite" restart="never" nodeType="tmRoot"/>
+      </p:par>
+    </p:tnLst>
+  </p:timing>
+</p:sld>
+</file>
+
+<file path=ppt/slides/slide4.xml><?xml version="1.0" encoding="utf-8"?>
+<p:sld xmlns:a="http://schemas.openxmlformats.org/drawingml/2006/main" xmlns:r="http://schemas.openxmlformats.org/officeDocument/2006/relationships" xmlns:p="http://schemas.openxmlformats.org/presentationml/2006/main">
+  <p:cSld>
+    <p:spTree>
+      <p:nvGrpSpPr>
+        <p:cNvPr id="1" name=""/>
+        <p:cNvGrpSpPr/>
+        <p:nvPr/>
+      </p:nvGrpSpPr>
+      <p:grpSpPr>
+        <a:xfrm>
+          <a:off x="0" y="0"/>
+          <a:ext cx="0" cy="0"/>
+          <a:chOff x="0" y="0"/>
+          <a:chExt cx="0" cy="0"/>
+        </a:xfrm>
+      </p:grpSpPr>
+      <p:sp>
+        <p:nvSpPr>
+          <p:cNvPr id="6" name="Título 1">
+            <a:extLst>
+              <a:ext uri="{FF2B5EF4-FFF2-40B4-BE49-F238E27FC236}">
+                <a16:creationId xmlns:a16="http://schemas.microsoft.com/office/drawing/2014/main" id="{76E33AE5-F7BC-4721-8718-71AB3D730002}"/>
+              </a:ext>
+            </a:extLst>
+          </p:cNvPr>
+          <p:cNvSpPr txBox="1">
+            <a:spLocks/>
+          </p:cNvSpPr>
+          <p:nvPr/>
+        </p:nvSpPr>
+        <p:spPr>
+          <a:xfrm>
+            <a:off x="283968" y="234908"/>
+            <a:ext cx="8596668" cy="1320800"/>
+          </a:xfrm>
+          <a:prstGeom prst="rect">
+            <a:avLst/>
+          </a:prstGeom>
+        </p:spPr>
+        <p:txBody>
+          <a:bodyPr/>
+          <a:lstStyle>
+            <a:lvl1pPr algn="l" defTabSz="457200" rtl="0" eaLnBrk="1" latinLnBrk="0" hangingPunct="1">
+              <a:spcBef>
+                <a:spcPct val="0"/>
+              </a:spcBef>
+              <a:buNone/>
+              <a:defRPr sz="3600" kern="1200">
+                <a:solidFill>
+                  <a:schemeClr val="accent1"/>
+                </a:solidFill>
+                <a:latin typeface="+mj-lt"/>
+                <a:ea typeface="+mj-ea"/>
+                <a:cs typeface="+mj-cs"/>
+              </a:defRPr>
+            </a:lvl1pPr>
+            <a:lvl2pPr eaLnBrk="1" hangingPunct="1">
+              <a:defRPr>
+                <a:solidFill>
+                  <a:schemeClr val="tx2"/>
+                </a:solidFill>
+              </a:defRPr>
+            </a:lvl2pPr>
+            <a:lvl3pPr eaLnBrk="1" hangingPunct="1">
+              <a:defRPr>
+                <a:solidFill>
+                  <a:schemeClr val="tx2"/>
+                </a:solidFill>
+              </a:defRPr>
+            </a:lvl3pPr>
+            <a:lvl4pPr eaLnBrk="1" hangingPunct="1">
+              <a:defRPr>
+                <a:solidFill>
+                  <a:schemeClr val="tx2"/>
+                </a:solidFill>
+              </a:defRPr>
+            </a:lvl4pPr>
+            <a:lvl5pPr eaLnBrk="1" hangingPunct="1">
+              <a:defRPr>
+                <a:solidFill>
+                  <a:schemeClr val="tx2"/>
+                </a:solidFill>
+              </a:defRPr>
+            </a:lvl5pPr>
+            <a:lvl6pPr eaLnBrk="1" hangingPunct="1">
+              <a:defRPr>
+                <a:solidFill>
+                  <a:schemeClr val="tx2"/>
+                </a:solidFill>
+              </a:defRPr>
+            </a:lvl6pPr>
+            <a:lvl7pPr eaLnBrk="1" hangingPunct="1">
+              <a:defRPr>
+                <a:solidFill>
+                  <a:schemeClr val="tx2"/>
+                </a:solidFill>
+              </a:defRPr>
+            </a:lvl7pPr>
+            <a:lvl8pPr eaLnBrk="1" hangingPunct="1">
+              <a:defRPr>
+                <a:solidFill>
+                  <a:schemeClr val="tx2"/>
+                </a:solidFill>
+              </a:defRPr>
+            </a:lvl8pPr>
+            <a:lvl9pPr eaLnBrk="1" hangingPunct="1">
+              <a:defRPr>
+                <a:solidFill>
+                  <a:schemeClr val="tx2"/>
+                </a:solidFill>
+              </a:defRPr>
+            </a:lvl9pPr>
+          </a:lstStyle>
+          <a:p>
+            <a:r>
+              <a:rPr lang="pt-PT" dirty="0" smtClean="0"/>
+              <a:t>Contextualização e Motivação</a:t>
+            </a:r>
+            <a:endParaRPr lang="pt-PT" dirty="0"/>
+          </a:p>
+        </p:txBody>
+      </p:sp>
+      <p:sp>
+        <p:nvSpPr>
+          <p:cNvPr id="4" name="CaixaDeTexto 3">
+            <a:extLst>
+              <a:ext uri="{FF2B5EF4-FFF2-40B4-BE49-F238E27FC236}">
+                <a16:creationId xmlns:a16="http://schemas.microsoft.com/office/drawing/2014/main" id="{037B5F4B-DA41-45A6-98B2-0FFDF0BF4409}"/>
+              </a:ext>
+            </a:extLst>
+          </p:cNvPr>
+          <p:cNvSpPr txBox="1"/>
+          <p:nvPr/>
+        </p:nvSpPr>
+        <p:spPr>
+          <a:xfrm>
+            <a:off x="404948" y="1400499"/>
+            <a:ext cx="8987246" cy="4524315"/>
+          </a:xfrm>
+          <a:prstGeom prst="rect">
+            <a:avLst/>
+          </a:prstGeom>
+          <a:noFill/>
+        </p:spPr>
+        <p:txBody>
+          <a:bodyPr wrap="square" rtlCol="0">
+            <a:spAutoFit/>
+          </a:bodyPr>
+          <a:lstStyle/>
+          <a:p>
+            <a:endParaRPr lang="pt-PT" sz="1600" dirty="0"/>
+          </a:p>
+          <a:p>
+            <a:pPr marL="342900" indent="-342900">
+              <a:buFont typeface="Arial" panose="020B0604020202020204" pitchFamily="34" charset="0"/>
+              <a:buChar char="•"/>
+            </a:pPr>
+            <a:r>
+              <a:rPr lang="pt-PT" sz="2000" dirty="0"/>
+              <a:t>“Bebés &amp; Companhia” possui uma cadeia de infantários espalhados pela grande </a:t>
+            </a:r>
+            <a:r>
+              <a:rPr lang="pt-PT" sz="2000" dirty="0" smtClean="0"/>
+              <a:t>Lisboa;</a:t>
+            </a:r>
+          </a:p>
+          <a:p>
+            <a:pPr marL="342900" indent="-342900">
+              <a:buFont typeface="Arial" panose="020B0604020202020204" pitchFamily="34" charset="0"/>
+              <a:buChar char="•"/>
+            </a:pPr>
+            <a:endParaRPr lang="pt-PT" sz="2000" dirty="0" smtClean="0"/>
+          </a:p>
+          <a:p>
+            <a:pPr marL="342900" indent="-342900">
+              <a:buFont typeface="Arial" panose="020B0604020202020204" pitchFamily="34" charset="0"/>
+              <a:buChar char="•"/>
+            </a:pPr>
+            <a:r>
+              <a:rPr lang="pt-PT" sz="2000" b="1" dirty="0" smtClean="0">
+                <a:solidFill>
+                  <a:schemeClr val="accent2"/>
+                </a:solidFill>
+              </a:rPr>
+              <a:t>Surge</a:t>
+            </a:r>
+            <a:r>
+              <a:rPr lang="pt-PT" sz="2000" b="1" dirty="0">
+                <a:solidFill>
+                  <a:schemeClr val="accent2"/>
+                </a:solidFill>
+              </a:rPr>
+              <a:t>, assim, a ideia de fazer um serviço ao domicílio de babysitting; </a:t>
+            </a:r>
+          </a:p>
+          <a:p>
+            <a:endParaRPr lang="pt-PT" sz="2000" dirty="0"/>
+          </a:p>
+          <a:p>
+            <a:pPr marL="342900" indent="-342900">
+              <a:buFont typeface="Arial" panose="020B0604020202020204" pitchFamily="34" charset="0"/>
+              <a:buChar char="•"/>
+            </a:pPr>
+            <a:r>
+              <a:rPr lang="pt-PT" sz="2000" dirty="0"/>
+              <a:t>É criada a plataforma “GuguDadah</a:t>
+            </a:r>
+            <a:r>
+              <a:rPr lang="pt-PT" sz="2000" dirty="0" smtClean="0"/>
+              <a:t>”;</a:t>
+            </a:r>
+          </a:p>
+          <a:p>
+            <a:pPr marL="342900" indent="-342900">
+              <a:buFont typeface="Arial" panose="020B0604020202020204" pitchFamily="34" charset="0"/>
+              <a:buChar char="•"/>
+            </a:pPr>
+            <a:endParaRPr lang="pt-PT" sz="2000" dirty="0" smtClean="0"/>
+          </a:p>
+          <a:p>
+            <a:pPr marL="342900" indent="-342900">
+              <a:buFont typeface="Arial" panose="020B0604020202020204" pitchFamily="34" charset="0"/>
+              <a:buChar char="•"/>
+            </a:pPr>
+            <a:r>
+              <a:rPr lang="pt-PT" sz="2000" dirty="0"/>
+              <a:t>Dificuldade de encontrar alguém que seja </a:t>
+            </a:r>
+            <a:r>
+              <a:rPr lang="pt-PT" sz="2000" b="1" dirty="0">
+                <a:solidFill>
+                  <a:schemeClr val="accent2"/>
+                </a:solidFill>
+              </a:rPr>
+              <a:t>responsável</a:t>
+            </a:r>
+            <a:r>
+              <a:rPr lang="pt-PT" sz="2000" dirty="0"/>
+              <a:t> para </a:t>
+            </a:r>
+            <a:r>
+              <a:rPr lang="pt-PT" sz="2000" dirty="0" smtClean="0"/>
+              <a:t>cuidar dos filhos;</a:t>
+            </a:r>
+          </a:p>
+          <a:p>
+            <a:pPr marL="342900" indent="-342900">
+              <a:buFont typeface="Arial" panose="020B0604020202020204" pitchFamily="34" charset="0"/>
+              <a:buChar char="•"/>
+            </a:pPr>
+            <a:endParaRPr lang="pt-PT" sz="2000" dirty="0"/>
+          </a:p>
+          <a:p>
+            <a:pPr marL="342900" indent="-342900">
+              <a:buFont typeface="Arial" panose="020B0604020202020204" pitchFamily="34" charset="0"/>
+              <a:buChar char="•"/>
+            </a:pPr>
+            <a:r>
+              <a:rPr lang="pt-PT" sz="2000" dirty="0"/>
+              <a:t>A </a:t>
+            </a:r>
+            <a:r>
+              <a:rPr lang="pt-PT" sz="2000" b="1" dirty="0">
+                <a:solidFill>
+                  <a:schemeClr val="accent2"/>
+                </a:solidFill>
+              </a:rPr>
+              <a:t>inexistência</a:t>
+            </a:r>
+            <a:r>
+              <a:rPr lang="pt-PT" sz="2000" dirty="0"/>
+              <a:t> de um sistema que permita a requisição de serviços de babysitting online, em Portugal;</a:t>
+            </a:r>
+          </a:p>
+          <a:p>
+            <a:pPr marL="342900" indent="-342900">
+              <a:buFont typeface="Arial" panose="020B0604020202020204" pitchFamily="34" charset="0"/>
+              <a:buChar char="•"/>
+            </a:pPr>
+            <a:endParaRPr lang="pt-PT" sz="1600" dirty="0" smtClean="0"/>
+          </a:p>
+          <a:p>
+            <a:pPr marL="342900" indent="-342900">
+              <a:buFont typeface="Arial" panose="020B0604020202020204" pitchFamily="34" charset="0"/>
+              <a:buChar char="•"/>
+            </a:pPr>
+            <a:endParaRPr lang="pt-PT" sz="1600" dirty="0"/>
+          </a:p>
+        </p:txBody>
+      </p:sp>
+    </p:spTree>
+    <p:extLst>
+      <p:ext uri="{BB962C8B-B14F-4D97-AF65-F5344CB8AC3E}">
+        <p14:creationId xmlns:p14="http://schemas.microsoft.com/office/powerpoint/2010/main" val="1370001760"/>
       </p:ext>
     </p:extLst>
   </p:cSld>
@@ -13631,11 +11243,7 @@
             </a:r>
             <a:r>
               <a:rPr lang="pt-PT" sz="2000" dirty="0" smtClean="0"/>
-              <a:t>em</a:t>
-            </a:r>
-            <a:r>
-              <a:rPr lang="pt-PT" sz="2000" dirty="0" smtClean="0"/>
-              <a:t> </a:t>
+              <a:t>em </a:t>
             </a:r>
             <a:r>
               <a:rPr lang="pt-PT" sz="2000" b="1" dirty="0" smtClean="0">

</xml_diff>

<commit_message>
Point 1 of implementation
</commit_message>
<xml_diff>
--- a/relatorio/Fase 3/LI4.pptx
+++ b/relatorio/Fase 3/LI4.pptx
@@ -5,7 +5,7 @@
     <p:sldMasterId id="2147483648" r:id="rId1"/>
   </p:sldMasterIdLst>
   <p:notesMasterIdLst>
-    <p:notesMasterId r:id="rId28"/>
+    <p:notesMasterId r:id="rId32"/>
   </p:notesMasterIdLst>
   <p:sldIdLst>
     <p:sldId id="256" r:id="rId2"/>
@@ -33,7 +33,11 @@
     <p:sldId id="351" r:id="rId24"/>
     <p:sldId id="350" r:id="rId25"/>
     <p:sldId id="352" r:id="rId26"/>
-    <p:sldId id="303" r:id="rId27"/>
+    <p:sldId id="353" r:id="rId27"/>
+    <p:sldId id="354" r:id="rId28"/>
+    <p:sldId id="355" r:id="rId29"/>
+    <p:sldId id="356" r:id="rId30"/>
+    <p:sldId id="303" r:id="rId31"/>
   </p:sldIdLst>
   <p:sldSz cx="12192000" cy="6858000"/>
   <p:notesSz cx="6858000" cy="9144000"/>
@@ -222,7 +226,7 @@
           <a:p>
             <a:fld id="{FC77EE40-E473-4F3B-ABB7-4026700F0D66}" type="datetimeFigureOut">
               <a:rPr lang="pt-PT" smtClean="0"/>
-              <a:t>07-06-2018</a:t>
+              <a:t>08-06-2018</a:t>
             </a:fld>
             <a:endParaRPr lang="pt-PT" dirty="0"/>
           </a:p>
@@ -648,6 +652,98 @@
     <p:extLst>
       <p:ext uri="{BB962C8B-B14F-4D97-AF65-F5344CB8AC3E}">
         <p14:creationId xmlns:p14="http://schemas.microsoft.com/office/powerpoint/2010/main" val="661589648"/>
+      </p:ext>
+    </p:extLst>
+  </p:cSld>
+  <p:clrMapOvr>
+    <a:masterClrMapping/>
+  </p:clrMapOvr>
+</p:notes>
+</file>
+
+<file path=ppt/notesSlides/notesSlide3.xml><?xml version="1.0" encoding="utf-8"?>
+<p:notes xmlns:a="http://schemas.openxmlformats.org/drawingml/2006/main" xmlns:r="http://schemas.openxmlformats.org/officeDocument/2006/relationships" xmlns:p="http://schemas.openxmlformats.org/presentationml/2006/main">
+  <p:cSld>
+    <p:spTree>
+      <p:nvGrpSpPr>
+        <p:cNvPr id="1" name=""/>
+        <p:cNvGrpSpPr/>
+        <p:nvPr/>
+      </p:nvGrpSpPr>
+      <p:grpSpPr>
+        <a:xfrm>
+          <a:off x="0" y="0"/>
+          <a:ext cx="0" cy="0"/>
+          <a:chOff x="0" y="0"/>
+          <a:chExt cx="0" cy="0"/>
+        </a:xfrm>
+      </p:grpSpPr>
+      <p:sp>
+        <p:nvSpPr>
+          <p:cNvPr id="2" name="Slide Image Placeholder 1"/>
+          <p:cNvSpPr>
+            <a:spLocks noGrp="1" noRot="1" noChangeAspect="1"/>
+          </p:cNvSpPr>
+          <p:nvPr>
+            <p:ph type="sldImg"/>
+          </p:nvPr>
+        </p:nvSpPr>
+        <p:spPr/>
+      </p:sp>
+      <p:sp>
+        <p:nvSpPr>
+          <p:cNvPr id="3" name="Notes Placeholder 2"/>
+          <p:cNvSpPr>
+            <a:spLocks noGrp="1"/>
+          </p:cNvSpPr>
+          <p:nvPr>
+            <p:ph type="body" idx="1"/>
+          </p:nvPr>
+        </p:nvSpPr>
+        <p:spPr/>
+        <p:txBody>
+          <a:bodyPr/>
+          <a:lstStyle/>
+          <a:p>
+            <a:r>
+              <a:rPr lang="pt-PT" dirty="0" smtClean="0"/>
+              <a:t>Foi desenvolvido o projeto</a:t>
+            </a:r>
+            <a:r>
+              <a:rPr lang="pt-PT" baseline="0" dirty="0" smtClean="0"/>
+              <a:t> em Visual Studio que, juntamente com os serviços da Microsoft Azure permitem a disponibilização do website online. O browser, utilizado em PC ou smartphone, permite cobrir uma vasta gama de dispositivos, graças à implementação dinâmica da página.</a:t>
+            </a:r>
+            <a:endParaRPr lang="pt-PT" dirty="0"/>
+          </a:p>
+        </p:txBody>
+      </p:sp>
+      <p:sp>
+        <p:nvSpPr>
+          <p:cNvPr id="4" name="Slide Number Placeholder 3"/>
+          <p:cNvSpPr>
+            <a:spLocks noGrp="1"/>
+          </p:cNvSpPr>
+          <p:nvPr>
+            <p:ph type="sldNum" sz="quarter" idx="10"/>
+          </p:nvPr>
+        </p:nvSpPr>
+        <p:spPr/>
+        <p:txBody>
+          <a:bodyPr/>
+          <a:lstStyle/>
+          <a:p>
+            <a:fld id="{F2D13AFA-C489-4F08-BBC3-E69A09335FB4}" type="slidenum">
+              <a:rPr lang="pt-PT" smtClean="0"/>
+              <a:t>27</a:t>
+            </a:fld>
+            <a:endParaRPr lang="pt-PT" dirty="0"/>
+          </a:p>
+        </p:txBody>
+      </p:sp>
+    </p:spTree>
+    <p:extLst>
+      <p:ext uri="{BB962C8B-B14F-4D97-AF65-F5344CB8AC3E}">
+        <p14:creationId xmlns:p14="http://schemas.microsoft.com/office/powerpoint/2010/main" val="2309181277"/>
       </p:ext>
     </p:extLst>
   </p:cSld>
@@ -1380,7 +1476,7 @@
             <a:fld id="{B61BEF0D-F0BB-DE4B-95CE-6DB70DBA9567}" type="datetimeFigureOut">
               <a:rPr lang="en-US" dirty="0"/>
               <a:pPr/>
-              <a:t>6/7/2018</a:t>
+              <a:t>6/8/2018</a:t>
             </a:fld>
             <a:endParaRPr lang="en-US" dirty="0"/>
           </a:p>
@@ -1628,7 +1724,7 @@
             <a:fld id="{B61BEF0D-F0BB-DE4B-95CE-6DB70DBA9567}" type="datetimeFigureOut">
               <a:rPr lang="en-US" dirty="0"/>
               <a:pPr/>
-              <a:t>6/7/2018</a:t>
+              <a:t>6/8/2018</a:t>
             </a:fld>
             <a:endParaRPr lang="en-US" dirty="0"/>
           </a:p>
@@ -1939,7 +2035,7 @@
             <a:fld id="{B61BEF0D-F0BB-DE4B-95CE-6DB70DBA9567}" type="datetimeFigureOut">
               <a:rPr lang="en-US" dirty="0"/>
               <a:pPr/>
-              <a:t>6/7/2018</a:t>
+              <a:t>6/8/2018</a:t>
             </a:fld>
             <a:endParaRPr lang="en-US" dirty="0"/>
           </a:p>
@@ -2277,7 +2373,7 @@
             <a:fld id="{B61BEF0D-F0BB-DE4B-95CE-6DB70DBA9567}" type="datetimeFigureOut">
               <a:rPr lang="en-US" dirty="0"/>
               <a:pPr/>
-              <a:t>6/7/2018</a:t>
+              <a:t>6/8/2018</a:t>
             </a:fld>
             <a:endParaRPr lang="en-US" dirty="0"/>
           </a:p>
@@ -2588,7 +2684,7 @@
             <a:fld id="{B61BEF0D-F0BB-DE4B-95CE-6DB70DBA9567}" type="datetimeFigureOut">
               <a:rPr lang="en-US" dirty="0"/>
               <a:pPr/>
-              <a:t>6/7/2018</a:t>
+              <a:t>6/8/2018</a:t>
             </a:fld>
             <a:endParaRPr lang="en-US" dirty="0"/>
           </a:p>
@@ -2978,7 +3074,7 @@
             <a:fld id="{B61BEF0D-F0BB-DE4B-95CE-6DB70DBA9567}" type="datetimeFigureOut">
               <a:rPr lang="en-US" dirty="0"/>
               <a:pPr/>
-              <a:t>6/7/2018</a:t>
+              <a:t>6/8/2018</a:t>
             </a:fld>
             <a:endParaRPr lang="en-US" dirty="0"/>
           </a:p>
@@ -3144,7 +3240,7 @@
           <a:p>
             <a:fld id="{55C6B4A9-1611-4792-9094-5F34BCA07E0B}" type="datetimeFigureOut">
               <a:rPr lang="en-US" dirty="0"/>
-              <a:t>6/7/2018</a:t>
+              <a:t>6/8/2018</a:t>
             </a:fld>
             <a:endParaRPr lang="en-US" dirty="0"/>
           </a:p>
@@ -3320,7 +3416,7 @@
             <a:fld id="{B61BEF0D-F0BB-DE4B-95CE-6DB70DBA9567}" type="datetimeFigureOut">
               <a:rPr lang="en-US" dirty="0"/>
               <a:pPr/>
-              <a:t>6/7/2018</a:t>
+              <a:t>6/8/2018</a:t>
             </a:fld>
             <a:endParaRPr lang="en-US" dirty="0"/>
           </a:p>
@@ -3493,7 +3589,7 @@
             <a:fld id="{B61BEF0D-F0BB-DE4B-95CE-6DB70DBA9567}" type="datetimeFigureOut">
               <a:rPr lang="en-US" dirty="0"/>
               <a:pPr/>
-              <a:t>6/7/2018</a:t>
+              <a:t>6/8/2018</a:t>
             </a:fld>
             <a:endParaRPr lang="en-US" dirty="0"/>
           </a:p>
@@ -3737,7 +3833,7 @@
             <a:fld id="{B61BEF0D-F0BB-DE4B-95CE-6DB70DBA9567}" type="datetimeFigureOut">
               <a:rPr lang="en-US" dirty="0"/>
               <a:pPr/>
-              <a:t>6/7/2018</a:t>
+              <a:t>6/8/2018</a:t>
             </a:fld>
             <a:endParaRPr lang="en-US" dirty="0"/>
           </a:p>
@@ -3965,7 +4061,7 @@
           <a:p>
             <a:fld id="{EB712588-04B1-427B-82EE-E8DB90309F08}" type="datetimeFigureOut">
               <a:rPr lang="en-US" dirty="0"/>
-              <a:t>6/7/2018</a:t>
+              <a:t>6/8/2018</a:t>
             </a:fld>
             <a:endParaRPr lang="en-US" dirty="0"/>
           </a:p>
@@ -4335,7 +4431,7 @@
             <a:fld id="{B61BEF0D-F0BB-DE4B-95CE-6DB70DBA9567}" type="datetimeFigureOut">
               <a:rPr lang="en-US" dirty="0"/>
               <a:pPr/>
-              <a:t>6/7/2018</a:t>
+              <a:t>6/8/2018</a:t>
             </a:fld>
             <a:endParaRPr lang="en-US" dirty="0"/>
           </a:p>
@@ -4455,7 +4551,7 @@
             <a:fld id="{B61BEF0D-F0BB-DE4B-95CE-6DB70DBA9567}" type="datetimeFigureOut">
               <a:rPr lang="en-US" dirty="0"/>
               <a:pPr/>
-              <a:t>6/7/2018</a:t>
+              <a:t>6/8/2018</a:t>
             </a:fld>
             <a:endParaRPr lang="en-US" dirty="0"/>
           </a:p>
@@ -4547,7 +4643,7 @@
             <a:fld id="{B61BEF0D-F0BB-DE4B-95CE-6DB70DBA9567}" type="datetimeFigureOut">
               <a:rPr lang="en-US" dirty="0"/>
               <a:pPr/>
-              <a:t>6/7/2018</a:t>
+              <a:t>6/8/2018</a:t>
             </a:fld>
             <a:endParaRPr lang="en-US" dirty="0"/>
           </a:p>
@@ -4798,7 +4894,7 @@
           <a:p>
             <a:fld id="{42A54C80-263E-416B-A8E0-580EDEADCBDC}" type="datetimeFigureOut">
               <a:rPr lang="en-US" dirty="0"/>
-              <a:t>6/7/2018</a:t>
+              <a:t>6/8/2018</a:t>
             </a:fld>
             <a:endParaRPr lang="en-US" dirty="0"/>
           </a:p>
@@ -5057,7 +5153,7 @@
             <a:fld id="{B61BEF0D-F0BB-DE4B-95CE-6DB70DBA9567}" type="datetimeFigureOut">
               <a:rPr lang="en-US" dirty="0"/>
               <a:pPr/>
-              <a:t>6/7/2018</a:t>
+              <a:t>6/8/2018</a:t>
             </a:fld>
             <a:endParaRPr lang="en-US" dirty="0"/>
           </a:p>
@@ -5797,7 +5893,7 @@
             <a:fld id="{B61BEF0D-F0BB-DE4B-95CE-6DB70DBA9567}" type="datetimeFigureOut">
               <a:rPr lang="en-US" dirty="0"/>
               <a:pPr/>
-              <a:t>6/7/2018</a:t>
+              <a:t>6/8/2018</a:t>
             </a:fld>
             <a:endParaRPr lang="en-US" dirty="0"/>
           </a:p>
@@ -8951,6 +9047,714 @@
       </p:grpSpPr>
       <p:sp>
         <p:nvSpPr>
+          <p:cNvPr id="2" name="Title 1"/>
+          <p:cNvSpPr>
+            <a:spLocks noGrp="1"/>
+          </p:cNvSpPr>
+          <p:nvPr>
+            <p:ph type="title"/>
+          </p:nvPr>
+        </p:nvSpPr>
+        <p:spPr/>
+        <p:txBody>
+          <a:bodyPr/>
+          <a:lstStyle/>
+          <a:p>
+            <a:r>
+              <a:rPr lang="pt-PT" dirty="0"/>
+              <a:t>Parte </a:t>
+            </a:r>
+            <a:r>
+              <a:rPr lang="pt-PT" dirty="0" smtClean="0"/>
+              <a:t>III</a:t>
+            </a:r>
+            <a:endParaRPr lang="pt-PT" dirty="0"/>
+          </a:p>
+        </p:txBody>
+      </p:sp>
+      <p:sp>
+        <p:nvSpPr>
+          <p:cNvPr id="3" name="Text Placeholder 2"/>
+          <p:cNvSpPr>
+            <a:spLocks noGrp="1"/>
+          </p:cNvSpPr>
+          <p:nvPr>
+            <p:ph type="body" idx="1"/>
+          </p:nvPr>
+        </p:nvSpPr>
+        <p:spPr/>
+        <p:txBody>
+          <a:bodyPr/>
+          <a:lstStyle/>
+          <a:p>
+            <a:r>
+              <a:rPr lang="pt-PT" dirty="0" smtClean="0"/>
+              <a:t>Implementação</a:t>
+            </a:r>
+          </a:p>
+        </p:txBody>
+      </p:sp>
+    </p:spTree>
+    <p:extLst>
+      <p:ext uri="{BB962C8B-B14F-4D97-AF65-F5344CB8AC3E}">
+        <p14:creationId xmlns:p14="http://schemas.microsoft.com/office/powerpoint/2010/main" val="774520532"/>
+      </p:ext>
+    </p:extLst>
+  </p:cSld>
+  <p:clrMapOvr>
+    <a:masterClrMapping/>
+  </p:clrMapOvr>
+  <mc:AlternateContent xmlns:mc="http://schemas.openxmlformats.org/markup-compatibility/2006" xmlns:p14="http://schemas.microsoft.com/office/powerpoint/2010/main">
+    <mc:Choice Requires="p14">
+      <p:transition spd="med" p14:dur="700">
+        <p:fade/>
+      </p:transition>
+    </mc:Choice>
+    <mc:Fallback xmlns="">
+      <p:transition spd="med">
+        <p:fade/>
+      </p:transition>
+    </mc:Fallback>
+  </mc:AlternateContent>
+  <p:timing>
+    <p:tnLst>
+      <p:par>
+        <p:cTn id="1" dur="indefinite" restart="never" nodeType="tmRoot"/>
+      </p:par>
+    </p:tnLst>
+  </p:timing>
+</p:sld>
+</file>
+
+<file path=ppt/slides/slide27.xml><?xml version="1.0" encoding="utf-8"?>
+<p:sld xmlns:a="http://schemas.openxmlformats.org/drawingml/2006/main" xmlns:r="http://schemas.openxmlformats.org/officeDocument/2006/relationships" xmlns:p="http://schemas.openxmlformats.org/presentationml/2006/main">
+  <p:cSld>
+    <p:spTree>
+      <p:nvGrpSpPr>
+        <p:cNvPr id="1" name=""/>
+        <p:cNvGrpSpPr/>
+        <p:nvPr/>
+      </p:nvGrpSpPr>
+      <p:grpSpPr>
+        <a:xfrm>
+          <a:off x="0" y="0"/>
+          <a:ext cx="0" cy="0"/>
+          <a:chOff x="0" y="0"/>
+          <a:chExt cx="0" cy="0"/>
+        </a:xfrm>
+      </p:grpSpPr>
+      <p:sp>
+        <p:nvSpPr>
+          <p:cNvPr id="4" name="Title 3"/>
+          <p:cNvSpPr>
+            <a:spLocks noGrp="1"/>
+          </p:cNvSpPr>
+          <p:nvPr>
+            <p:ph type="title"/>
+          </p:nvPr>
+        </p:nvSpPr>
+        <p:spPr>
+          <a:xfrm>
+            <a:off x="644220" y="422442"/>
+            <a:ext cx="8596668" cy="1320800"/>
+          </a:xfrm>
+        </p:spPr>
+        <p:txBody>
+          <a:bodyPr/>
+          <a:lstStyle/>
+          <a:p>
+            <a:r>
+              <a:rPr lang="pt-PT" dirty="0" smtClean="0"/>
+              <a:t>Tecnologias escolhidas</a:t>
+            </a:r>
+            <a:endParaRPr lang="pt-PT" dirty="0"/>
+          </a:p>
+        </p:txBody>
+      </p:sp>
+      <p:pic>
+        <p:nvPicPr>
+          <p:cNvPr id="1026" name="Picture 2" descr="Resultado de imagem para visual studio logo"/>
+          <p:cNvPicPr>
+            <a:picLocks noChangeAspect="1" noChangeArrowheads="1"/>
+          </p:cNvPicPr>
+          <p:nvPr/>
+        </p:nvPicPr>
+        <p:blipFill>
+          <a:blip r:embed="rId3">
+            <a:extLst>
+              <a:ext uri="{28A0092B-C50C-407E-A947-70E740481C1C}">
+                <a14:useLocalDpi xmlns:a14="http://schemas.microsoft.com/office/drawing/2010/main" val="0"/>
+              </a:ext>
+            </a:extLst>
+          </a:blip>
+          <a:srcRect/>
+          <a:stretch>
+            <a:fillRect/>
+          </a:stretch>
+        </p:blipFill>
+        <p:spPr bwMode="auto">
+          <a:xfrm>
+            <a:off x="629998" y="1172974"/>
+            <a:ext cx="2880000" cy="2977920"/>
+          </a:xfrm>
+          <a:prstGeom prst="rect">
+            <a:avLst/>
+          </a:prstGeom>
+          <a:noFill/>
+          <a:extLst>
+            <a:ext uri="{909E8E84-426E-40DD-AFC4-6F175D3DCCD1}">
+              <a14:hiddenFill xmlns:a14="http://schemas.microsoft.com/office/drawing/2010/main">
+                <a:solidFill>
+                  <a:srgbClr val="FFFFFF"/>
+                </a:solidFill>
+              </a14:hiddenFill>
+            </a:ext>
+          </a:extLst>
+        </p:spPr>
+      </p:pic>
+      <p:pic>
+        <p:nvPicPr>
+          <p:cNvPr id="1028" name="Picture 4" descr="Resultado de imagem para browser"/>
+          <p:cNvPicPr>
+            <a:picLocks noChangeAspect="1" noChangeArrowheads="1"/>
+          </p:cNvPicPr>
+          <p:nvPr/>
+        </p:nvPicPr>
+        <p:blipFill>
+          <a:blip r:embed="rId4">
+            <a:extLst>
+              <a:ext uri="{28A0092B-C50C-407E-A947-70E740481C1C}">
+                <a14:useLocalDpi xmlns:a14="http://schemas.microsoft.com/office/drawing/2010/main" val="0"/>
+              </a:ext>
+            </a:extLst>
+          </a:blip>
+          <a:srcRect/>
+          <a:stretch>
+            <a:fillRect/>
+          </a:stretch>
+        </p:blipFill>
+        <p:spPr bwMode="auto">
+          <a:xfrm>
+            <a:off x="6327775" y="2661934"/>
+            <a:ext cx="2143125" cy="2133601"/>
+          </a:xfrm>
+          <a:prstGeom prst="rect">
+            <a:avLst/>
+          </a:prstGeom>
+          <a:noFill/>
+          <a:extLst>
+            <a:ext uri="{909E8E84-426E-40DD-AFC4-6F175D3DCCD1}">
+              <a14:hiddenFill xmlns:a14="http://schemas.microsoft.com/office/drawing/2010/main">
+                <a:solidFill>
+                  <a:srgbClr val="FFFFFF"/>
+                </a:solidFill>
+              </a14:hiddenFill>
+            </a:ext>
+          </a:extLst>
+        </p:spPr>
+      </p:pic>
+      <p:sp>
+        <p:nvSpPr>
+          <p:cNvPr id="6" name="Right Arrow 5"/>
+          <p:cNvSpPr/>
+          <p:nvPr/>
+        </p:nvSpPr>
+        <p:spPr>
+          <a:xfrm>
+            <a:off x="4004091" y="3367786"/>
+            <a:ext cx="1876926" cy="721895"/>
+          </a:xfrm>
+          <a:prstGeom prst="rightArrow">
+            <a:avLst/>
+          </a:prstGeom>
+        </p:spPr>
+        <p:style>
+          <a:lnRef idx="3">
+            <a:schemeClr val="lt1"/>
+          </a:lnRef>
+          <a:fillRef idx="1">
+            <a:schemeClr val="accent1"/>
+          </a:fillRef>
+          <a:effectRef idx="1">
+            <a:schemeClr val="accent1"/>
+          </a:effectRef>
+          <a:fontRef idx="minor">
+            <a:schemeClr val="lt1"/>
+          </a:fontRef>
+        </p:style>
+        <p:txBody>
+          <a:bodyPr rtlCol="0" anchor="ctr"/>
+          <a:lstStyle/>
+          <a:p>
+            <a:pPr algn="ctr"/>
+            <a:endParaRPr lang="pt-PT"/>
+          </a:p>
+        </p:txBody>
+      </p:sp>
+      <p:pic>
+        <p:nvPicPr>
+          <p:cNvPr id="1032" name="Picture 8" descr="Resultado de imagem para azure"/>
+          <p:cNvPicPr>
+            <a:picLocks noChangeAspect="1" noChangeArrowheads="1"/>
+          </p:cNvPicPr>
+          <p:nvPr/>
+        </p:nvPicPr>
+        <p:blipFill>
+          <a:blip r:embed="rId5">
+            <a:extLst>
+              <a:ext uri="{28A0092B-C50C-407E-A947-70E740481C1C}">
+                <a14:useLocalDpi xmlns:a14="http://schemas.microsoft.com/office/drawing/2010/main" val="0"/>
+              </a:ext>
+            </a:extLst>
+          </a:blip>
+          <a:srcRect/>
+          <a:stretch>
+            <a:fillRect/>
+          </a:stretch>
+        </p:blipFill>
+        <p:spPr bwMode="auto">
+          <a:xfrm>
+            <a:off x="1008287" y="5017925"/>
+            <a:ext cx="2123421" cy="1592566"/>
+          </a:xfrm>
+          <a:prstGeom prst="rect">
+            <a:avLst/>
+          </a:prstGeom>
+          <a:noFill/>
+          <a:extLst>
+            <a:ext uri="{909E8E84-426E-40DD-AFC4-6F175D3DCCD1}">
+              <a14:hiddenFill xmlns:a14="http://schemas.microsoft.com/office/drawing/2010/main">
+                <a:solidFill>
+                  <a:srgbClr val="FFFFFF"/>
+                </a:solidFill>
+              </a14:hiddenFill>
+            </a:ext>
+          </a:extLst>
+        </p:spPr>
+      </p:pic>
+      <p:pic>
+        <p:nvPicPr>
+          <p:cNvPr id="1030" name="Picture 6" descr="Resultado de imagem para asp net"/>
+          <p:cNvPicPr>
+            <a:picLocks noChangeAspect="1" noChangeArrowheads="1"/>
+          </p:cNvPicPr>
+          <p:nvPr/>
+        </p:nvPicPr>
+        <p:blipFill>
+          <a:blip r:embed="rId6">
+            <a:extLst>
+              <a:ext uri="{28A0092B-C50C-407E-A947-70E740481C1C}">
+                <a14:useLocalDpi xmlns:a14="http://schemas.microsoft.com/office/drawing/2010/main" val="0"/>
+              </a:ext>
+            </a:extLst>
+          </a:blip>
+          <a:srcRect/>
+          <a:stretch>
+            <a:fillRect/>
+          </a:stretch>
+        </p:blipFill>
+        <p:spPr bwMode="auto">
+          <a:xfrm>
+            <a:off x="888898" y="3367786"/>
+            <a:ext cx="2362200" cy="2362200"/>
+          </a:xfrm>
+          <a:prstGeom prst="rect">
+            <a:avLst/>
+          </a:prstGeom>
+          <a:noFill/>
+          <a:extLst>
+            <a:ext uri="{909E8E84-426E-40DD-AFC4-6F175D3DCCD1}">
+              <a14:hiddenFill xmlns:a14="http://schemas.microsoft.com/office/drawing/2010/main">
+                <a:solidFill>
+                  <a:srgbClr val="FFFFFF"/>
+                </a:solidFill>
+              </a14:hiddenFill>
+            </a:ext>
+          </a:extLst>
+        </p:spPr>
+      </p:pic>
+    </p:spTree>
+    <p:extLst>
+      <p:ext uri="{BB962C8B-B14F-4D97-AF65-F5344CB8AC3E}">
+        <p14:creationId xmlns:p14="http://schemas.microsoft.com/office/powerpoint/2010/main" val="1031828773"/>
+      </p:ext>
+    </p:extLst>
+  </p:cSld>
+  <p:clrMapOvr>
+    <a:masterClrMapping/>
+  </p:clrMapOvr>
+</p:sld>
+</file>
+
+<file path=ppt/slides/slide28.xml><?xml version="1.0" encoding="utf-8"?>
+<p:sld xmlns:a="http://schemas.openxmlformats.org/drawingml/2006/main" xmlns:r="http://schemas.openxmlformats.org/officeDocument/2006/relationships" xmlns:p="http://schemas.openxmlformats.org/presentationml/2006/main">
+  <p:cSld>
+    <p:spTree>
+      <p:nvGrpSpPr>
+        <p:cNvPr id="1" name=""/>
+        <p:cNvGrpSpPr/>
+        <p:nvPr/>
+      </p:nvGrpSpPr>
+      <p:grpSpPr>
+        <a:xfrm>
+          <a:off x="0" y="0"/>
+          <a:ext cx="0" cy="0"/>
+          <a:chOff x="0" y="0"/>
+          <a:chExt cx="0" cy="0"/>
+        </a:xfrm>
+      </p:grpSpPr>
+      <p:sp>
+        <p:nvSpPr>
+          <p:cNvPr id="2" name="Title 1"/>
+          <p:cNvSpPr>
+            <a:spLocks noGrp="1"/>
+          </p:cNvSpPr>
+          <p:nvPr>
+            <p:ph type="title"/>
+          </p:nvPr>
+        </p:nvSpPr>
+        <p:spPr/>
+        <p:txBody>
+          <a:bodyPr/>
+          <a:lstStyle/>
+          <a:p>
+            <a:r>
+              <a:rPr lang="pt-PT" dirty="0" smtClean="0"/>
+              <a:t>Base de Dados e Povoamento</a:t>
+            </a:r>
+            <a:endParaRPr lang="pt-PT" dirty="0"/>
+          </a:p>
+        </p:txBody>
+      </p:sp>
+      <p:sp>
+        <p:nvSpPr>
+          <p:cNvPr id="3" name="Content Placeholder 2"/>
+          <p:cNvSpPr>
+            <a:spLocks noGrp="1"/>
+          </p:cNvSpPr>
+          <p:nvPr>
+            <p:ph idx="1"/>
+          </p:nvPr>
+        </p:nvSpPr>
+        <p:spPr/>
+        <p:txBody>
+          <a:bodyPr/>
+          <a:lstStyle/>
+          <a:p>
+            <a:r>
+              <a:rPr lang="pt-PT" dirty="0" smtClean="0"/>
+              <a:t>puntzzz</a:t>
+            </a:r>
+            <a:endParaRPr lang="pt-PT" dirty="0"/>
+          </a:p>
+        </p:txBody>
+      </p:sp>
+    </p:spTree>
+    <p:extLst>
+      <p:ext uri="{BB962C8B-B14F-4D97-AF65-F5344CB8AC3E}">
+        <p14:creationId xmlns:p14="http://schemas.microsoft.com/office/powerpoint/2010/main" val="3129537103"/>
+      </p:ext>
+    </p:extLst>
+  </p:cSld>
+  <p:clrMapOvr>
+    <a:masterClrMapping/>
+  </p:clrMapOvr>
+</p:sld>
+</file>
+
+<file path=ppt/slides/slide29.xml><?xml version="1.0" encoding="utf-8"?>
+<p:sld xmlns:a="http://schemas.openxmlformats.org/drawingml/2006/main" xmlns:r="http://schemas.openxmlformats.org/officeDocument/2006/relationships" xmlns:p="http://schemas.openxmlformats.org/presentationml/2006/main">
+  <p:cSld>
+    <p:spTree>
+      <p:nvGrpSpPr>
+        <p:cNvPr id="1" name=""/>
+        <p:cNvGrpSpPr/>
+        <p:nvPr/>
+      </p:nvGrpSpPr>
+      <p:grpSpPr>
+        <a:xfrm>
+          <a:off x="0" y="0"/>
+          <a:ext cx="0" cy="0"/>
+          <a:chOff x="0" y="0"/>
+          <a:chExt cx="0" cy="0"/>
+        </a:xfrm>
+      </p:grpSpPr>
+      <p:sp>
+        <p:nvSpPr>
+          <p:cNvPr id="2" name="Title 1"/>
+          <p:cNvSpPr>
+            <a:spLocks noGrp="1"/>
+          </p:cNvSpPr>
+          <p:nvPr>
+            <p:ph type="title"/>
+          </p:nvPr>
+        </p:nvSpPr>
+        <p:spPr/>
+        <p:txBody>
+          <a:bodyPr/>
+          <a:lstStyle/>
+          <a:p>
+            <a:r>
+              <a:rPr lang="pt-PT" dirty="0" smtClean="0"/>
+              <a:t>Agendar Trabalho</a:t>
+            </a:r>
+            <a:endParaRPr lang="pt-PT" dirty="0"/>
+          </a:p>
+        </p:txBody>
+      </p:sp>
+      <p:sp>
+        <p:nvSpPr>
+          <p:cNvPr id="3" name="Content Placeholder 2"/>
+          <p:cNvSpPr>
+            <a:spLocks noGrp="1"/>
+          </p:cNvSpPr>
+          <p:nvPr>
+            <p:ph idx="1"/>
+          </p:nvPr>
+        </p:nvSpPr>
+        <p:spPr/>
+        <p:txBody>
+          <a:bodyPr/>
+          <a:lstStyle/>
+          <a:p>
+            <a:r>
+              <a:rPr lang="pt-PT" dirty="0" smtClean="0"/>
+              <a:t>Imagens ilustrativas</a:t>
+            </a:r>
+            <a:endParaRPr lang="pt-PT" dirty="0"/>
+          </a:p>
+        </p:txBody>
+      </p:sp>
+    </p:spTree>
+    <p:extLst>
+      <p:ext uri="{BB962C8B-B14F-4D97-AF65-F5344CB8AC3E}">
+        <p14:creationId xmlns:p14="http://schemas.microsoft.com/office/powerpoint/2010/main" val="257212372"/>
+      </p:ext>
+    </p:extLst>
+  </p:cSld>
+  <p:clrMapOvr>
+    <a:masterClrMapping/>
+  </p:clrMapOvr>
+</p:sld>
+</file>
+
+<file path=ppt/slides/slide3.xml><?xml version="1.0" encoding="utf-8"?>
+<p:sld xmlns:a="http://schemas.openxmlformats.org/drawingml/2006/main" xmlns:r="http://schemas.openxmlformats.org/officeDocument/2006/relationships" xmlns:p="http://schemas.openxmlformats.org/presentationml/2006/main">
+  <p:cSld>
+    <p:spTree>
+      <p:nvGrpSpPr>
+        <p:cNvPr id="1" name=""/>
+        <p:cNvGrpSpPr/>
+        <p:nvPr/>
+      </p:nvGrpSpPr>
+      <p:grpSpPr>
+        <a:xfrm>
+          <a:off x="0" y="0"/>
+          <a:ext cx="0" cy="0"/>
+          <a:chOff x="0" y="0"/>
+          <a:chExt cx="0" cy="0"/>
+        </a:xfrm>
+      </p:grpSpPr>
+      <p:sp>
+        <p:nvSpPr>
+          <p:cNvPr id="3" name="Marcador de Posição de Conteúdo 2">
+            <a:extLst>
+              <a:ext uri="{FF2B5EF4-FFF2-40B4-BE49-F238E27FC236}">
+                <a16:creationId xmlns:a16="http://schemas.microsoft.com/office/drawing/2014/main" id="{78155F68-0F43-4FE9-A743-20F9DAFEFA50}"/>
+              </a:ext>
+            </a:extLst>
+          </p:cNvPr>
+          <p:cNvSpPr>
+            <a:spLocks noGrp="1"/>
+          </p:cNvSpPr>
+          <p:nvPr>
+            <p:ph idx="1"/>
+          </p:nvPr>
+        </p:nvSpPr>
+        <p:spPr>
+          <a:xfrm>
+            <a:off x="677334" y="706583"/>
+            <a:ext cx="8596668" cy="5334780"/>
+          </a:xfrm>
+        </p:spPr>
+        <p:txBody>
+          <a:bodyPr>
+            <a:normAutofit/>
+          </a:bodyPr>
+          <a:lstStyle/>
+          <a:p>
+            <a:pPr>
+              <a:lnSpc>
+                <a:spcPct val="150000"/>
+              </a:lnSpc>
+            </a:pPr>
+            <a:r>
+              <a:rPr lang="pt-PT" sz="2000" dirty="0">
+                <a:solidFill>
+                  <a:schemeClr val="tx1"/>
+                </a:solidFill>
+              </a:rPr>
+              <a:t>Contextualização </a:t>
+            </a:r>
+          </a:p>
+          <a:p>
+            <a:pPr>
+              <a:lnSpc>
+                <a:spcPct val="150000"/>
+              </a:lnSpc>
+            </a:pPr>
+            <a:r>
+              <a:rPr lang="pt-PT" sz="2000" dirty="0">
+                <a:solidFill>
+                  <a:schemeClr val="tx1"/>
+                </a:solidFill>
+              </a:rPr>
+              <a:t>Motivação e Objetivos</a:t>
+            </a:r>
+          </a:p>
+          <a:p>
+            <a:pPr>
+              <a:lnSpc>
+                <a:spcPct val="150000"/>
+              </a:lnSpc>
+            </a:pPr>
+            <a:r>
+              <a:rPr lang="pt-PT" sz="2000" dirty="0">
+                <a:solidFill>
+                  <a:schemeClr val="tx1"/>
+                </a:solidFill>
+              </a:rPr>
+              <a:t>Definição da Identidade do Sistema a Desenvolver </a:t>
+            </a:r>
+          </a:p>
+          <a:p>
+            <a:pPr>
+              <a:lnSpc>
+                <a:spcPct val="150000"/>
+              </a:lnSpc>
+            </a:pPr>
+            <a:r>
+              <a:rPr lang="pt-PT" sz="2000" dirty="0">
+                <a:solidFill>
+                  <a:schemeClr val="tx1"/>
+                </a:solidFill>
+              </a:rPr>
+              <a:t>Análise de Viabilidade </a:t>
+            </a:r>
+          </a:p>
+          <a:p>
+            <a:pPr>
+              <a:lnSpc>
+                <a:spcPct val="150000"/>
+              </a:lnSpc>
+            </a:pPr>
+            <a:r>
+              <a:rPr lang="pt-PT" sz="2000" dirty="0">
+                <a:solidFill>
+                  <a:schemeClr val="tx1"/>
+                </a:solidFill>
+              </a:rPr>
+              <a:t>Identificação dos Recursos Necessários </a:t>
+            </a:r>
+          </a:p>
+          <a:p>
+            <a:pPr>
+              <a:lnSpc>
+                <a:spcPct val="150000"/>
+              </a:lnSpc>
+            </a:pPr>
+            <a:r>
+              <a:rPr lang="pt-PT" sz="2000" dirty="0">
+                <a:solidFill>
+                  <a:schemeClr val="tx1"/>
+                </a:solidFill>
+              </a:rPr>
+              <a:t>Modelo de Sistema </a:t>
+            </a:r>
+          </a:p>
+          <a:p>
+            <a:pPr>
+              <a:lnSpc>
+                <a:spcPct val="150000"/>
+              </a:lnSpc>
+            </a:pPr>
+            <a:r>
+              <a:rPr lang="pt-PT" sz="2000" dirty="0">
+                <a:solidFill>
+                  <a:schemeClr val="tx1"/>
+                </a:solidFill>
+              </a:rPr>
+              <a:t>Definição de Medidas de Sucesso </a:t>
+            </a:r>
+          </a:p>
+          <a:p>
+            <a:pPr>
+              <a:lnSpc>
+                <a:spcPct val="150000"/>
+              </a:lnSpc>
+            </a:pPr>
+            <a:r>
+              <a:rPr lang="pt-PT" sz="2000" dirty="0">
+                <a:solidFill>
+                  <a:schemeClr val="tx1"/>
+                </a:solidFill>
+              </a:rPr>
+              <a:t>Plano de Desenvolvimento </a:t>
+            </a:r>
+          </a:p>
+        </p:txBody>
+      </p:sp>
+    </p:spTree>
+    <p:extLst>
+      <p:ext uri="{BB962C8B-B14F-4D97-AF65-F5344CB8AC3E}">
+        <p14:creationId xmlns:p14="http://schemas.microsoft.com/office/powerpoint/2010/main" val="482868652"/>
+      </p:ext>
+    </p:extLst>
+  </p:cSld>
+  <p:clrMapOvr>
+    <a:masterClrMapping/>
+  </p:clrMapOvr>
+  <mc:AlternateContent xmlns:mc="http://schemas.openxmlformats.org/markup-compatibility/2006" xmlns:p14="http://schemas.microsoft.com/office/powerpoint/2010/main">
+    <mc:Choice Requires="p14">
+      <p:transition spd="med" p14:dur="700">
+        <p:fade/>
+      </p:transition>
+    </mc:Choice>
+    <mc:Fallback xmlns="">
+      <p:transition spd="med">
+        <p:fade/>
+      </p:transition>
+    </mc:Fallback>
+  </mc:AlternateContent>
+  <p:timing>
+    <p:tnLst>
+      <p:par>
+        <p:cTn id="1" dur="indefinite" restart="never" nodeType="tmRoot"/>
+      </p:par>
+    </p:tnLst>
+  </p:timing>
+</p:sld>
+</file>
+
+<file path=ppt/slides/slide30.xml><?xml version="1.0" encoding="utf-8"?>
+<p:sld xmlns:a="http://schemas.openxmlformats.org/drawingml/2006/main" xmlns:r="http://schemas.openxmlformats.org/officeDocument/2006/relationships" xmlns:p="http://schemas.openxmlformats.org/presentationml/2006/main">
+  <p:cSld>
+    <p:spTree>
+      <p:nvGrpSpPr>
+        <p:cNvPr id="1" name=""/>
+        <p:cNvGrpSpPr/>
+        <p:nvPr/>
+      </p:nvGrpSpPr>
+      <p:grpSpPr>
+        <a:xfrm>
+          <a:off x="0" y="0"/>
+          <a:ext cx="0" cy="0"/>
+          <a:chOff x="0" y="0"/>
+          <a:chExt cx="0" cy="0"/>
+        </a:xfrm>
+      </p:grpSpPr>
+      <p:sp>
+        <p:nvSpPr>
           <p:cNvPr id="2" name="Título 1">
             <a:extLst>
               <a:ext uri="{FF2B5EF4-FFF2-40B4-BE49-F238E27FC236}">
@@ -9398,204 +10202,6 @@
     <p:extLst>
       <p:ext uri="{BB962C8B-B14F-4D97-AF65-F5344CB8AC3E}">
         <p14:creationId xmlns:p14="http://schemas.microsoft.com/office/powerpoint/2010/main" val="3114277076"/>
-      </p:ext>
-    </p:extLst>
-  </p:cSld>
-  <p:clrMapOvr>
-    <a:masterClrMapping/>
-  </p:clrMapOvr>
-  <mc:AlternateContent xmlns:mc="http://schemas.openxmlformats.org/markup-compatibility/2006" xmlns:p14="http://schemas.microsoft.com/office/powerpoint/2010/main">
-    <mc:Choice Requires="p14">
-      <p:transition spd="med" p14:dur="700">
-        <p:fade/>
-      </p:transition>
-    </mc:Choice>
-    <mc:Fallback xmlns="">
-      <p:transition spd="med">
-        <p:fade/>
-      </p:transition>
-    </mc:Fallback>
-  </mc:AlternateContent>
-  <p:timing>
-    <p:tnLst>
-      <p:par>
-        <p:cTn id="1" dur="indefinite" restart="never" nodeType="tmRoot"/>
-      </p:par>
-    </p:tnLst>
-  </p:timing>
-</p:sld>
-</file>
-
-<file path=ppt/slides/slide3.xml><?xml version="1.0" encoding="utf-8"?>
-<p:sld xmlns:a="http://schemas.openxmlformats.org/drawingml/2006/main" xmlns:r="http://schemas.openxmlformats.org/officeDocument/2006/relationships" xmlns:p="http://schemas.openxmlformats.org/presentationml/2006/main">
-  <p:cSld>
-    <p:spTree>
-      <p:nvGrpSpPr>
-        <p:cNvPr id="1" name=""/>
-        <p:cNvGrpSpPr/>
-        <p:nvPr/>
-      </p:nvGrpSpPr>
-      <p:grpSpPr>
-        <a:xfrm>
-          <a:off x="0" y="0"/>
-          <a:ext cx="0" cy="0"/>
-          <a:chOff x="0" y="0"/>
-          <a:chExt cx="0" cy="0"/>
-        </a:xfrm>
-      </p:grpSpPr>
-      <p:sp>
-        <p:nvSpPr>
-          <p:cNvPr id="3" name="Marcador de Posição de Conteúdo 2">
-            <a:extLst>
-              <a:ext uri="{FF2B5EF4-FFF2-40B4-BE49-F238E27FC236}">
-                <a16:creationId xmlns:a16="http://schemas.microsoft.com/office/drawing/2014/main" id="{78155F68-0F43-4FE9-A743-20F9DAFEFA50}"/>
-              </a:ext>
-            </a:extLst>
-          </p:cNvPr>
-          <p:cNvSpPr>
-            <a:spLocks noGrp="1"/>
-          </p:cNvSpPr>
-          <p:nvPr>
-            <p:ph idx="1"/>
-          </p:nvPr>
-        </p:nvSpPr>
-        <p:spPr>
-          <a:xfrm>
-            <a:off x="677334" y="706583"/>
-            <a:ext cx="8596668" cy="5334780"/>
-          </a:xfrm>
-        </p:spPr>
-        <p:txBody>
-          <a:bodyPr>
-            <a:normAutofit/>
-          </a:bodyPr>
-          <a:lstStyle/>
-          <a:p>
-            <a:pPr>
-              <a:lnSpc>
-                <a:spcPct val="150000"/>
-              </a:lnSpc>
-            </a:pPr>
-            <a:r>
-              <a:rPr lang="pt-PT" sz="2000" dirty="0">
-                <a:solidFill>
-                  <a:schemeClr val="tx1"/>
-                </a:solidFill>
-              </a:rPr>
-              <a:t>Contextualização </a:t>
-            </a:r>
-          </a:p>
-          <a:p>
-            <a:pPr>
-              <a:lnSpc>
-                <a:spcPct val="150000"/>
-              </a:lnSpc>
-            </a:pPr>
-            <a:r>
-              <a:rPr lang="pt-PT" sz="2000" dirty="0">
-                <a:solidFill>
-                  <a:schemeClr val="tx1"/>
-                </a:solidFill>
-              </a:rPr>
-              <a:t>Motivação e Objetivos</a:t>
-            </a:r>
-          </a:p>
-          <a:p>
-            <a:pPr>
-              <a:lnSpc>
-                <a:spcPct val="150000"/>
-              </a:lnSpc>
-            </a:pPr>
-            <a:r>
-              <a:rPr lang="pt-PT" sz="2000" dirty="0">
-                <a:solidFill>
-                  <a:schemeClr val="tx1"/>
-                </a:solidFill>
-              </a:rPr>
-              <a:t>Definição da Identidade do Sistema a Desenvolver </a:t>
-            </a:r>
-          </a:p>
-          <a:p>
-            <a:pPr>
-              <a:lnSpc>
-                <a:spcPct val="150000"/>
-              </a:lnSpc>
-            </a:pPr>
-            <a:r>
-              <a:rPr lang="pt-PT" sz="2000" dirty="0">
-                <a:solidFill>
-                  <a:schemeClr val="tx1"/>
-                </a:solidFill>
-              </a:rPr>
-              <a:t>Análise de Viabilidade </a:t>
-            </a:r>
-          </a:p>
-          <a:p>
-            <a:pPr>
-              <a:lnSpc>
-                <a:spcPct val="150000"/>
-              </a:lnSpc>
-            </a:pPr>
-            <a:r>
-              <a:rPr lang="pt-PT" sz="2000" dirty="0">
-                <a:solidFill>
-                  <a:schemeClr val="tx1"/>
-                </a:solidFill>
-              </a:rPr>
-              <a:t>Identificação dos Recursos Necessários </a:t>
-            </a:r>
-          </a:p>
-          <a:p>
-            <a:pPr>
-              <a:lnSpc>
-                <a:spcPct val="150000"/>
-              </a:lnSpc>
-            </a:pPr>
-            <a:r>
-              <a:rPr lang="pt-PT" sz="2000" dirty="0">
-                <a:solidFill>
-                  <a:schemeClr val="tx1"/>
-                </a:solidFill>
-              </a:rPr>
-              <a:t>Modelo de Sistema </a:t>
-            </a:r>
-          </a:p>
-          <a:p>
-            <a:pPr>
-              <a:lnSpc>
-                <a:spcPct val="150000"/>
-              </a:lnSpc>
-            </a:pPr>
-            <a:r>
-              <a:rPr lang="pt-PT" sz="2000" dirty="0">
-                <a:solidFill>
-                  <a:schemeClr val="tx1"/>
-                </a:solidFill>
-              </a:rPr>
-              <a:t>Definição de Medidas de Sucesso </a:t>
-            </a:r>
-          </a:p>
-          <a:p>
-            <a:pPr>
-              <a:lnSpc>
-                <a:spcPct val="150000"/>
-              </a:lnSpc>
-            </a:pPr>
-            <a:r>
-              <a:rPr lang="pt-PT" sz="2000" dirty="0">
-                <a:solidFill>
-                  <a:schemeClr val="tx1"/>
-                </a:solidFill>
-              </a:rPr>
-              <a:t>Plano de Desenvolvimento </a:t>
-            </a:r>
-          </a:p>
-        </p:txBody>
-      </p:sp>
-    </p:spTree>
-    <p:extLst>
-      <p:ext uri="{BB962C8B-B14F-4D97-AF65-F5344CB8AC3E}">
-        <p14:creationId xmlns:p14="http://schemas.microsoft.com/office/powerpoint/2010/main" val="482868652"/>
       </p:ext>
     </p:extLst>
   </p:cSld>

</xml_diff>

<commit_message>
Adding time to presentation
</commit_message>
<xml_diff>
--- a/relatorio/Fase 3/LI4.pptx
+++ b/relatorio/Fase 3/LI4.pptx
@@ -220,7 +220,7 @@
           <a:p>
             <a:fld id="{FC77EE40-E473-4F3B-ABB7-4026700F0D66}" type="datetimeFigureOut">
               <a:rPr lang="pt-PT" smtClean="0"/>
-              <a:t>11/06/2018</a:t>
+              <a:t>12/06/2018</a:t>
             </a:fld>
             <a:endParaRPr lang="pt-PT" dirty="0"/>
           </a:p>
@@ -1007,6 +1007,12 @@
               <a:rPr lang="pt-PT" baseline="0" dirty="0"/>
               <a:t> com MOCKUP</a:t>
             </a:r>
+          </a:p>
+          <a:p>
+            <a:r>
+              <a:rPr lang="pt-PT" baseline="0" dirty="0"/>
+              <a:t>TEMPO: 5:15</a:t>
+            </a:r>
             <a:endParaRPr lang="pt-PT" dirty="0"/>
           </a:p>
         </p:txBody>
@@ -1429,6 +1435,29 @@
               <a:rPr lang="pt-PT" baseline="0" dirty="0"/>
               <a:t> com MOCKUP</a:t>
             </a:r>
+          </a:p>
+          <a:p>
+            <a:pPr marL="0" marR="0" lvl="0" indent="0" algn="l" defTabSz="914400" rtl="0" eaLnBrk="1" fontAlgn="auto" latinLnBrk="0" hangingPunct="1">
+              <a:lnSpc>
+                <a:spcPct val="100000"/>
+              </a:lnSpc>
+              <a:spcBef>
+                <a:spcPts val="0"/>
+              </a:spcBef>
+              <a:spcAft>
+                <a:spcPts val="0"/>
+              </a:spcAft>
+              <a:buClrTx/>
+              <a:buSzTx/>
+              <a:buFontTx/>
+              <a:buNone/>
+              <a:tabLst/>
+              <a:defRPr/>
+            </a:pPr>
+            <a:r>
+              <a:rPr lang="pt-PT" baseline="0" dirty="0"/>
+              <a:t>TEMPO: 7:15</a:t>
+            </a:r>
             <a:endParaRPr lang="pt-PT" dirty="0"/>
           </a:p>
         </p:txBody>
@@ -1847,6 +1876,29 @@
               <a:rPr lang="pt-PT" baseline="0" dirty="0"/>
               <a:t> com MOCKUP</a:t>
             </a:r>
+          </a:p>
+          <a:p>
+            <a:pPr marL="0" marR="0" lvl="0" indent="0" algn="l" defTabSz="914400" rtl="0" eaLnBrk="1" fontAlgn="auto" latinLnBrk="0" hangingPunct="1">
+              <a:lnSpc>
+                <a:spcPct val="100000"/>
+              </a:lnSpc>
+              <a:spcBef>
+                <a:spcPts val="0"/>
+              </a:spcBef>
+              <a:spcAft>
+                <a:spcPts val="0"/>
+              </a:spcAft>
+              <a:buClrTx/>
+              <a:buSzTx/>
+              <a:buFontTx/>
+              <a:buNone/>
+              <a:tabLst/>
+              <a:defRPr/>
+            </a:pPr>
+            <a:r>
+              <a:rPr lang="pt-PT" baseline="0" dirty="0"/>
+              <a:t>TEMPO: 8:30</a:t>
+            </a:r>
             <a:endParaRPr lang="pt-PT" dirty="0"/>
           </a:p>
         </p:txBody>
@@ -2105,6 +2157,90 @@
 </p:notes>
 </file>
 
+<file path=ppt/notesSlides/notesSlide24.xml><?xml version="1.0" encoding="utf-8"?>
+<p:notes xmlns:a="http://schemas.openxmlformats.org/drawingml/2006/main" xmlns:r="http://schemas.openxmlformats.org/officeDocument/2006/relationships" xmlns:p="http://schemas.openxmlformats.org/presentationml/2006/main">
+  <p:cSld>
+    <p:spTree>
+      <p:nvGrpSpPr>
+        <p:cNvPr id="1" name=""/>
+        <p:cNvGrpSpPr/>
+        <p:nvPr/>
+      </p:nvGrpSpPr>
+      <p:grpSpPr>
+        <a:xfrm>
+          <a:off x="0" y="0"/>
+          <a:ext cx="0" cy="0"/>
+          <a:chOff x="0" y="0"/>
+          <a:chExt cx="0" cy="0"/>
+        </a:xfrm>
+      </p:grpSpPr>
+      <p:sp>
+        <p:nvSpPr>
+          <p:cNvPr id="2" name="Marcador de Posição da Imagem do Diapositivo 1"/>
+          <p:cNvSpPr>
+            <a:spLocks noGrp="1" noRot="1" noChangeAspect="1"/>
+          </p:cNvSpPr>
+          <p:nvPr>
+            <p:ph type="sldImg"/>
+          </p:nvPr>
+        </p:nvSpPr>
+        <p:spPr/>
+      </p:sp>
+      <p:sp>
+        <p:nvSpPr>
+          <p:cNvPr id="3" name="Marcador de Posição de Notas 2"/>
+          <p:cNvSpPr>
+            <a:spLocks noGrp="1"/>
+          </p:cNvSpPr>
+          <p:nvPr>
+            <p:ph type="body" idx="1"/>
+          </p:nvPr>
+        </p:nvSpPr>
+        <p:spPr/>
+        <p:txBody>
+          <a:bodyPr/>
+          <a:lstStyle/>
+          <a:p>
+            <a:endParaRPr lang="pt-PT" dirty="0"/>
+          </a:p>
+        </p:txBody>
+      </p:sp>
+      <p:sp>
+        <p:nvSpPr>
+          <p:cNvPr id="4" name="Marcador de Posição do Número do Diapositivo 3"/>
+          <p:cNvSpPr>
+            <a:spLocks noGrp="1"/>
+          </p:cNvSpPr>
+          <p:nvPr>
+            <p:ph type="sldNum" sz="quarter" idx="10"/>
+          </p:nvPr>
+        </p:nvSpPr>
+        <p:spPr/>
+        <p:txBody>
+          <a:bodyPr/>
+          <a:lstStyle/>
+          <a:p>
+            <a:fld id="{F2D13AFA-C489-4F08-BBC3-E69A09335FB4}" type="slidenum">
+              <a:rPr lang="pt-PT" smtClean="0"/>
+              <a:t>24</a:t>
+            </a:fld>
+            <a:endParaRPr lang="pt-PT" dirty="0"/>
+          </a:p>
+        </p:txBody>
+      </p:sp>
+    </p:spTree>
+    <p:extLst>
+      <p:ext uri="{BB962C8B-B14F-4D97-AF65-F5344CB8AC3E}">
+        <p14:creationId xmlns:p14="http://schemas.microsoft.com/office/powerpoint/2010/main" val="1668997661"/>
+      </p:ext>
+    </p:extLst>
+  </p:cSld>
+  <p:clrMapOvr>
+    <a:masterClrMapping/>
+  </p:clrMapOvr>
+</p:notes>
+</file>
+
 <file path=ppt/notesSlides/notesSlide3.xml><?xml version="1.0" encoding="utf-8"?>
 <p:notes xmlns:a="http://schemas.openxmlformats.org/drawingml/2006/main" xmlns:r="http://schemas.openxmlformats.org/officeDocument/2006/relationships" xmlns:p="http://schemas.openxmlformats.org/presentationml/2006/main">
   <p:cSld>
@@ -2157,7 +2293,12 @@
               <a:rPr lang="pt-PT" baseline="0" dirty="0"/>
               <a:t> de forma a que percebamos qual o motivo e objetivos para este projeto.</a:t>
             </a:r>
-            <a:endParaRPr lang="pt-PT" dirty="0"/>
+          </a:p>
+          <a:p>
+            <a:r>
+              <a:rPr lang="pt-PT" dirty="0"/>
+              <a:t>TEMPO: 1:45</a:t>
+            </a:r>
           </a:p>
         </p:txBody>
       </p:sp>
@@ -2249,7 +2390,6 @@
               <a:rPr lang="pt-PT" baseline="0" dirty="0"/>
               <a:t> CARACTERÍSTICAS da tabela.</a:t>
             </a:r>
-            <a:endParaRPr lang="pt-PT" dirty="0"/>
           </a:p>
         </p:txBody>
       </p:sp>
@@ -2708,6 +2848,12 @@
             <a:r>
               <a:rPr lang="pt-PT" baseline="0" dirty="0"/>
               <a:t> diagrama serve apenas para dizer que nos baseamos também nele para fazer o trabalho e vamos fazer COMPARAÇÃO mais à frente.</a:t>
+            </a:r>
+          </a:p>
+          <a:p>
+            <a:r>
+              <a:rPr lang="pt-PT" baseline="0" dirty="0"/>
+              <a:t>TEMPO: 3:30</a:t>
             </a:r>
             <a:endParaRPr lang="pt-PT" dirty="0"/>
           </a:p>
@@ -3495,7 +3641,7 @@
             <a:fld id="{B61BEF0D-F0BB-DE4B-95CE-6DB70DBA9567}" type="datetimeFigureOut">
               <a:rPr lang="en-US" smtClean="0"/>
               <a:pPr/>
-              <a:t>6/11/2018</a:t>
+              <a:t>6/12/2018</a:t>
             </a:fld>
             <a:endParaRPr lang="en-US" dirty="0"/>
           </a:p>
@@ -3748,7 +3894,7 @@
             <a:fld id="{B61BEF0D-F0BB-DE4B-95CE-6DB70DBA9567}" type="datetimeFigureOut">
               <a:rPr lang="en-US" smtClean="0"/>
               <a:pPr/>
-              <a:t>6/11/2018</a:t>
+              <a:t>6/12/2018</a:t>
             </a:fld>
             <a:endParaRPr lang="en-US" dirty="0"/>
           </a:p>
@@ -4064,7 +4210,7 @@
             <a:fld id="{B61BEF0D-F0BB-DE4B-95CE-6DB70DBA9567}" type="datetimeFigureOut">
               <a:rPr lang="en-US" smtClean="0"/>
               <a:pPr/>
-              <a:t>6/11/2018</a:t>
+              <a:t>6/12/2018</a:t>
             </a:fld>
             <a:endParaRPr lang="en-US" dirty="0"/>
           </a:p>
@@ -4399,7 +4545,7 @@
             <a:fld id="{B61BEF0D-F0BB-DE4B-95CE-6DB70DBA9567}" type="datetimeFigureOut">
               <a:rPr lang="en-US" smtClean="0"/>
               <a:pPr/>
-              <a:t>6/11/2018</a:t>
+              <a:t>6/12/2018</a:t>
             </a:fld>
             <a:endParaRPr lang="en-US" dirty="0"/>
           </a:p>
@@ -4715,7 +4861,7 @@
             <a:fld id="{B61BEF0D-F0BB-DE4B-95CE-6DB70DBA9567}" type="datetimeFigureOut">
               <a:rPr lang="en-US" smtClean="0"/>
               <a:pPr/>
-              <a:t>6/11/2018</a:t>
+              <a:t>6/12/2018</a:t>
             </a:fld>
             <a:endParaRPr lang="en-US" dirty="0"/>
           </a:p>
@@ -5110,7 +5256,7 @@
             <a:fld id="{B61BEF0D-F0BB-DE4B-95CE-6DB70DBA9567}" type="datetimeFigureOut">
               <a:rPr lang="en-US" smtClean="0"/>
               <a:pPr/>
-              <a:t>6/11/2018</a:t>
+              <a:t>6/12/2018</a:t>
             </a:fld>
             <a:endParaRPr lang="en-US" dirty="0"/>
           </a:p>
@@ -5282,7 +5428,7 @@
             <a:fld id="{B61BEF0D-F0BB-DE4B-95CE-6DB70DBA9567}" type="datetimeFigureOut">
               <a:rPr lang="en-US" smtClean="0"/>
               <a:pPr/>
-              <a:t>6/11/2018</a:t>
+              <a:t>6/12/2018</a:t>
             </a:fld>
             <a:endParaRPr lang="en-US" dirty="0"/>
           </a:p>
@@ -5464,7 +5610,7 @@
             <a:fld id="{B61BEF0D-F0BB-DE4B-95CE-6DB70DBA9567}" type="datetimeFigureOut">
               <a:rPr lang="en-US" smtClean="0"/>
               <a:pPr/>
-              <a:t>6/11/2018</a:t>
+              <a:t>6/12/2018</a:t>
             </a:fld>
             <a:endParaRPr lang="en-US" dirty="0"/>
           </a:p>
@@ -5636,7 +5782,7 @@
             <a:fld id="{B61BEF0D-F0BB-DE4B-95CE-6DB70DBA9567}" type="datetimeFigureOut">
               <a:rPr lang="en-US" smtClean="0"/>
               <a:pPr/>
-              <a:t>6/11/2018</a:t>
+              <a:t>6/12/2018</a:t>
             </a:fld>
             <a:endParaRPr lang="en-US" dirty="0"/>
           </a:p>
@@ -5885,7 +6031,7 @@
             <a:fld id="{B61BEF0D-F0BB-DE4B-95CE-6DB70DBA9567}" type="datetimeFigureOut">
               <a:rPr lang="en-US" smtClean="0"/>
               <a:pPr/>
-              <a:t>6/11/2018</a:t>
+              <a:t>6/12/2018</a:t>
             </a:fld>
             <a:endParaRPr lang="en-US" dirty="0"/>
           </a:p>
@@ -6119,7 +6265,7 @@
             <a:fld id="{B61BEF0D-F0BB-DE4B-95CE-6DB70DBA9567}" type="datetimeFigureOut">
               <a:rPr lang="en-US" smtClean="0"/>
               <a:pPr/>
-              <a:t>6/11/2018</a:t>
+              <a:t>6/12/2018</a:t>
             </a:fld>
             <a:endParaRPr lang="en-US" dirty="0"/>
           </a:p>
@@ -6495,7 +6641,7 @@
             <a:fld id="{B61BEF0D-F0BB-DE4B-95CE-6DB70DBA9567}" type="datetimeFigureOut">
               <a:rPr lang="en-US" smtClean="0"/>
               <a:pPr/>
-              <a:t>6/11/2018</a:t>
+              <a:t>6/12/2018</a:t>
             </a:fld>
             <a:endParaRPr lang="en-US" dirty="0"/>
           </a:p>
@@ -6620,7 +6766,7 @@
             <a:fld id="{B61BEF0D-F0BB-DE4B-95CE-6DB70DBA9567}" type="datetimeFigureOut">
               <a:rPr lang="en-US" smtClean="0"/>
               <a:pPr/>
-              <a:t>6/11/2018</a:t>
+              <a:t>6/12/2018</a:t>
             </a:fld>
             <a:endParaRPr lang="en-US" dirty="0"/>
           </a:p>
@@ -6717,7 +6863,7 @@
             <a:fld id="{B61BEF0D-F0BB-DE4B-95CE-6DB70DBA9567}" type="datetimeFigureOut">
               <a:rPr lang="en-US" smtClean="0"/>
               <a:pPr/>
-              <a:t>6/11/2018</a:t>
+              <a:t>6/12/2018</a:t>
             </a:fld>
             <a:endParaRPr lang="en-US" dirty="0"/>
           </a:p>
@@ -6974,7 +7120,7 @@
             <a:fld id="{B61BEF0D-F0BB-DE4B-95CE-6DB70DBA9567}" type="datetimeFigureOut">
               <a:rPr lang="en-US" smtClean="0"/>
               <a:pPr/>
-              <a:t>6/11/2018</a:t>
+              <a:t>6/12/2018</a:t>
             </a:fld>
             <a:endParaRPr lang="en-US" dirty="0"/>
           </a:p>
@@ -7282,7 +7428,7 @@
             <a:fld id="{B61BEF0D-F0BB-DE4B-95CE-6DB70DBA9567}" type="datetimeFigureOut">
               <a:rPr lang="en-US" smtClean="0"/>
               <a:pPr/>
-              <a:t>6/11/2018</a:t>
+              <a:t>6/12/2018</a:t>
             </a:fld>
             <a:endParaRPr lang="en-US" dirty="0"/>
           </a:p>
@@ -7985,7 +8131,7 @@
             <a:fld id="{B61BEF0D-F0BB-DE4B-95CE-6DB70DBA9567}" type="datetimeFigureOut">
               <a:rPr lang="en-US" smtClean="0"/>
               <a:pPr/>
-              <a:t>6/11/2018</a:t>
+              <a:t>6/12/2018</a:t>
             </a:fld>
             <a:endParaRPr lang="en-US" dirty="0"/>
           </a:p>
@@ -11802,7 +11948,7 @@
             </a:pPr>
             <a:r>
               <a:rPr lang="pt-PT" dirty="0"/>
-              <a:t>O sistema deverá permitir que seja mandada uma proposta de serviço devidamente especificada ao profissional, que, posteriormente, poderá aceitar ou recusar.</a:t>
+              <a:t>O sistema deverá permitir que seja mandada uma proposta de serviço devidamente especificada ao profissional que, posteriormente, poderá aceitar ou recusar.</a:t>
             </a:r>
             <a:endParaRPr lang="pt-PT" sz="2400" dirty="0"/>
           </a:p>
@@ -12725,7 +12871,7 @@
           <p:nvPr/>
         </p:nvPicPr>
         <p:blipFill>
-          <a:blip r:embed="rId2" cstate="screen">
+          <a:blip r:embed="rId3" cstate="screen">
             <a:extLst>
               <a:ext uri="{28A0092B-C50C-407E-A947-70E740481C1C}">
                 <a14:useLocalDpi xmlns:a14="http://schemas.microsoft.com/office/drawing/2010/main"/>
@@ -13081,7 +13227,7 @@
           <p:nvPr/>
         </p:nvPicPr>
         <p:blipFill>
-          <a:blip r:embed="rId3">
+          <a:blip r:embed="rId4">
             <a:extLst>
               <a:ext uri="{28A0092B-C50C-407E-A947-70E740481C1C}">
                 <a14:useLocalDpi xmlns:a14="http://schemas.microsoft.com/office/drawing/2010/main" val="0"/>

</xml_diff>